<commit_message>
Update OpenCL source example
</commit_message>
<xml_diff>
--- a/Parallel computing with OpenCL.pptx
+++ b/Parallel computing with OpenCL.pptx
@@ -5,10 +5,10 @@
     <p:sldMasterId id="2147483660" r:id="rId1"/>
   </p:sldMasterIdLst>
   <p:notesMasterIdLst>
-    <p:notesMasterId r:id="rId11"/>
+    <p:notesMasterId r:id="rId12"/>
   </p:notesMasterIdLst>
   <p:handoutMasterIdLst>
-    <p:handoutMasterId r:id="rId12"/>
+    <p:handoutMasterId r:id="rId13"/>
   </p:handoutMasterIdLst>
   <p:sldIdLst>
     <p:sldId id="258" r:id="rId2"/>
@@ -20,11 +20,12 @@
     <p:sldId id="263" r:id="rId8"/>
     <p:sldId id="264" r:id="rId9"/>
     <p:sldId id="265" r:id="rId10"/>
+    <p:sldId id="266" r:id="rId11"/>
   </p:sldIdLst>
   <p:sldSz cx="9144000" cy="5143500" type="screen16x9"/>
   <p:notesSz cx="6858000" cy="9144000"/>
   <p:custDataLst>
-    <p:tags r:id="rId13"/>
+    <p:tags r:id="rId14"/>
   </p:custDataLst>
   <p:defaultTextStyle>
     <a:defPPr>
@@ -214,7 +215,7 @@
           <a:p>
             <a:fld id="{3773B7D2-1FB8-44C7-8156-72A206BE5FF7}" type="datetimeFigureOut">
               <a:rPr lang="en-GB" smtClean="0"/>
-              <a:t>06/11/2015</a:t>
+              <a:t>11/11/2015</a:t>
             </a:fld>
             <a:endParaRPr lang="en-GB"/>
           </a:p>
@@ -379,7 +380,7 @@
           <a:p>
             <a:fld id="{A88744C1-E5F4-494F-83B1-3BF169EAC4D6}" type="datetimeFigureOut">
               <a:rPr lang="en-GB" smtClean="0"/>
-              <a:t>06/11/2015</a:t>
+              <a:t>11/11/2015</a:t>
             </a:fld>
             <a:endParaRPr lang="en-GB"/>
           </a:p>
@@ -7118,6 +7119,30 @@
           <a:bodyPr/>
           <a:lstStyle/>
           <a:p>
+            <a:r>
+              <a:rPr lang="sv-SE" dirty="0" smtClean="0"/>
+              <a:t>Richard Sahlin at </a:t>
+            </a:r>
+            <a:r>
+              <a:rPr lang="sv-SE" dirty="0" err="1" smtClean="0"/>
+              <a:t>afconsult</a:t>
+            </a:r>
+            <a:r>
+              <a:rPr lang="sv-SE" dirty="0" smtClean="0"/>
+              <a:t> </a:t>
+            </a:r>
+            <a:r>
+              <a:rPr lang="sv-SE" dirty="0" err="1" smtClean="0"/>
+              <a:t>dot</a:t>
+            </a:r>
+            <a:r>
+              <a:rPr lang="sv-SE" dirty="0" smtClean="0"/>
+              <a:t> </a:t>
+            </a:r>
+            <a:r>
+              <a:rPr lang="sv-SE" dirty="0" err="1" smtClean="0"/>
+              <a:t>com</a:t>
+            </a:r>
             <a:endParaRPr lang="sv-SE" dirty="0"/>
           </a:p>
         </p:txBody>
@@ -7211,6 +7236,389 @@
 </p:sld>
 </file>
 
+<file path=ppt/slides/slide10.xml><?xml version="1.0" encoding="utf-8"?>
+<p:sld xmlns:a="http://schemas.openxmlformats.org/drawingml/2006/main" xmlns:r="http://schemas.openxmlformats.org/officeDocument/2006/relationships" xmlns:p="http://schemas.openxmlformats.org/presentationml/2006/main">
+  <p:cSld>
+    <p:spTree>
+      <p:nvGrpSpPr>
+        <p:cNvPr id="1" name=""/>
+        <p:cNvGrpSpPr/>
+        <p:nvPr/>
+      </p:nvGrpSpPr>
+      <p:grpSpPr>
+        <a:xfrm>
+          <a:off x="0" y="0"/>
+          <a:ext cx="0" cy="0"/>
+          <a:chOff x="0" y="0"/>
+          <a:chExt cx="0" cy="0"/>
+        </a:xfrm>
+      </p:grpSpPr>
+      <p:sp>
+        <p:nvSpPr>
+          <p:cNvPr id="2" name="Title 1"/>
+          <p:cNvSpPr>
+            <a:spLocks noGrp="1"/>
+          </p:cNvSpPr>
+          <p:nvPr>
+            <p:ph type="title"/>
+          </p:nvPr>
+        </p:nvSpPr>
+        <p:spPr/>
+        <p:txBody>
+          <a:bodyPr/>
+          <a:lstStyle/>
+          <a:p>
+            <a:r>
+              <a:rPr lang="sv-SE" dirty="0" err="1" smtClean="0"/>
+              <a:t>Next</a:t>
+            </a:r>
+            <a:r>
+              <a:rPr lang="sv-SE" dirty="0" smtClean="0"/>
+              <a:t> step</a:t>
+            </a:r>
+            <a:endParaRPr lang="sv-SE" dirty="0"/>
+          </a:p>
+        </p:txBody>
+      </p:sp>
+      <p:sp>
+        <p:nvSpPr>
+          <p:cNvPr id="3" name="Text Placeholder 2"/>
+          <p:cNvSpPr>
+            <a:spLocks noGrp="1"/>
+          </p:cNvSpPr>
+          <p:nvPr>
+            <p:ph type="body" idx="10"/>
+          </p:nvPr>
+        </p:nvSpPr>
+        <p:spPr/>
+        <p:txBody>
+          <a:bodyPr/>
+          <a:lstStyle/>
+          <a:p>
+            <a:endParaRPr lang="sv-SE"/>
+          </a:p>
+        </p:txBody>
+      </p:sp>
+      <p:sp>
+        <p:nvSpPr>
+          <p:cNvPr id="4" name="Content Placeholder 3"/>
+          <p:cNvSpPr>
+            <a:spLocks noGrp="1"/>
+          </p:cNvSpPr>
+          <p:nvPr>
+            <p:ph idx="1"/>
+          </p:nvPr>
+        </p:nvSpPr>
+        <p:spPr/>
+        <p:txBody>
+          <a:bodyPr/>
+          <a:lstStyle/>
+          <a:p>
+            <a:r>
+              <a:rPr lang="sv-SE" dirty="0" smtClean="0"/>
+              <a:t>Sort </a:t>
+            </a:r>
+            <a:r>
+              <a:rPr lang="sv-SE" dirty="0" err="1" smtClean="0"/>
+              <a:t>objects</a:t>
+            </a:r>
+            <a:r>
+              <a:rPr lang="sv-SE" dirty="0" smtClean="0"/>
+              <a:t> by Z</a:t>
+            </a:r>
+          </a:p>
+          <a:p>
+            <a:r>
+              <a:rPr lang="sv-SE" dirty="0" err="1" smtClean="0"/>
+              <a:t>Collision</a:t>
+            </a:r>
+            <a:r>
+              <a:rPr lang="sv-SE" dirty="0" smtClean="0"/>
+              <a:t> </a:t>
+            </a:r>
+            <a:r>
+              <a:rPr lang="sv-SE" dirty="0" err="1" smtClean="0"/>
+              <a:t>between</a:t>
+            </a:r>
+            <a:r>
+              <a:rPr lang="sv-SE" dirty="0" smtClean="0"/>
+              <a:t> </a:t>
+            </a:r>
+            <a:r>
+              <a:rPr lang="sv-SE" dirty="0" err="1" smtClean="0"/>
+              <a:t>objects</a:t>
+            </a:r>
+            <a:endParaRPr lang="sv-SE" dirty="0" smtClean="0"/>
+          </a:p>
+          <a:p>
+            <a:r>
+              <a:rPr lang="sv-SE" dirty="0" err="1" smtClean="0"/>
+              <a:t>Use</a:t>
+            </a:r>
+            <a:r>
+              <a:rPr lang="sv-SE" dirty="0" smtClean="0"/>
+              <a:t> </a:t>
+            </a:r>
+            <a:r>
+              <a:rPr lang="sv-SE" dirty="0" err="1" smtClean="0"/>
+              <a:t>physical</a:t>
+            </a:r>
+            <a:r>
+              <a:rPr lang="sv-SE" dirty="0" smtClean="0"/>
+              <a:t> </a:t>
+            </a:r>
+            <a:r>
+              <a:rPr lang="sv-SE" dirty="0" err="1" smtClean="0"/>
+              <a:t>properties</a:t>
+            </a:r>
+            <a:r>
+              <a:rPr lang="sv-SE" dirty="0" smtClean="0"/>
+              <a:t> for </a:t>
+            </a:r>
+            <a:r>
+              <a:rPr lang="sv-SE" dirty="0" err="1" smtClean="0"/>
+              <a:t>collision</a:t>
+            </a:r>
+            <a:r>
+              <a:rPr lang="sv-SE" dirty="0" smtClean="0"/>
+              <a:t> and </a:t>
+            </a:r>
+            <a:r>
+              <a:rPr lang="sv-SE" dirty="0" err="1" smtClean="0"/>
+              <a:t>movement</a:t>
+            </a:r>
+            <a:r>
+              <a:rPr lang="sv-SE" dirty="0" smtClean="0"/>
+              <a:t> (</a:t>
+            </a:r>
+            <a:r>
+              <a:rPr lang="sv-SE" dirty="0" err="1" smtClean="0"/>
+              <a:t>elasticity</a:t>
+            </a:r>
+            <a:r>
+              <a:rPr lang="sv-SE" dirty="0" smtClean="0"/>
+              <a:t> and drag)</a:t>
+            </a:r>
+          </a:p>
+          <a:p>
+            <a:endParaRPr lang="sv-SE" dirty="0"/>
+          </a:p>
+        </p:txBody>
+      </p:sp>
+      <p:sp>
+        <p:nvSpPr>
+          <p:cNvPr id="5" name="Slide Number Placeholder 4"/>
+          <p:cNvSpPr>
+            <a:spLocks noGrp="1"/>
+          </p:cNvSpPr>
+          <p:nvPr>
+            <p:ph type="sldNum" sz="quarter" idx="11"/>
+          </p:nvPr>
+        </p:nvSpPr>
+        <p:spPr/>
+        <p:txBody>
+          <a:bodyPr/>
+          <a:lstStyle/>
+          <a:p>
+            <a:fld id="{2C129B91-B200-45C1-AD3E-AEC4A27DD8AD}" type="slidenum">
+              <a:rPr lang="sv-SE" smtClean="0"/>
+              <a:pPr/>
+              <a:t>10</a:t>
+            </a:fld>
+            <a:endParaRPr lang="sv-SE"/>
+          </a:p>
+        </p:txBody>
+      </p:sp>
+    </p:spTree>
+    <p:extLst>
+      <p:ext uri="{BB962C8B-B14F-4D97-AF65-F5344CB8AC3E}">
+        <p14:creationId xmlns:p14="http://schemas.microsoft.com/office/powerpoint/2010/main" val="2038400471"/>
+      </p:ext>
+    </p:extLst>
+  </p:cSld>
+  <p:clrMapOvr>
+    <a:masterClrMapping/>
+  </p:clrMapOvr>
+  <p:timing>
+    <p:tnLst>
+      <p:par>
+        <p:cTn id="1" dur="indefinite" restart="never" nodeType="tmRoot">
+          <p:childTnLst>
+            <p:seq concurrent="1" nextAc="seek">
+              <p:cTn id="2" dur="indefinite" nodeType="mainSeq">
+                <p:childTnLst>
+                  <p:par>
+                    <p:cTn id="3" fill="hold">
+                      <p:stCondLst>
+                        <p:cond delay="indefinite"/>
+                      </p:stCondLst>
+                      <p:childTnLst>
+                        <p:par>
+                          <p:cTn id="4" fill="hold">
+                            <p:stCondLst>
+                              <p:cond delay="0"/>
+                            </p:stCondLst>
+                            <p:childTnLst>
+                              <p:par>
+                                <p:cTn id="5" presetID="1" presetClass="entr" presetSubtype="0" fill="hold" nodeType="clickEffect">
+                                  <p:stCondLst>
+                                    <p:cond delay="0"/>
+                                  </p:stCondLst>
+                                  <p:childTnLst>
+                                    <p:set>
+                                      <p:cBhvr>
+                                        <p:cTn id="6" dur="1" fill="hold">
+                                          <p:stCondLst>
+                                            <p:cond delay="0"/>
+                                          </p:stCondLst>
+                                        </p:cTn>
+                                        <p:tgtEl>
+                                          <p:spTgt spid="4">
+                                            <p:txEl>
+                                              <p:pRg st="0" end="0"/>
+                                            </p:txEl>
+                                          </p:spTgt>
+                                        </p:tgtEl>
+                                        <p:attrNameLst>
+                                          <p:attrName>style.visibility</p:attrName>
+                                        </p:attrNameLst>
+                                      </p:cBhvr>
+                                      <p:to>
+                                        <p:strVal val="visible"/>
+                                      </p:to>
+                                    </p:set>
+                                  </p:childTnLst>
+                                </p:cTn>
+                              </p:par>
+                            </p:childTnLst>
+                          </p:cTn>
+                        </p:par>
+                      </p:childTnLst>
+                    </p:cTn>
+                  </p:par>
+                  <p:par>
+                    <p:cTn id="7" fill="hold">
+                      <p:stCondLst>
+                        <p:cond delay="indefinite"/>
+                      </p:stCondLst>
+                      <p:childTnLst>
+                        <p:par>
+                          <p:cTn id="8" fill="hold">
+                            <p:stCondLst>
+                              <p:cond delay="0"/>
+                            </p:stCondLst>
+                            <p:childTnLst>
+                              <p:par>
+                                <p:cTn id="9" presetID="1" presetClass="entr" presetSubtype="0" fill="hold" nodeType="clickEffect">
+                                  <p:stCondLst>
+                                    <p:cond delay="0"/>
+                                  </p:stCondLst>
+                                  <p:childTnLst>
+                                    <p:set>
+                                      <p:cBhvr>
+                                        <p:cTn id="10" dur="1" fill="hold">
+                                          <p:stCondLst>
+                                            <p:cond delay="0"/>
+                                          </p:stCondLst>
+                                        </p:cTn>
+                                        <p:tgtEl>
+                                          <p:spTgt spid="4">
+                                            <p:txEl>
+                                              <p:pRg st="1" end="1"/>
+                                            </p:txEl>
+                                          </p:spTgt>
+                                        </p:tgtEl>
+                                        <p:attrNameLst>
+                                          <p:attrName>style.visibility</p:attrName>
+                                        </p:attrNameLst>
+                                      </p:cBhvr>
+                                      <p:to>
+                                        <p:strVal val="visible"/>
+                                      </p:to>
+                                    </p:set>
+                                  </p:childTnLst>
+                                </p:cTn>
+                              </p:par>
+                            </p:childTnLst>
+                          </p:cTn>
+                        </p:par>
+                      </p:childTnLst>
+                    </p:cTn>
+                  </p:par>
+                  <p:par>
+                    <p:cTn id="11" fill="hold">
+                      <p:stCondLst>
+                        <p:cond delay="indefinite"/>
+                      </p:stCondLst>
+                      <p:childTnLst>
+                        <p:par>
+                          <p:cTn id="12" fill="hold">
+                            <p:stCondLst>
+                              <p:cond delay="0"/>
+                            </p:stCondLst>
+                            <p:childTnLst>
+                              <p:par>
+                                <p:cTn id="13" presetID="1" presetClass="entr" presetSubtype="0" fill="hold" nodeType="clickEffect">
+                                  <p:stCondLst>
+                                    <p:cond delay="0"/>
+                                  </p:stCondLst>
+                                  <p:childTnLst>
+                                    <p:set>
+                                      <p:cBhvr>
+                                        <p:cTn id="14" dur="1" fill="hold">
+                                          <p:stCondLst>
+                                            <p:cond delay="0"/>
+                                          </p:stCondLst>
+                                        </p:cTn>
+                                        <p:tgtEl>
+                                          <p:spTgt spid="4">
+                                            <p:txEl>
+                                              <p:pRg st="2" end="2"/>
+                                            </p:txEl>
+                                          </p:spTgt>
+                                        </p:tgtEl>
+                                        <p:attrNameLst>
+                                          <p:attrName>style.visibility</p:attrName>
+                                        </p:attrNameLst>
+                                      </p:cBhvr>
+                                      <p:to>
+                                        <p:strVal val="visible"/>
+                                      </p:to>
+                                    </p:set>
+                                  </p:childTnLst>
+                                </p:cTn>
+                              </p:par>
+                            </p:childTnLst>
+                          </p:cTn>
+                        </p:par>
+                      </p:childTnLst>
+                    </p:cTn>
+                  </p:par>
+                </p:childTnLst>
+              </p:cTn>
+              <p:prevCondLst>
+                <p:cond evt="onPrev" delay="0">
+                  <p:tgtEl>
+                    <p:sldTgt/>
+                  </p:tgtEl>
+                </p:cond>
+              </p:prevCondLst>
+              <p:nextCondLst>
+                <p:cond evt="onNext" delay="0">
+                  <p:tgtEl>
+                    <p:sldTgt/>
+                  </p:tgtEl>
+                </p:cond>
+              </p:nextCondLst>
+            </p:seq>
+          </p:childTnLst>
+        </p:cTn>
+      </p:par>
+    </p:tnLst>
+  </p:timing>
+</p:sld>
+</file>
+
 <file path=ppt/slides/slide2.xml><?xml version="1.0" encoding="utf-8"?>
 <p:sld xmlns:a="http://schemas.openxmlformats.org/drawingml/2006/main" xmlns:r="http://schemas.openxmlformats.org/officeDocument/2006/relationships" xmlns:p="http://schemas.openxmlformats.org/presentationml/2006/main">
   <p:cSld>
@@ -7302,7 +7710,6 @@
               <a:rPr lang="en-GB" dirty="0" smtClean="0"/>
               <a:t>Based on C99</a:t>
             </a:r>
-            <a:endParaRPr lang="en-GB" dirty="0" smtClean="0"/>
           </a:p>
           <a:p>
             <a:endParaRPr lang="en-GB" dirty="0"/>
@@ -10423,25 +10830,6 @@
       </p:sp>
       <p:sp>
         <p:nvSpPr>
-          <p:cNvPr id="3" name="Text Placeholder 2"/>
-          <p:cNvSpPr>
-            <a:spLocks noGrp="1"/>
-          </p:cNvSpPr>
-          <p:nvPr>
-            <p:ph type="body" idx="10"/>
-          </p:nvPr>
-        </p:nvSpPr>
-        <p:spPr/>
-        <p:txBody>
-          <a:bodyPr/>
-          <a:lstStyle/>
-          <a:p>
-            <a:endParaRPr lang="sv-SE"/>
-          </a:p>
-        </p:txBody>
-      </p:sp>
-      <p:sp>
-        <p:nvSpPr>
           <p:cNvPr id="4" name="Content Placeholder 3"/>
           <p:cNvSpPr>
             <a:spLocks noGrp="1"/>
@@ -10452,8 +10840,8 @@
         </p:nvSpPr>
         <p:spPr>
           <a:xfrm>
-            <a:off x="290945" y="1440000"/>
-            <a:ext cx="8384918" cy="3276000"/>
+            <a:off x="290945" y="1282995"/>
+            <a:ext cx="8384918" cy="3785191"/>
           </a:xfrm>
         </p:spPr>
         <p:txBody>
@@ -10464,690 +10852,791 @@
               <a:buNone/>
             </a:pPr>
             <a:r>
-              <a:rPr lang="sv-SE" sz="1200" dirty="0" smtClean="0">
+              <a:rPr lang="en-US" sz="1000" dirty="0">
+                <a:latin typeface="Courier New" panose="02070309020205020404" pitchFamily="49" charset="0"/>
+                <a:cs typeface="Courier New" panose="02070309020205020404" pitchFamily="49" charset="0"/>
+              </a:rPr>
+              <a:t>// OpenCL Kernel Function for physics </a:t>
+            </a:r>
+            <a:r>
+              <a:rPr lang="en-US" sz="1000" u="sng" dirty="0" smtClean="0">
+                <a:latin typeface="Courier New" panose="02070309020205020404" pitchFamily="49" charset="0"/>
+                <a:cs typeface="Courier New" panose="02070309020205020404" pitchFamily="49" charset="0"/>
+              </a:rPr>
+              <a:t>sprites</a:t>
+            </a:r>
+            <a:br>
+              <a:rPr lang="en-US" sz="1000" u="sng" dirty="0" smtClean="0">
+                <a:latin typeface="Courier New" panose="02070309020205020404" pitchFamily="49" charset="0"/>
+                <a:cs typeface="Courier New" panose="02070309020205020404" pitchFamily="49" charset="0"/>
+              </a:rPr>
+            </a:br>
+            <a:r>
+              <a:rPr lang="sv-SE" sz="1000" dirty="0" err="1" smtClean="0">
+                <a:latin typeface="Courier New" panose="02070309020205020404" pitchFamily="49" charset="0"/>
+                <a:cs typeface="Courier New" panose="02070309020205020404" pitchFamily="49" charset="0"/>
+              </a:rPr>
+              <a:t>typedef</a:t>
+            </a:r>
+            <a:r>
+              <a:rPr lang="sv-SE" sz="1000" dirty="0" smtClean="0">
+                <a:latin typeface="Courier New" panose="02070309020205020404" pitchFamily="49" charset="0"/>
+                <a:cs typeface="Courier New" panose="02070309020205020404" pitchFamily="49" charset="0"/>
+              </a:rPr>
+              <a:t> </a:t>
+            </a:r>
+            <a:r>
+              <a:rPr lang="sv-SE" sz="1000" u="sng" dirty="0" err="1">
+                <a:latin typeface="Courier New" panose="02070309020205020404" pitchFamily="49" charset="0"/>
+                <a:cs typeface="Courier New" panose="02070309020205020404" pitchFamily="49" charset="0"/>
+              </a:rPr>
+              <a:t>struct</a:t>
+            </a:r>
+            <a:r>
+              <a:rPr lang="sv-SE" sz="1000" u="sng" dirty="0">
+                <a:latin typeface="Courier New" panose="02070309020205020404" pitchFamily="49" charset="0"/>
+                <a:cs typeface="Courier New" panose="02070309020205020404" pitchFamily="49" charset="0"/>
+              </a:rPr>
+              <a:t> </a:t>
+            </a:r>
+            <a:r>
+              <a:rPr lang="sv-SE" sz="1000" u="sng" dirty="0" smtClean="0">
+                <a:latin typeface="Courier New" panose="02070309020205020404" pitchFamily="49" charset="0"/>
+                <a:cs typeface="Courier New" panose="02070309020205020404" pitchFamily="49" charset="0"/>
+              </a:rPr>
+              <a:t>{</a:t>
+            </a:r>
+            <a:br>
+              <a:rPr lang="sv-SE" sz="1000" u="sng" dirty="0" smtClean="0">
+                <a:latin typeface="Courier New" panose="02070309020205020404" pitchFamily="49" charset="0"/>
+                <a:cs typeface="Courier New" panose="02070309020205020404" pitchFamily="49" charset="0"/>
+              </a:rPr>
+            </a:br>
+            <a:r>
+              <a:rPr lang="en-US" sz="1000" dirty="0" smtClean="0">
+                <a:latin typeface="Courier New" panose="02070309020205020404" pitchFamily="49" charset="0"/>
+                <a:cs typeface="Courier New" panose="02070309020205020404" pitchFamily="49" charset="0"/>
+              </a:rPr>
+              <a:t>//</a:t>
+            </a:r>
+            <a:r>
+              <a:rPr lang="en-US" sz="1000" dirty="0">
+                <a:latin typeface="Courier New" panose="02070309020205020404" pitchFamily="49" charset="0"/>
+                <a:cs typeface="Courier New" panose="02070309020205020404" pitchFamily="49" charset="0"/>
+              </a:rPr>
+              <a:t>Order is: Bottom first, left near corner, then going clockwise. Top after that also left near corner </a:t>
+            </a:r>
+            <a:r>
+              <a:rPr lang="en-US" sz="1000" dirty="0" smtClean="0">
+                <a:latin typeface="Courier New" panose="02070309020205020404" pitchFamily="49" charset="0"/>
+                <a:cs typeface="Courier New" panose="02070309020205020404" pitchFamily="49" charset="0"/>
+              </a:rPr>
+              <a:t>first.</a:t>
+            </a:r>
+            <a:br>
+              <a:rPr lang="en-US" sz="1000" dirty="0" smtClean="0">
+                <a:latin typeface="Courier New" panose="02070309020205020404" pitchFamily="49" charset="0"/>
+                <a:cs typeface="Courier New" panose="02070309020205020404" pitchFamily="49" charset="0"/>
+              </a:rPr>
+            </a:br>
+            <a:r>
+              <a:rPr lang="sv-SE" sz="1000" dirty="0" smtClean="0">
+                <a:latin typeface="Courier New" panose="02070309020205020404" pitchFamily="49" charset="0"/>
+                <a:cs typeface="Courier New" panose="02070309020205020404" pitchFamily="49" charset="0"/>
+              </a:rPr>
+              <a:t>float4 </a:t>
+            </a:r>
+            <a:r>
+              <a:rPr lang="sv-SE" sz="1000" dirty="0" err="1" smtClean="0">
+                <a:latin typeface="Courier New" panose="02070309020205020404" pitchFamily="49" charset="0"/>
+                <a:cs typeface="Courier New" panose="02070309020205020404" pitchFamily="49" charset="0"/>
+              </a:rPr>
+              <a:t>vertices</a:t>
+            </a:r>
+            <a:r>
+              <a:rPr lang="sv-SE" sz="1000" dirty="0" smtClean="0">
+                <a:latin typeface="Courier New" panose="02070309020205020404" pitchFamily="49" charset="0"/>
+                <a:cs typeface="Courier New" panose="02070309020205020404" pitchFamily="49" charset="0"/>
+              </a:rPr>
+              <a:t>[8];</a:t>
+            </a:r>
+            <a:br>
+              <a:rPr lang="sv-SE" sz="1000" dirty="0" smtClean="0">
+                <a:latin typeface="Courier New" panose="02070309020205020404" pitchFamily="49" charset="0"/>
+                <a:cs typeface="Courier New" panose="02070309020205020404" pitchFamily="49" charset="0"/>
+              </a:rPr>
+            </a:br>
+            <a:r>
+              <a:rPr lang="en-US" sz="1000" dirty="0" smtClean="0">
+                <a:latin typeface="Courier New" panose="02070309020205020404" pitchFamily="49" charset="0"/>
+                <a:cs typeface="Courier New" panose="02070309020205020404" pitchFamily="49" charset="0"/>
+              </a:rPr>
+              <a:t>//</a:t>
+            </a:r>
+            <a:r>
+              <a:rPr lang="en-US" sz="1000" dirty="0">
+                <a:latin typeface="Courier New" panose="02070309020205020404" pitchFamily="49" charset="0"/>
+                <a:cs typeface="Courier New" panose="02070309020205020404" pitchFamily="49" charset="0"/>
+              </a:rPr>
+              <a:t>Order is: floor, front, back, left, right, </a:t>
+            </a:r>
+            <a:r>
+              <a:rPr lang="en-US" sz="1000" dirty="0" smtClean="0">
+                <a:latin typeface="Courier New" panose="02070309020205020404" pitchFamily="49" charset="0"/>
+                <a:cs typeface="Courier New" panose="02070309020205020404" pitchFamily="49" charset="0"/>
+              </a:rPr>
+              <a:t>top</a:t>
+            </a:r>
+            <a:br>
+              <a:rPr lang="en-US" sz="1000" dirty="0" smtClean="0">
+                <a:latin typeface="Courier New" panose="02070309020205020404" pitchFamily="49" charset="0"/>
+                <a:cs typeface="Courier New" panose="02070309020205020404" pitchFamily="49" charset="0"/>
+              </a:rPr>
+            </a:br>
+            <a:r>
+              <a:rPr lang="sv-SE" sz="1000" dirty="0" smtClean="0">
+                <a:latin typeface="Courier New" panose="02070309020205020404" pitchFamily="49" charset="0"/>
+                <a:cs typeface="Courier New" panose="02070309020205020404" pitchFamily="49" charset="0"/>
+              </a:rPr>
+              <a:t>float4 </a:t>
+            </a:r>
+            <a:r>
+              <a:rPr lang="sv-SE" sz="1000" dirty="0" err="1">
+                <a:latin typeface="Courier New" panose="02070309020205020404" pitchFamily="49" charset="0"/>
+                <a:cs typeface="Courier New" panose="02070309020205020404" pitchFamily="49" charset="0"/>
+              </a:rPr>
+              <a:t>crossVectors</a:t>
+            </a:r>
+            <a:r>
+              <a:rPr lang="sv-SE" sz="1000" dirty="0">
+                <a:latin typeface="Courier New" panose="02070309020205020404" pitchFamily="49" charset="0"/>
+                <a:cs typeface="Courier New" panose="02070309020205020404" pitchFamily="49" charset="0"/>
+              </a:rPr>
+              <a:t>[6</a:t>
+            </a:r>
+            <a:r>
+              <a:rPr lang="sv-SE" sz="1000" dirty="0" smtClean="0">
+                <a:latin typeface="Courier New" panose="02070309020205020404" pitchFamily="49" charset="0"/>
+                <a:cs typeface="Courier New" panose="02070309020205020404" pitchFamily="49" charset="0"/>
+              </a:rPr>
+              <a:t>];</a:t>
+            </a:r>
+            <a:br>
+              <a:rPr lang="sv-SE" sz="1000" dirty="0" smtClean="0">
+                <a:latin typeface="Courier New" panose="02070309020205020404" pitchFamily="49" charset="0"/>
+                <a:cs typeface="Courier New" panose="02070309020205020404" pitchFamily="49" charset="0"/>
+              </a:rPr>
+            </a:br>
+            <a:r>
+              <a:rPr lang="sv-SE" sz="1000" dirty="0" smtClean="0">
+                <a:latin typeface="Courier New" panose="02070309020205020404" pitchFamily="49" charset="0"/>
+                <a:cs typeface="Courier New" panose="02070309020205020404" pitchFamily="49" charset="0"/>
+              </a:rPr>
+              <a:t>} </a:t>
+            </a:r>
+            <a:r>
+              <a:rPr lang="sv-SE" sz="1000" dirty="0">
+                <a:latin typeface="Courier New" panose="02070309020205020404" pitchFamily="49" charset="0"/>
+                <a:cs typeface="Courier New" panose="02070309020205020404" pitchFamily="49" charset="0"/>
+              </a:rPr>
+              <a:t>__</a:t>
+            </a:r>
+            <a:r>
+              <a:rPr lang="sv-SE" sz="1000" dirty="0" err="1">
+                <a:latin typeface="Courier New" panose="02070309020205020404" pitchFamily="49" charset="0"/>
+                <a:cs typeface="Courier New" panose="02070309020205020404" pitchFamily="49" charset="0"/>
+              </a:rPr>
+              <a:t>attribute</a:t>
+            </a:r>
+            <a:r>
+              <a:rPr lang="sv-SE" sz="1000" dirty="0">
+                <a:latin typeface="Courier New" panose="02070309020205020404" pitchFamily="49" charset="0"/>
+                <a:cs typeface="Courier New" panose="02070309020205020404" pitchFamily="49" charset="0"/>
+              </a:rPr>
+              <a:t>__ ((</a:t>
+            </a:r>
+            <a:r>
+              <a:rPr lang="sv-SE" sz="1000" dirty="0" err="1">
+                <a:latin typeface="Courier New" panose="02070309020205020404" pitchFamily="49" charset="0"/>
+                <a:cs typeface="Courier New" panose="02070309020205020404" pitchFamily="49" charset="0"/>
+              </a:rPr>
+              <a:t>packed</a:t>
+            </a:r>
+            <a:r>
+              <a:rPr lang="sv-SE" sz="1000" dirty="0">
+                <a:latin typeface="Courier New" panose="02070309020205020404" pitchFamily="49" charset="0"/>
+                <a:cs typeface="Courier New" panose="02070309020205020404" pitchFamily="49" charset="0"/>
+              </a:rPr>
+              <a:t>)) </a:t>
+            </a:r>
+            <a:r>
+              <a:rPr lang="sv-SE" sz="1000" dirty="0" err="1" smtClean="0">
+                <a:latin typeface="Courier New" panose="02070309020205020404" pitchFamily="49" charset="0"/>
+                <a:cs typeface="Courier New" panose="02070309020205020404" pitchFamily="49" charset="0"/>
+              </a:rPr>
+              <a:t>Boundingbox</a:t>
+            </a:r>
+            <a:r>
+              <a:rPr lang="sv-SE" sz="1000" dirty="0" smtClean="0">
+                <a:latin typeface="Courier New" panose="02070309020205020404" pitchFamily="49" charset="0"/>
+                <a:cs typeface="Courier New" panose="02070309020205020404" pitchFamily="49" charset="0"/>
+              </a:rPr>
+              <a:t>;</a:t>
+            </a:r>
+            <a:r>
+              <a:rPr lang="sv-SE" sz="1000" u="sng" dirty="0" smtClean="0">
+                <a:latin typeface="Courier New" panose="02070309020205020404" pitchFamily="49" charset="0"/>
+                <a:cs typeface="Courier New" panose="02070309020205020404" pitchFamily="49" charset="0"/>
+              </a:rPr>
+              <a:t/>
+            </a:r>
+            <a:br>
+              <a:rPr lang="sv-SE" sz="1000" u="sng" dirty="0" smtClean="0">
+                <a:latin typeface="Courier New" panose="02070309020205020404" pitchFamily="49" charset="0"/>
+                <a:cs typeface="Courier New" panose="02070309020205020404" pitchFamily="49" charset="0"/>
+              </a:rPr>
+            </a:br>
+            <a:r>
+              <a:rPr lang="sv-SE" sz="1000" dirty="0" err="1" smtClean="0">
+                <a:latin typeface="Courier New" panose="02070309020205020404" pitchFamily="49" charset="0"/>
+                <a:cs typeface="Courier New" panose="02070309020205020404" pitchFamily="49" charset="0"/>
+              </a:rPr>
+              <a:t>typedef</a:t>
+            </a:r>
+            <a:r>
+              <a:rPr lang="sv-SE" sz="1000" dirty="0" smtClean="0">
+                <a:latin typeface="Courier New" panose="02070309020205020404" pitchFamily="49" charset="0"/>
+                <a:cs typeface="Courier New" panose="02070309020205020404" pitchFamily="49" charset="0"/>
+              </a:rPr>
+              <a:t> </a:t>
+            </a:r>
+            <a:r>
+              <a:rPr lang="sv-SE" sz="1000" dirty="0" err="1">
+                <a:latin typeface="Courier New" panose="02070309020205020404" pitchFamily="49" charset="0"/>
+                <a:cs typeface="Courier New" panose="02070309020205020404" pitchFamily="49" charset="0"/>
+              </a:rPr>
+              <a:t>struct</a:t>
+            </a:r>
+            <a:r>
+              <a:rPr lang="sv-SE" sz="1000" dirty="0">
+                <a:latin typeface="Courier New" panose="02070309020205020404" pitchFamily="49" charset="0"/>
+                <a:cs typeface="Courier New" panose="02070309020205020404" pitchFamily="49" charset="0"/>
+              </a:rPr>
+              <a:t> </a:t>
+            </a:r>
+            <a:r>
+              <a:rPr lang="sv-SE" sz="1000" dirty="0" smtClean="0">
+                <a:latin typeface="Courier New" panose="02070309020205020404" pitchFamily="49" charset="0"/>
+                <a:cs typeface="Courier New" panose="02070309020205020404" pitchFamily="49" charset="0"/>
+              </a:rPr>
+              <a:t>{</a:t>
+            </a:r>
+            <a:r>
+              <a:rPr lang="sv-SE" sz="1000" u="sng" dirty="0" smtClean="0">
+                <a:latin typeface="Courier New" panose="02070309020205020404" pitchFamily="49" charset="0"/>
+                <a:cs typeface="Courier New" panose="02070309020205020404" pitchFamily="49" charset="0"/>
+              </a:rPr>
+              <a:t/>
+            </a:r>
+            <a:br>
+              <a:rPr lang="sv-SE" sz="1000" u="sng" dirty="0" smtClean="0">
+                <a:latin typeface="Courier New" panose="02070309020205020404" pitchFamily="49" charset="0"/>
+                <a:cs typeface="Courier New" panose="02070309020205020404" pitchFamily="49" charset="0"/>
+              </a:rPr>
+            </a:br>
+            <a:r>
+              <a:rPr lang="sv-SE" sz="1000" dirty="0" smtClean="0">
+                <a:latin typeface="Courier New" panose="02070309020205020404" pitchFamily="49" charset="0"/>
+                <a:cs typeface="Courier New" panose="02070309020205020404" pitchFamily="49" charset="0"/>
+              </a:rPr>
+              <a:t>	float4 position;</a:t>
+            </a:r>
+            <a:br>
+              <a:rPr lang="sv-SE" sz="1000" dirty="0" smtClean="0">
+                <a:latin typeface="Courier New" panose="02070309020205020404" pitchFamily="49" charset="0"/>
+                <a:cs typeface="Courier New" panose="02070309020205020404" pitchFamily="49" charset="0"/>
+              </a:rPr>
+            </a:br>
+            <a:r>
+              <a:rPr lang="sv-SE" sz="1000" dirty="0" smtClean="0">
+                <a:latin typeface="Courier New" panose="02070309020205020404" pitchFamily="49" charset="0"/>
+                <a:cs typeface="Courier New" panose="02070309020205020404" pitchFamily="49" charset="0"/>
+              </a:rPr>
+              <a:t>	float4 acceleration;</a:t>
+            </a:r>
+            <a:br>
+              <a:rPr lang="sv-SE" sz="1000" dirty="0" smtClean="0">
+                <a:latin typeface="Courier New" panose="02070309020205020404" pitchFamily="49" charset="0"/>
+                <a:cs typeface="Courier New" panose="02070309020205020404" pitchFamily="49" charset="0"/>
+              </a:rPr>
+            </a:br>
+            <a:r>
+              <a:rPr lang="sv-SE" sz="1000" dirty="0" smtClean="0">
+                <a:latin typeface="Courier New" panose="02070309020205020404" pitchFamily="49" charset="0"/>
+                <a:cs typeface="Courier New" panose="02070309020205020404" pitchFamily="49" charset="0"/>
+              </a:rPr>
+              <a:t>	float4 </a:t>
+            </a:r>
+            <a:r>
+              <a:rPr lang="sv-SE" sz="1000" dirty="0" err="1">
+                <a:latin typeface="Courier New" panose="02070309020205020404" pitchFamily="49" charset="0"/>
+                <a:cs typeface="Courier New" panose="02070309020205020404" pitchFamily="49" charset="0"/>
+              </a:rPr>
+              <a:t>velocity</a:t>
+            </a:r>
+            <a:r>
+              <a:rPr lang="sv-SE" sz="1000" dirty="0" smtClean="0">
+                <a:latin typeface="Courier New" panose="02070309020205020404" pitchFamily="49" charset="0"/>
+                <a:cs typeface="Courier New" panose="02070309020205020404" pitchFamily="49" charset="0"/>
+              </a:rPr>
+              <a:t>;</a:t>
+            </a:r>
+            <a:br>
+              <a:rPr lang="sv-SE" sz="1000" dirty="0" smtClean="0">
+                <a:latin typeface="Courier New" panose="02070309020205020404" pitchFamily="49" charset="0"/>
+                <a:cs typeface="Courier New" panose="02070309020205020404" pitchFamily="49" charset="0"/>
+              </a:rPr>
+            </a:br>
+            <a:r>
+              <a:rPr lang="sv-SE" sz="1000" dirty="0" smtClean="0">
+                <a:latin typeface="Courier New" panose="02070309020205020404" pitchFamily="49" charset="0"/>
+                <a:cs typeface="Courier New" panose="02070309020205020404" pitchFamily="49" charset="0"/>
+              </a:rPr>
+              <a:t>} </a:t>
+            </a:r>
+            <a:r>
+              <a:rPr lang="sv-SE" sz="1000" dirty="0">
+                <a:latin typeface="Courier New" panose="02070309020205020404" pitchFamily="49" charset="0"/>
+                <a:cs typeface="Courier New" panose="02070309020205020404" pitchFamily="49" charset="0"/>
+              </a:rPr>
+              <a:t>__</a:t>
+            </a:r>
+            <a:r>
+              <a:rPr lang="sv-SE" sz="1000" dirty="0" err="1">
+                <a:latin typeface="Courier New" panose="02070309020205020404" pitchFamily="49" charset="0"/>
+                <a:cs typeface="Courier New" panose="02070309020205020404" pitchFamily="49" charset="0"/>
+              </a:rPr>
+              <a:t>attribute</a:t>
+            </a:r>
+            <a:r>
+              <a:rPr lang="sv-SE" sz="1000" dirty="0">
+                <a:latin typeface="Courier New" panose="02070309020205020404" pitchFamily="49" charset="0"/>
+                <a:cs typeface="Courier New" panose="02070309020205020404" pitchFamily="49" charset="0"/>
+              </a:rPr>
+              <a:t>__ ((</a:t>
+            </a:r>
+            <a:r>
+              <a:rPr lang="sv-SE" sz="1000" dirty="0" err="1">
+                <a:latin typeface="Courier New" panose="02070309020205020404" pitchFamily="49" charset="0"/>
+                <a:cs typeface="Courier New" panose="02070309020205020404" pitchFamily="49" charset="0"/>
+              </a:rPr>
+              <a:t>packed</a:t>
+            </a:r>
+            <a:r>
+              <a:rPr lang="sv-SE" sz="1000" dirty="0">
+                <a:latin typeface="Courier New" panose="02070309020205020404" pitchFamily="49" charset="0"/>
+                <a:cs typeface="Courier New" panose="02070309020205020404" pitchFamily="49" charset="0"/>
+              </a:rPr>
+              <a:t>)) </a:t>
+            </a:r>
+            <a:r>
+              <a:rPr lang="sv-SE" sz="1000" dirty="0" smtClean="0">
+                <a:latin typeface="Courier New" panose="02070309020205020404" pitchFamily="49" charset="0"/>
+                <a:cs typeface="Courier New" panose="02070309020205020404" pitchFamily="49" charset="0"/>
+              </a:rPr>
+              <a:t>Sprite;</a:t>
+            </a:r>
+            <a:br>
+              <a:rPr lang="sv-SE" sz="1000" dirty="0" smtClean="0">
+                <a:latin typeface="Courier New" panose="02070309020205020404" pitchFamily="49" charset="0"/>
+                <a:cs typeface="Courier New" panose="02070309020205020404" pitchFamily="49" charset="0"/>
+              </a:rPr>
+            </a:br>
+            <a:r>
+              <a:rPr lang="sv-SE" sz="1000" dirty="0" err="1" smtClean="0">
+                <a:latin typeface="Courier New" panose="02070309020205020404" pitchFamily="49" charset="0"/>
+                <a:cs typeface="Courier New" panose="02070309020205020404" pitchFamily="49" charset="0"/>
+              </a:rPr>
+              <a:t>typedef</a:t>
+            </a:r>
+            <a:r>
+              <a:rPr lang="sv-SE" sz="1000" dirty="0" smtClean="0">
+                <a:latin typeface="Courier New" panose="02070309020205020404" pitchFamily="49" charset="0"/>
+                <a:cs typeface="Courier New" panose="02070309020205020404" pitchFamily="49" charset="0"/>
+              </a:rPr>
+              <a:t> </a:t>
+            </a:r>
+            <a:r>
+              <a:rPr lang="sv-SE" sz="1000" dirty="0" err="1">
+                <a:latin typeface="Courier New" panose="02070309020205020404" pitchFamily="49" charset="0"/>
+                <a:cs typeface="Courier New" panose="02070309020205020404" pitchFamily="49" charset="0"/>
+              </a:rPr>
+              <a:t>struct</a:t>
+            </a:r>
+            <a:r>
+              <a:rPr lang="sv-SE" sz="1000" dirty="0">
+                <a:latin typeface="Courier New" panose="02070309020205020404" pitchFamily="49" charset="0"/>
+                <a:cs typeface="Courier New" panose="02070309020205020404" pitchFamily="49" charset="0"/>
+              </a:rPr>
+              <a:t> </a:t>
+            </a:r>
+            <a:r>
+              <a:rPr lang="sv-SE" sz="1000" dirty="0" smtClean="0">
+                <a:latin typeface="Courier New" panose="02070309020205020404" pitchFamily="49" charset="0"/>
+                <a:cs typeface="Courier New" panose="02070309020205020404" pitchFamily="49" charset="0"/>
+              </a:rPr>
+              <a:t>{</a:t>
+            </a:r>
+            <a:r>
+              <a:rPr lang="sv-SE" sz="1000" u="sng" dirty="0" smtClean="0">
+                <a:latin typeface="Courier New" panose="02070309020205020404" pitchFamily="49" charset="0"/>
+                <a:cs typeface="Courier New" panose="02070309020205020404" pitchFamily="49" charset="0"/>
+              </a:rPr>
+              <a:t/>
+            </a:r>
+            <a:br>
+              <a:rPr lang="sv-SE" sz="1000" u="sng" dirty="0" smtClean="0">
+                <a:latin typeface="Courier New" panose="02070309020205020404" pitchFamily="49" charset="0"/>
+                <a:cs typeface="Courier New" panose="02070309020205020404" pitchFamily="49" charset="0"/>
+              </a:rPr>
+            </a:br>
+            <a:r>
+              <a:rPr lang="sv-SE" sz="1000" dirty="0" smtClean="0">
+                <a:latin typeface="Courier New" panose="02070309020205020404" pitchFamily="49" charset="0"/>
+                <a:cs typeface="Courier New" panose="02070309020205020404" pitchFamily="49" charset="0"/>
+              </a:rPr>
+              <a:t>	float4 </a:t>
+            </a:r>
+            <a:r>
+              <a:rPr lang="sv-SE" sz="1000" dirty="0">
+                <a:latin typeface="Courier New" panose="02070309020205020404" pitchFamily="49" charset="0"/>
+                <a:cs typeface="Courier New" panose="02070309020205020404" pitchFamily="49" charset="0"/>
+              </a:rPr>
+              <a:t>area</a:t>
+            </a:r>
+            <a:r>
+              <a:rPr lang="sv-SE" sz="1000" dirty="0" smtClean="0">
+                <a:latin typeface="Courier New" panose="02070309020205020404" pitchFamily="49" charset="0"/>
+                <a:cs typeface="Courier New" panose="02070309020205020404" pitchFamily="49" charset="0"/>
+              </a:rPr>
+              <a:t>;</a:t>
+            </a:r>
+            <a:br>
+              <a:rPr lang="sv-SE" sz="1000" dirty="0" smtClean="0">
+                <a:latin typeface="Courier New" panose="02070309020205020404" pitchFamily="49" charset="0"/>
+                <a:cs typeface="Courier New" panose="02070309020205020404" pitchFamily="49" charset="0"/>
+              </a:rPr>
+            </a:br>
+            <a:r>
+              <a:rPr lang="sv-SE" sz="1000" dirty="0" smtClean="0">
+                <a:latin typeface="Courier New" panose="02070309020205020404" pitchFamily="49" charset="0"/>
+                <a:cs typeface="Courier New" panose="02070309020205020404" pitchFamily="49" charset="0"/>
+              </a:rPr>
+              <a:t>	float4 </a:t>
+            </a:r>
+            <a:r>
+              <a:rPr lang="sv-SE" sz="1000" dirty="0" err="1">
+                <a:latin typeface="Courier New" panose="02070309020205020404" pitchFamily="49" charset="0"/>
+                <a:cs typeface="Courier New" panose="02070309020205020404" pitchFamily="49" charset="0"/>
+              </a:rPr>
+              <a:t>properties</a:t>
+            </a:r>
+            <a:r>
+              <a:rPr lang="sv-SE" sz="1000" dirty="0" smtClean="0">
+                <a:latin typeface="Courier New" panose="02070309020205020404" pitchFamily="49" charset="0"/>
+                <a:cs typeface="Courier New" panose="02070309020205020404" pitchFamily="49" charset="0"/>
+              </a:rPr>
+              <a:t>; </a:t>
+            </a:r>
+            <a:r>
+              <a:rPr lang="sv-SE" sz="1000" dirty="0">
+                <a:latin typeface="Courier New" panose="02070309020205020404" pitchFamily="49" charset="0"/>
+                <a:cs typeface="Courier New" panose="02070309020205020404" pitchFamily="49" charset="0"/>
+              </a:rPr>
+              <a:t>//</a:t>
+            </a:r>
+            <a:r>
+              <a:rPr lang="sv-SE" sz="1000" dirty="0" err="1">
+                <a:latin typeface="Courier New" panose="02070309020205020404" pitchFamily="49" charset="0"/>
+                <a:cs typeface="Courier New" panose="02070309020205020404" pitchFamily="49" charset="0"/>
+              </a:rPr>
+              <a:t>mass</a:t>
+            </a:r>
+            <a:r>
+              <a:rPr lang="sv-SE" sz="1000" dirty="0">
+                <a:latin typeface="Courier New" panose="02070309020205020404" pitchFamily="49" charset="0"/>
+                <a:cs typeface="Courier New" panose="02070309020205020404" pitchFamily="49" charset="0"/>
+              </a:rPr>
+              <a:t>, </a:t>
+            </a:r>
+            <a:r>
+              <a:rPr lang="sv-SE" sz="1000" dirty="0" err="1">
+                <a:latin typeface="Courier New" panose="02070309020205020404" pitchFamily="49" charset="0"/>
+                <a:cs typeface="Courier New" panose="02070309020205020404" pitchFamily="49" charset="0"/>
+              </a:rPr>
+              <a:t>elasticity</a:t>
+            </a:r>
+            <a:r>
+              <a:rPr lang="sv-SE" sz="1000" dirty="0" smtClean="0">
+                <a:latin typeface="Courier New" panose="02070309020205020404" pitchFamily="49" charset="0"/>
+                <a:cs typeface="Courier New" panose="02070309020205020404" pitchFamily="49" charset="0"/>
+              </a:rPr>
+              <a:t/>
+            </a:r>
+            <a:br>
+              <a:rPr lang="sv-SE" sz="1000" dirty="0" smtClean="0">
+                <a:latin typeface="Courier New" panose="02070309020205020404" pitchFamily="49" charset="0"/>
+                <a:cs typeface="Courier New" panose="02070309020205020404" pitchFamily="49" charset="0"/>
+              </a:rPr>
+            </a:br>
+            <a:r>
+              <a:rPr lang="sv-SE" sz="1000" dirty="0" smtClean="0">
+                <a:latin typeface="Courier New" panose="02070309020205020404" pitchFamily="49" charset="0"/>
+                <a:cs typeface="Courier New" panose="02070309020205020404" pitchFamily="49" charset="0"/>
+              </a:rPr>
+              <a:t>} </a:t>
+            </a:r>
+            <a:r>
+              <a:rPr lang="sv-SE" sz="1000" dirty="0">
+                <a:latin typeface="Courier New" panose="02070309020205020404" pitchFamily="49" charset="0"/>
+                <a:cs typeface="Courier New" panose="02070309020205020404" pitchFamily="49" charset="0"/>
+              </a:rPr>
+              <a:t>__</a:t>
+            </a:r>
+            <a:r>
+              <a:rPr lang="sv-SE" sz="1000" dirty="0" err="1">
+                <a:latin typeface="Courier New" panose="02070309020205020404" pitchFamily="49" charset="0"/>
+                <a:cs typeface="Courier New" panose="02070309020205020404" pitchFamily="49" charset="0"/>
+              </a:rPr>
+              <a:t>attribute</a:t>
+            </a:r>
+            <a:r>
+              <a:rPr lang="sv-SE" sz="1000" dirty="0">
+                <a:latin typeface="Courier New" panose="02070309020205020404" pitchFamily="49" charset="0"/>
+                <a:cs typeface="Courier New" panose="02070309020205020404" pitchFamily="49" charset="0"/>
+              </a:rPr>
+              <a:t>__ ((</a:t>
+            </a:r>
+            <a:r>
+              <a:rPr lang="sv-SE" sz="1000" dirty="0" err="1">
+                <a:latin typeface="Courier New" panose="02070309020205020404" pitchFamily="49" charset="0"/>
+                <a:cs typeface="Courier New" panose="02070309020205020404" pitchFamily="49" charset="0"/>
+              </a:rPr>
+              <a:t>packed</a:t>
+            </a:r>
+            <a:r>
+              <a:rPr lang="sv-SE" sz="1000" dirty="0">
+                <a:latin typeface="Courier New" panose="02070309020205020404" pitchFamily="49" charset="0"/>
+                <a:cs typeface="Courier New" panose="02070309020205020404" pitchFamily="49" charset="0"/>
+              </a:rPr>
+              <a:t>)) </a:t>
+            </a:r>
+            <a:r>
+              <a:rPr lang="sv-SE" sz="1000" dirty="0" smtClean="0">
+                <a:latin typeface="Courier New" panose="02070309020205020404" pitchFamily="49" charset="0"/>
+                <a:cs typeface="Courier New" panose="02070309020205020404" pitchFamily="49" charset="0"/>
+              </a:rPr>
+              <a:t>Property;</a:t>
+            </a:r>
+            <a:br>
+              <a:rPr lang="sv-SE" sz="1000" dirty="0" smtClean="0">
+                <a:latin typeface="Courier New" panose="02070309020205020404" pitchFamily="49" charset="0"/>
+                <a:cs typeface="Courier New" panose="02070309020205020404" pitchFamily="49" charset="0"/>
+              </a:rPr>
+            </a:br>
+            <a:r>
+              <a:rPr lang="sv-SE" sz="1000" dirty="0" err="1" smtClean="0">
+                <a:latin typeface="Courier New" panose="02070309020205020404" pitchFamily="49" charset="0"/>
+                <a:cs typeface="Courier New" panose="02070309020205020404" pitchFamily="49" charset="0"/>
+              </a:rPr>
+              <a:t>typedef</a:t>
+            </a:r>
+            <a:r>
+              <a:rPr lang="sv-SE" sz="1000" dirty="0" smtClean="0">
+                <a:latin typeface="Courier New" panose="02070309020205020404" pitchFamily="49" charset="0"/>
+                <a:cs typeface="Courier New" panose="02070309020205020404" pitchFamily="49" charset="0"/>
+              </a:rPr>
+              <a:t> </a:t>
+            </a:r>
+            <a:r>
+              <a:rPr lang="sv-SE" sz="1000" u="sng" dirty="0" err="1">
+                <a:latin typeface="Courier New" panose="02070309020205020404" pitchFamily="49" charset="0"/>
+                <a:cs typeface="Courier New" panose="02070309020205020404" pitchFamily="49" charset="0"/>
+              </a:rPr>
+              <a:t>struct</a:t>
+            </a:r>
+            <a:r>
+              <a:rPr lang="sv-SE" sz="1000" u="sng" dirty="0">
+                <a:latin typeface="Courier New" panose="02070309020205020404" pitchFamily="49" charset="0"/>
+                <a:cs typeface="Courier New" panose="02070309020205020404" pitchFamily="49" charset="0"/>
+              </a:rPr>
+              <a:t> </a:t>
+            </a:r>
+            <a:r>
+              <a:rPr lang="sv-SE" sz="1000" u="sng" dirty="0" smtClean="0">
+                <a:latin typeface="Courier New" panose="02070309020205020404" pitchFamily="49" charset="0"/>
+                <a:cs typeface="Courier New" panose="02070309020205020404" pitchFamily="49" charset="0"/>
+              </a:rPr>
+              <a:t>{</a:t>
+            </a:r>
+            <a:r>
+              <a:rPr lang="sv-SE" sz="1000" dirty="0" smtClean="0">
+                <a:latin typeface="Courier New" panose="02070309020205020404" pitchFamily="49" charset="0"/>
+                <a:cs typeface="Courier New" panose="02070309020205020404" pitchFamily="49" charset="0"/>
+              </a:rPr>
+              <a:t/>
+            </a:r>
+            <a:br>
+              <a:rPr lang="sv-SE" sz="1000" dirty="0" smtClean="0">
+                <a:latin typeface="Courier New" panose="02070309020205020404" pitchFamily="49" charset="0"/>
+                <a:cs typeface="Courier New" panose="02070309020205020404" pitchFamily="49" charset="0"/>
+              </a:rPr>
+            </a:br>
+            <a:r>
+              <a:rPr lang="sv-SE" sz="1000" dirty="0" smtClean="0">
+                <a:latin typeface="Courier New" panose="02070309020205020404" pitchFamily="49" charset="0"/>
+                <a:cs typeface="Courier New" panose="02070309020205020404" pitchFamily="49" charset="0"/>
+              </a:rPr>
+              <a:t>	float4 </a:t>
+            </a:r>
+            <a:r>
+              <a:rPr lang="sv-SE" sz="1000" dirty="0" err="1" smtClean="0">
+                <a:latin typeface="Courier New" panose="02070309020205020404" pitchFamily="49" charset="0"/>
+                <a:cs typeface="Courier New" panose="02070309020205020404" pitchFamily="49" charset="0"/>
+              </a:rPr>
+              <a:t>gravity</a:t>
+            </a:r>
+            <a:r>
+              <a:rPr lang="sv-SE" sz="1000" dirty="0" smtClean="0">
+                <a:latin typeface="Courier New" panose="02070309020205020404" pitchFamily="49" charset="0"/>
+                <a:cs typeface="Courier New" panose="02070309020205020404" pitchFamily="49" charset="0"/>
+              </a:rPr>
+              <a:t>;</a:t>
+            </a:r>
+            <a:br>
+              <a:rPr lang="sv-SE" sz="1000" dirty="0" smtClean="0">
+                <a:latin typeface="Courier New" panose="02070309020205020404" pitchFamily="49" charset="0"/>
+                <a:cs typeface="Courier New" panose="02070309020205020404" pitchFamily="49" charset="0"/>
+              </a:rPr>
+            </a:br>
+            <a:r>
+              <a:rPr lang="sv-SE" sz="1000" dirty="0" smtClean="0">
+                <a:latin typeface="Courier New" panose="02070309020205020404" pitchFamily="49" charset="0"/>
+                <a:cs typeface="Courier New" panose="02070309020205020404" pitchFamily="49" charset="0"/>
+              </a:rPr>
+              <a:t>	float4 </a:t>
+            </a:r>
+            <a:r>
+              <a:rPr lang="sv-SE" sz="1000" dirty="0" err="1" smtClean="0">
+                <a:latin typeface="Courier New" panose="02070309020205020404" pitchFamily="49" charset="0"/>
+                <a:cs typeface="Courier New" panose="02070309020205020404" pitchFamily="49" charset="0"/>
+              </a:rPr>
+              <a:t>deltaTime</a:t>
+            </a:r>
+            <a:r>
+              <a:rPr lang="sv-SE" sz="1000" dirty="0" smtClean="0">
+                <a:latin typeface="Courier New" panose="02070309020205020404" pitchFamily="49" charset="0"/>
+                <a:cs typeface="Courier New" panose="02070309020205020404" pitchFamily="49" charset="0"/>
+              </a:rPr>
+              <a:t>;</a:t>
+            </a:r>
+            <a:br>
+              <a:rPr lang="sv-SE" sz="1000" dirty="0" smtClean="0">
+                <a:latin typeface="Courier New" panose="02070309020205020404" pitchFamily="49" charset="0"/>
+                <a:cs typeface="Courier New" panose="02070309020205020404" pitchFamily="49" charset="0"/>
+              </a:rPr>
+            </a:br>
+            <a:r>
+              <a:rPr lang="sv-SE" sz="1000" dirty="0" smtClean="0">
                 <a:latin typeface="Courier New" panose="02070309020205020404" pitchFamily="49" charset="0"/>
                 <a:cs typeface="Courier New" panose="02070309020205020404" pitchFamily="49" charset="0"/>
               </a:rPr>
               <a:t>	</a:t>
             </a:r>
             <a:r>
-              <a:rPr lang="sv-SE" sz="1200" dirty="0" err="1" smtClean="0">
-                <a:latin typeface="Courier New" panose="02070309020205020404" pitchFamily="49" charset="0"/>
-                <a:cs typeface="Courier New" panose="02070309020205020404" pitchFamily="49" charset="0"/>
-              </a:rPr>
-              <a:t>kernel</a:t>
-            </a:r>
-            <a:r>
-              <a:rPr lang="sv-SE" sz="1200" dirty="0" smtClean="0">
+              <a:rPr lang="sv-SE" sz="1000" dirty="0" err="1" smtClean="0">
+                <a:latin typeface="Courier New" panose="02070309020205020404" pitchFamily="49" charset="0"/>
+                <a:cs typeface="Courier New" panose="02070309020205020404" pitchFamily="49" charset="0"/>
+              </a:rPr>
+              <a:t>Boundingbox</a:t>
+            </a:r>
+            <a:r>
+              <a:rPr lang="sv-SE" sz="1000" dirty="0" smtClean="0">
                 <a:latin typeface="Courier New" panose="02070309020205020404" pitchFamily="49" charset="0"/>
                 <a:cs typeface="Courier New" panose="02070309020205020404" pitchFamily="49" charset="0"/>
               </a:rPr>
               <a:t> </a:t>
             </a:r>
             <a:r>
-              <a:rPr lang="sv-SE" sz="1200" dirty="0" err="1">
-                <a:latin typeface="Courier New" panose="02070309020205020404" pitchFamily="49" charset="0"/>
-                <a:cs typeface="Courier New" panose="02070309020205020404" pitchFamily="49" charset="0"/>
-              </a:rPr>
-              <a:t>void</a:t>
-            </a:r>
-            <a:r>
-              <a:rPr lang="sv-SE" sz="1200" dirty="0">
-                <a:latin typeface="Courier New" panose="02070309020205020404" pitchFamily="49" charset="0"/>
-                <a:cs typeface="Courier New" panose="02070309020205020404" pitchFamily="49" charset="0"/>
-              </a:rPr>
-              <a:t> </a:t>
-            </a:r>
-            <a:r>
-              <a:rPr lang="sv-SE" sz="1200" dirty="0" err="1">
-                <a:latin typeface="Courier New" panose="02070309020205020404" pitchFamily="49" charset="0"/>
-                <a:cs typeface="Courier New" panose="02070309020205020404" pitchFamily="49" charset="0"/>
-              </a:rPr>
-              <a:t>PhysicsSprite</a:t>
-            </a:r>
-            <a:r>
-              <a:rPr lang="sv-SE" sz="1200" dirty="0">
-                <a:latin typeface="Courier New" panose="02070309020205020404" pitchFamily="49" charset="0"/>
-                <a:cs typeface="Courier New" panose="02070309020205020404" pitchFamily="49" charset="0"/>
-              </a:rPr>
-              <a:t>(global Sprite* </a:t>
-            </a:r>
-            <a:r>
-              <a:rPr lang="sv-SE" sz="1200" dirty="0" err="1">
-                <a:latin typeface="Courier New" panose="02070309020205020404" pitchFamily="49" charset="0"/>
-                <a:cs typeface="Courier New" panose="02070309020205020404" pitchFamily="49" charset="0"/>
-              </a:rPr>
-              <a:t>sprite,global</a:t>
-            </a:r>
-            <a:r>
-              <a:rPr lang="sv-SE" sz="1200" dirty="0">
-                <a:latin typeface="Courier New" panose="02070309020205020404" pitchFamily="49" charset="0"/>
-                <a:cs typeface="Courier New" panose="02070309020205020404" pitchFamily="49" charset="0"/>
-              </a:rPr>
-              <a:t> </a:t>
-            </a:r>
-            <a:r>
-              <a:rPr lang="sv-SE" sz="1200" u="sng" dirty="0" err="1">
-                <a:latin typeface="Courier New" panose="02070309020205020404" pitchFamily="49" charset="0"/>
-                <a:cs typeface="Courier New" panose="02070309020205020404" pitchFamily="49" charset="0"/>
-              </a:rPr>
-              <a:t>const</a:t>
-            </a:r>
-            <a:r>
-              <a:rPr lang="sv-SE" sz="1200" u="sng" dirty="0">
-                <a:latin typeface="Courier New" panose="02070309020205020404" pitchFamily="49" charset="0"/>
-                <a:cs typeface="Courier New" panose="02070309020205020404" pitchFamily="49" charset="0"/>
-              </a:rPr>
-              <a:t> Property* </a:t>
-            </a:r>
-            <a:r>
-              <a:rPr lang="sv-SE" sz="1200" u="sng" dirty="0" err="1">
-                <a:latin typeface="Courier New" panose="02070309020205020404" pitchFamily="49" charset="0"/>
-                <a:cs typeface="Courier New" panose="02070309020205020404" pitchFamily="49" charset="0"/>
-              </a:rPr>
-              <a:t>property</a:t>
-            </a:r>
-            <a:r>
-              <a:rPr lang="sv-SE" sz="1200" u="sng" dirty="0">
-                <a:latin typeface="Courier New" panose="02070309020205020404" pitchFamily="49" charset="0"/>
-                <a:cs typeface="Courier New" panose="02070309020205020404" pitchFamily="49" charset="0"/>
-              </a:rPr>
-              <a:t>, </a:t>
-            </a:r>
-            <a:r>
-              <a:rPr lang="sv-SE" sz="1200" u="sng" dirty="0" smtClean="0">
-                <a:latin typeface="Courier New" panose="02070309020205020404" pitchFamily="49" charset="0"/>
-                <a:cs typeface="Courier New" panose="02070309020205020404" pitchFamily="49" charset="0"/>
-              </a:rPr>
-              <a:t>		</a:t>
-            </a:r>
-            <a:r>
-              <a:rPr lang="sv-SE" sz="1200" u="sng" dirty="0" err="1" smtClean="0">
-                <a:latin typeface="Courier New" panose="02070309020205020404" pitchFamily="49" charset="0"/>
-                <a:cs typeface="Courier New" panose="02070309020205020404" pitchFamily="49" charset="0"/>
-              </a:rPr>
-              <a:t>constant</a:t>
-            </a:r>
-            <a:r>
-              <a:rPr lang="sv-SE" sz="1200" u="sng" dirty="0" smtClean="0">
-                <a:latin typeface="Courier New" panose="02070309020205020404" pitchFamily="49" charset="0"/>
-                <a:cs typeface="Courier New" panose="02070309020205020404" pitchFamily="49" charset="0"/>
-              </a:rPr>
-              <a:t> </a:t>
-            </a:r>
-            <a:r>
-              <a:rPr lang="sv-SE" sz="1200" u="sng" dirty="0" err="1">
-                <a:latin typeface="Courier New" panose="02070309020205020404" pitchFamily="49" charset="0"/>
-                <a:cs typeface="Courier New" panose="02070309020205020404" pitchFamily="49" charset="0"/>
-              </a:rPr>
-              <a:t>const</a:t>
-            </a:r>
-            <a:r>
-              <a:rPr lang="sv-SE" sz="1200" u="sng" dirty="0">
-                <a:latin typeface="Courier New" panose="02070309020205020404" pitchFamily="49" charset="0"/>
-                <a:cs typeface="Courier New" panose="02070309020205020404" pitchFamily="49" charset="0"/>
-              </a:rPr>
-              <a:t> Globals* globals , </a:t>
-            </a:r>
-            <a:r>
-              <a:rPr lang="sv-SE" sz="1200" u="sng" dirty="0" err="1">
-                <a:latin typeface="Courier New" panose="02070309020205020404" pitchFamily="49" charset="0"/>
-                <a:cs typeface="Courier New" panose="02070309020205020404" pitchFamily="49" charset="0"/>
-              </a:rPr>
-              <a:t>int</a:t>
-            </a:r>
-            <a:r>
-              <a:rPr lang="sv-SE" sz="1200" u="sng" dirty="0">
-                <a:latin typeface="Courier New" panose="02070309020205020404" pitchFamily="49" charset="0"/>
-                <a:cs typeface="Courier New" panose="02070309020205020404" pitchFamily="49" charset="0"/>
-              </a:rPr>
-              <a:t> </a:t>
-            </a:r>
-            <a:r>
-              <a:rPr lang="sv-SE" sz="1200" u="sng" dirty="0" err="1">
-                <a:latin typeface="Courier New" panose="02070309020205020404" pitchFamily="49" charset="0"/>
-                <a:cs typeface="Courier New" panose="02070309020205020404" pitchFamily="49" charset="0"/>
-              </a:rPr>
-              <a:t>numElements</a:t>
-            </a:r>
-            <a:r>
-              <a:rPr lang="sv-SE" sz="1200" u="sng" dirty="0">
-                <a:latin typeface="Courier New" panose="02070309020205020404" pitchFamily="49" charset="0"/>
-                <a:cs typeface="Courier New" panose="02070309020205020404" pitchFamily="49" charset="0"/>
-              </a:rPr>
-              <a:t>) </a:t>
-            </a:r>
-            <a:r>
-              <a:rPr lang="sv-SE" sz="1200" u="sng" dirty="0" smtClean="0">
-                <a:latin typeface="Courier New" panose="02070309020205020404" pitchFamily="49" charset="0"/>
-                <a:cs typeface="Courier New" panose="02070309020205020404" pitchFamily="49" charset="0"/>
-              </a:rPr>
-              <a:t>{</a:t>
-            </a:r>
-            <a:endParaRPr lang="sv-SE" sz="1200" dirty="0">
-              <a:latin typeface="Courier New" panose="02070309020205020404" pitchFamily="49" charset="0"/>
-              <a:cs typeface="Courier New" panose="02070309020205020404" pitchFamily="49" charset="0"/>
-            </a:endParaRPr>
-          </a:p>
-          <a:p>
-            <a:pPr marL="0" indent="0">
-              <a:buNone/>
-            </a:pPr>
-            <a:r>
-              <a:rPr lang="en-US" sz="1200" dirty="0">
-                <a:latin typeface="Courier New" panose="02070309020205020404" pitchFamily="49" charset="0"/>
-                <a:cs typeface="Courier New" panose="02070309020205020404" pitchFamily="49" charset="0"/>
-              </a:rPr>
-              <a:t>        // get index into global data </a:t>
-            </a:r>
-            <a:r>
-              <a:rPr lang="en-US" sz="1200" dirty="0" smtClean="0">
-                <a:latin typeface="Courier New" panose="02070309020205020404" pitchFamily="49" charset="0"/>
-                <a:cs typeface="Courier New" panose="02070309020205020404" pitchFamily="49" charset="0"/>
-              </a:rPr>
-              <a:t>array</a:t>
+              <a:rPr lang="sv-SE" sz="1000" dirty="0" err="1">
+                <a:latin typeface="Courier New" panose="02070309020205020404" pitchFamily="49" charset="0"/>
+                <a:cs typeface="Courier New" panose="02070309020205020404" pitchFamily="49" charset="0"/>
+              </a:rPr>
+              <a:t>bounding</a:t>
+            </a:r>
+            <a:r>
+              <a:rPr lang="sv-SE" sz="1000" dirty="0" smtClean="0">
+                <a:latin typeface="Courier New" panose="02070309020205020404" pitchFamily="49" charset="0"/>
+                <a:cs typeface="Courier New" panose="02070309020205020404" pitchFamily="49" charset="0"/>
+              </a:rPr>
+              <a:t>;</a:t>
             </a:r>
             <a:br>
-              <a:rPr lang="en-US" sz="1200" dirty="0" smtClean="0">
+              <a:rPr lang="sv-SE" sz="1000" dirty="0" smtClean="0">
                 <a:latin typeface="Courier New" panose="02070309020205020404" pitchFamily="49" charset="0"/>
                 <a:cs typeface="Courier New" panose="02070309020205020404" pitchFamily="49" charset="0"/>
               </a:rPr>
             </a:br>
             <a:r>
-              <a:rPr lang="sv-SE" sz="1200" dirty="0" smtClean="0">
-                <a:latin typeface="Courier New" panose="02070309020205020404" pitchFamily="49" charset="0"/>
-                <a:cs typeface="Courier New" panose="02070309020205020404" pitchFamily="49" charset="0"/>
-              </a:rPr>
-              <a:t>        </a:t>
-            </a:r>
-            <a:r>
-              <a:rPr lang="sv-SE" sz="1200" u="sng" dirty="0" err="1">
-                <a:latin typeface="Courier New" panose="02070309020205020404" pitchFamily="49" charset="0"/>
-                <a:cs typeface="Courier New" panose="02070309020205020404" pitchFamily="49" charset="0"/>
-              </a:rPr>
-              <a:t>int</a:t>
-            </a:r>
-            <a:r>
-              <a:rPr lang="sv-SE" sz="1200" u="sng" dirty="0">
-                <a:latin typeface="Courier New" panose="02070309020205020404" pitchFamily="49" charset="0"/>
-                <a:cs typeface="Courier New" panose="02070309020205020404" pitchFamily="49" charset="0"/>
-              </a:rPr>
-              <a:t> index = </a:t>
-            </a:r>
-            <a:r>
-              <a:rPr lang="sv-SE" sz="1200" u="sng" dirty="0" err="1">
-                <a:latin typeface="Courier New" panose="02070309020205020404" pitchFamily="49" charset="0"/>
-                <a:cs typeface="Courier New" panose="02070309020205020404" pitchFamily="49" charset="0"/>
-              </a:rPr>
-              <a:t>get_global_id</a:t>
-            </a:r>
-            <a:r>
-              <a:rPr lang="sv-SE" sz="1200" u="sng" dirty="0">
-                <a:latin typeface="Courier New" panose="02070309020205020404" pitchFamily="49" charset="0"/>
-                <a:cs typeface="Courier New" panose="02070309020205020404" pitchFamily="49" charset="0"/>
-              </a:rPr>
-              <a:t>(0</a:t>
-            </a:r>
-            <a:r>
-              <a:rPr lang="sv-SE" sz="1200" u="sng" dirty="0" smtClean="0">
-                <a:latin typeface="Courier New" panose="02070309020205020404" pitchFamily="49" charset="0"/>
-                <a:cs typeface="Courier New" panose="02070309020205020404" pitchFamily="49" charset="0"/>
-              </a:rPr>
-              <a:t>);</a:t>
-            </a:r>
-            <a:br>
-              <a:rPr lang="sv-SE" sz="1200" u="sng" dirty="0" smtClean="0">
-                <a:latin typeface="Courier New" panose="02070309020205020404" pitchFamily="49" charset="0"/>
-                <a:cs typeface="Courier New" panose="02070309020205020404" pitchFamily="49" charset="0"/>
-              </a:rPr>
-            </a:br>
-            <a:r>
-              <a:rPr lang="en-US" sz="1200" dirty="0" smtClean="0">
-                <a:latin typeface="Courier New" panose="02070309020205020404" pitchFamily="49" charset="0"/>
-                <a:cs typeface="Courier New" panose="02070309020205020404" pitchFamily="49" charset="0"/>
-              </a:rPr>
-              <a:t>        </a:t>
-            </a:r>
-            <a:r>
-              <a:rPr lang="en-US" sz="1200" dirty="0">
-                <a:latin typeface="Courier New" panose="02070309020205020404" pitchFamily="49" charset="0"/>
-                <a:cs typeface="Courier New" panose="02070309020205020404" pitchFamily="49" charset="0"/>
-              </a:rPr>
-              <a:t>// bound check, equivalent to the limit on a 'for' </a:t>
-            </a:r>
-            <a:r>
-              <a:rPr lang="en-US" sz="1200" dirty="0" smtClean="0">
-                <a:latin typeface="Courier New" panose="02070309020205020404" pitchFamily="49" charset="0"/>
-                <a:cs typeface="Courier New" panose="02070309020205020404" pitchFamily="49" charset="0"/>
-              </a:rPr>
-              <a:t>loop</a:t>
-            </a:r>
-            <a:br>
-              <a:rPr lang="en-US" sz="1200" dirty="0" smtClean="0">
-                <a:latin typeface="Courier New" panose="02070309020205020404" pitchFamily="49" charset="0"/>
-                <a:cs typeface="Courier New" panose="02070309020205020404" pitchFamily="49" charset="0"/>
-              </a:rPr>
-            </a:br>
-            <a:r>
-              <a:rPr lang="sv-SE" sz="1200" dirty="0" smtClean="0">
-                <a:latin typeface="Courier New" panose="02070309020205020404" pitchFamily="49" charset="0"/>
-                <a:cs typeface="Courier New" panose="02070309020205020404" pitchFamily="49" charset="0"/>
-              </a:rPr>
-              <a:t>        </a:t>
-            </a:r>
-            <a:r>
-              <a:rPr lang="sv-SE" sz="1200" dirty="0" err="1">
-                <a:latin typeface="Courier New" panose="02070309020205020404" pitchFamily="49" charset="0"/>
-                <a:cs typeface="Courier New" panose="02070309020205020404" pitchFamily="49" charset="0"/>
-              </a:rPr>
-              <a:t>if</a:t>
-            </a:r>
-            <a:r>
-              <a:rPr lang="sv-SE" sz="1200" dirty="0">
-                <a:latin typeface="Courier New" panose="02070309020205020404" pitchFamily="49" charset="0"/>
-                <a:cs typeface="Courier New" panose="02070309020205020404" pitchFamily="49" charset="0"/>
-              </a:rPr>
-              <a:t> (index &gt;= </a:t>
-            </a:r>
-            <a:r>
-              <a:rPr lang="sv-SE" sz="1200" dirty="0" err="1">
-                <a:latin typeface="Courier New" panose="02070309020205020404" pitchFamily="49" charset="0"/>
-                <a:cs typeface="Courier New" panose="02070309020205020404" pitchFamily="49" charset="0"/>
-              </a:rPr>
-              <a:t>numElements</a:t>
-            </a:r>
-            <a:r>
-              <a:rPr lang="sv-SE" sz="1200" dirty="0">
-                <a:latin typeface="Courier New" panose="02070309020205020404" pitchFamily="49" charset="0"/>
-                <a:cs typeface="Courier New" panose="02070309020205020404" pitchFamily="49" charset="0"/>
-              </a:rPr>
-              <a:t>)  </a:t>
-            </a:r>
-            <a:r>
-              <a:rPr lang="sv-SE" sz="1200" dirty="0" smtClean="0">
-                <a:latin typeface="Courier New" panose="02070309020205020404" pitchFamily="49" charset="0"/>
-                <a:cs typeface="Courier New" panose="02070309020205020404" pitchFamily="49" charset="0"/>
-              </a:rPr>
-              <a:t>{</a:t>
-            </a:r>
-            <a:r>
-              <a:rPr lang="sv-SE" sz="1200" dirty="0" err="1" smtClean="0">
-                <a:latin typeface="Courier New" panose="02070309020205020404" pitchFamily="49" charset="0"/>
-                <a:cs typeface="Courier New" panose="02070309020205020404" pitchFamily="49" charset="0"/>
-              </a:rPr>
-              <a:t>return</a:t>
-            </a:r>
-            <a:r>
-              <a:rPr lang="sv-SE" sz="1200" dirty="0" smtClean="0">
-                <a:latin typeface="Courier New" panose="02070309020205020404" pitchFamily="49" charset="0"/>
-                <a:cs typeface="Courier New" panose="02070309020205020404" pitchFamily="49" charset="0"/>
-              </a:rPr>
-              <a:t>;}</a:t>
-            </a:r>
-            <a:endParaRPr lang="sv-SE" sz="1200" dirty="0">
-              <a:latin typeface="Courier New" panose="02070309020205020404" pitchFamily="49" charset="0"/>
-              <a:cs typeface="Courier New" panose="02070309020205020404" pitchFamily="49" charset="0"/>
-            </a:endParaRPr>
-          </a:p>
-          <a:p>
-            <a:pPr marL="0" indent="0">
-              <a:buNone/>
-            </a:pPr>
-            <a:r>
-              <a:rPr lang="sv-SE" sz="1200" dirty="0" smtClean="0">
-                <a:latin typeface="Courier New" panose="02070309020205020404" pitchFamily="49" charset="0"/>
-                <a:cs typeface="Courier New" panose="02070309020205020404" pitchFamily="49" charset="0"/>
-              </a:rPr>
-              <a:t>	sprite[index</a:t>
-            </a:r>
-            <a:r>
-              <a:rPr lang="sv-SE" sz="1200" dirty="0">
-                <a:latin typeface="Courier New" panose="02070309020205020404" pitchFamily="49" charset="0"/>
-                <a:cs typeface="Courier New" panose="02070309020205020404" pitchFamily="49" charset="0"/>
-              </a:rPr>
-              <a:t>].</a:t>
-            </a:r>
-            <a:r>
-              <a:rPr lang="sv-SE" sz="1200" dirty="0" err="1">
-                <a:latin typeface="Courier New" panose="02070309020205020404" pitchFamily="49" charset="0"/>
-                <a:cs typeface="Courier New" panose="02070309020205020404" pitchFamily="49" charset="0"/>
-              </a:rPr>
-              <a:t>velocity</a:t>
-            </a:r>
-            <a:r>
-              <a:rPr lang="sv-SE" sz="1200" dirty="0">
-                <a:latin typeface="Courier New" panose="02070309020205020404" pitchFamily="49" charset="0"/>
-                <a:cs typeface="Courier New" panose="02070309020205020404" pitchFamily="49" charset="0"/>
-              </a:rPr>
-              <a:t> += globals[0].</a:t>
-            </a:r>
-            <a:r>
-              <a:rPr lang="sv-SE" sz="1200" dirty="0" err="1">
-                <a:latin typeface="Courier New" panose="02070309020205020404" pitchFamily="49" charset="0"/>
-                <a:cs typeface="Courier New" panose="02070309020205020404" pitchFamily="49" charset="0"/>
-              </a:rPr>
-              <a:t>gravity.xyzw</a:t>
-            </a:r>
-            <a:r>
-              <a:rPr lang="sv-SE" sz="1200" dirty="0">
-                <a:latin typeface="Courier New" panose="02070309020205020404" pitchFamily="49" charset="0"/>
-                <a:cs typeface="Courier New" panose="02070309020205020404" pitchFamily="49" charset="0"/>
-              </a:rPr>
-              <a:t> * globals[0].</a:t>
-            </a:r>
-            <a:r>
-              <a:rPr lang="sv-SE" sz="1200" dirty="0" err="1">
-                <a:latin typeface="Courier New" panose="02070309020205020404" pitchFamily="49" charset="0"/>
-                <a:cs typeface="Courier New" panose="02070309020205020404" pitchFamily="49" charset="0"/>
-              </a:rPr>
-              <a:t>deltaTime.x</a:t>
-            </a:r>
-            <a:r>
-              <a:rPr lang="sv-SE" sz="1200" dirty="0">
-                <a:latin typeface="Courier New" panose="02070309020205020404" pitchFamily="49" charset="0"/>
-                <a:cs typeface="Courier New" panose="02070309020205020404" pitchFamily="49" charset="0"/>
-              </a:rPr>
-              <a:t>; </a:t>
-            </a:r>
-            <a:r>
-              <a:rPr lang="sv-SE" sz="1200" dirty="0" smtClean="0">
-                <a:latin typeface="Courier New" panose="02070309020205020404" pitchFamily="49" charset="0"/>
-                <a:cs typeface="Courier New" panose="02070309020205020404" pitchFamily="49" charset="0"/>
-              </a:rPr>
-              <a:t>	sprite[index</a:t>
-            </a:r>
-            <a:r>
-              <a:rPr lang="sv-SE" sz="1200" dirty="0">
-                <a:latin typeface="Courier New" panose="02070309020205020404" pitchFamily="49" charset="0"/>
-                <a:cs typeface="Courier New" panose="02070309020205020404" pitchFamily="49" charset="0"/>
-              </a:rPr>
-              <a:t>].position += sprite[index].</a:t>
-            </a:r>
-            <a:r>
-              <a:rPr lang="sv-SE" sz="1200" dirty="0" err="1">
-                <a:latin typeface="Courier New" panose="02070309020205020404" pitchFamily="49" charset="0"/>
-                <a:cs typeface="Courier New" panose="02070309020205020404" pitchFamily="49" charset="0"/>
-              </a:rPr>
-              <a:t>velocity</a:t>
-            </a:r>
-            <a:r>
-              <a:rPr lang="sv-SE" sz="1200" dirty="0">
-                <a:latin typeface="Courier New" panose="02070309020205020404" pitchFamily="49" charset="0"/>
-                <a:cs typeface="Courier New" panose="02070309020205020404" pitchFamily="49" charset="0"/>
-              </a:rPr>
-              <a:t> * globals[0].</a:t>
-            </a:r>
-            <a:r>
-              <a:rPr lang="sv-SE" sz="1200" dirty="0" err="1">
-                <a:latin typeface="Courier New" panose="02070309020205020404" pitchFamily="49" charset="0"/>
-                <a:cs typeface="Courier New" panose="02070309020205020404" pitchFamily="49" charset="0"/>
-              </a:rPr>
-              <a:t>deltaTime.x</a:t>
-            </a:r>
-            <a:r>
-              <a:rPr lang="sv-SE" sz="1200" dirty="0" smtClean="0">
+              <a:rPr lang="sv-SE" sz="1000" dirty="0" smtClean="0">
+                <a:latin typeface="Courier New" panose="02070309020205020404" pitchFamily="49" charset="0"/>
+                <a:cs typeface="Courier New" panose="02070309020205020404" pitchFamily="49" charset="0"/>
+              </a:rPr>
+              <a:t>} </a:t>
+            </a:r>
+            <a:r>
+              <a:rPr lang="sv-SE" sz="1000" dirty="0">
+                <a:latin typeface="Courier New" panose="02070309020205020404" pitchFamily="49" charset="0"/>
+                <a:cs typeface="Courier New" panose="02070309020205020404" pitchFamily="49" charset="0"/>
+              </a:rPr>
+              <a:t>__</a:t>
+            </a:r>
+            <a:r>
+              <a:rPr lang="sv-SE" sz="1000" dirty="0" err="1">
+                <a:latin typeface="Courier New" panose="02070309020205020404" pitchFamily="49" charset="0"/>
+                <a:cs typeface="Courier New" panose="02070309020205020404" pitchFamily="49" charset="0"/>
+              </a:rPr>
+              <a:t>attribute</a:t>
+            </a:r>
+            <a:r>
+              <a:rPr lang="sv-SE" sz="1000" dirty="0">
+                <a:latin typeface="Courier New" panose="02070309020205020404" pitchFamily="49" charset="0"/>
+                <a:cs typeface="Courier New" panose="02070309020205020404" pitchFamily="49" charset="0"/>
+              </a:rPr>
+              <a:t>__ ((</a:t>
+            </a:r>
+            <a:r>
+              <a:rPr lang="sv-SE" sz="1000" dirty="0" err="1">
+                <a:latin typeface="Courier New" panose="02070309020205020404" pitchFamily="49" charset="0"/>
+                <a:cs typeface="Courier New" panose="02070309020205020404" pitchFamily="49" charset="0"/>
+              </a:rPr>
+              <a:t>packed</a:t>
+            </a:r>
+            <a:r>
+              <a:rPr lang="sv-SE" sz="1000" dirty="0">
+                <a:latin typeface="Courier New" panose="02070309020205020404" pitchFamily="49" charset="0"/>
+                <a:cs typeface="Courier New" panose="02070309020205020404" pitchFamily="49" charset="0"/>
+              </a:rPr>
+              <a:t>)) Globals</a:t>
+            </a:r>
+            <a:r>
+              <a:rPr lang="sv-SE" sz="1000" dirty="0" smtClean="0">
                 <a:latin typeface="Courier New" panose="02070309020205020404" pitchFamily="49" charset="0"/>
                 <a:cs typeface="Courier New" panose="02070309020205020404" pitchFamily="49" charset="0"/>
               </a:rPr>
               <a:t>;</a:t>
             </a:r>
-            <a:br>
-              <a:rPr lang="sv-SE" sz="1200" dirty="0" smtClean="0">
-                <a:latin typeface="Courier New" panose="02070309020205020404" pitchFamily="49" charset="0"/>
-                <a:cs typeface="Courier New" panose="02070309020205020404" pitchFamily="49" charset="0"/>
-              </a:rPr>
-            </a:br>
-            <a:r>
-              <a:rPr lang="sv-SE" sz="1200" dirty="0" smtClean="0">
-                <a:latin typeface="Courier New" panose="02070309020205020404" pitchFamily="49" charset="0"/>
-                <a:cs typeface="Courier New" panose="02070309020205020404" pitchFamily="49" charset="0"/>
-              </a:rPr>
-              <a:t>	//</a:t>
-            </a:r>
-            <a:r>
-              <a:rPr lang="sv-SE" sz="1200" dirty="0" err="1">
-                <a:latin typeface="Courier New" panose="02070309020205020404" pitchFamily="49" charset="0"/>
-                <a:cs typeface="Courier New" panose="02070309020205020404" pitchFamily="49" charset="0"/>
-              </a:rPr>
-              <a:t>Bottom</a:t>
-            </a:r>
-            <a:r>
-              <a:rPr lang="sv-SE" sz="1200" dirty="0">
-                <a:latin typeface="Courier New" panose="02070309020205020404" pitchFamily="49" charset="0"/>
-                <a:cs typeface="Courier New" panose="02070309020205020404" pitchFamily="49" charset="0"/>
-              </a:rPr>
-              <a:t> </a:t>
-            </a:r>
-            <a:r>
-              <a:rPr lang="sv-SE" sz="1200" dirty="0" smtClean="0">
-                <a:latin typeface="Courier New" panose="02070309020205020404" pitchFamily="49" charset="0"/>
-                <a:cs typeface="Courier New" panose="02070309020205020404" pitchFamily="49" charset="0"/>
-              </a:rPr>
-              <a:t>plane</a:t>
-            </a:r>
-            <a:br>
-              <a:rPr lang="sv-SE" sz="1200" dirty="0" smtClean="0">
-                <a:latin typeface="Courier New" panose="02070309020205020404" pitchFamily="49" charset="0"/>
-                <a:cs typeface="Courier New" panose="02070309020205020404" pitchFamily="49" charset="0"/>
-              </a:rPr>
-            </a:br>
-            <a:r>
-              <a:rPr lang="sv-SE" sz="1200" dirty="0" smtClean="0">
-                <a:latin typeface="Courier New" panose="02070309020205020404" pitchFamily="49" charset="0"/>
-                <a:cs typeface="Courier New" panose="02070309020205020404" pitchFamily="49" charset="0"/>
-              </a:rPr>
-              <a:t>	</a:t>
-            </a:r>
-            <a:r>
-              <a:rPr lang="sv-SE" sz="1200" dirty="0" err="1" smtClean="0">
-                <a:latin typeface="Courier New" panose="02070309020205020404" pitchFamily="49" charset="0"/>
-                <a:cs typeface="Courier New" panose="02070309020205020404" pitchFamily="49" charset="0"/>
-              </a:rPr>
-              <a:t>if</a:t>
-            </a:r>
-            <a:r>
-              <a:rPr lang="sv-SE" sz="1200" dirty="0" smtClean="0">
-                <a:latin typeface="Courier New" panose="02070309020205020404" pitchFamily="49" charset="0"/>
-                <a:cs typeface="Courier New" panose="02070309020205020404" pitchFamily="49" charset="0"/>
-              </a:rPr>
-              <a:t> </a:t>
-            </a:r>
-            <a:r>
-              <a:rPr lang="sv-SE" sz="1200" dirty="0">
-                <a:latin typeface="Courier New" panose="02070309020205020404" pitchFamily="49" charset="0"/>
-                <a:cs typeface="Courier New" panose="02070309020205020404" pitchFamily="49" charset="0"/>
-              </a:rPr>
-              <a:t>(</a:t>
-            </a:r>
-            <a:r>
-              <a:rPr lang="sv-SE" sz="1200" dirty="0" err="1">
-                <a:latin typeface="Courier New" panose="02070309020205020404" pitchFamily="49" charset="0"/>
-                <a:cs typeface="Courier New" panose="02070309020205020404" pitchFamily="49" charset="0"/>
-              </a:rPr>
-              <a:t>dot</a:t>
-            </a:r>
-            <a:r>
-              <a:rPr lang="sv-SE" sz="1200" dirty="0">
-                <a:latin typeface="Courier New" panose="02070309020205020404" pitchFamily="49" charset="0"/>
-                <a:cs typeface="Courier New" panose="02070309020205020404" pitchFamily="49" charset="0"/>
-              </a:rPr>
-              <a:t>(globals[0].</a:t>
-            </a:r>
-            <a:r>
-              <a:rPr lang="sv-SE" sz="1200" dirty="0" err="1">
-                <a:latin typeface="Courier New" panose="02070309020205020404" pitchFamily="49" charset="0"/>
-                <a:cs typeface="Courier New" panose="02070309020205020404" pitchFamily="49" charset="0"/>
-              </a:rPr>
-              <a:t>bounding.crossVectors</a:t>
-            </a:r>
-            <a:r>
-              <a:rPr lang="sv-SE" sz="1200" dirty="0">
-                <a:latin typeface="Courier New" panose="02070309020205020404" pitchFamily="49" charset="0"/>
-                <a:cs typeface="Courier New" panose="02070309020205020404" pitchFamily="49" charset="0"/>
-              </a:rPr>
-              <a:t>[0].</a:t>
-            </a:r>
-            <a:r>
-              <a:rPr lang="sv-SE" sz="1200" u="sng" dirty="0" err="1">
-                <a:latin typeface="Courier New" panose="02070309020205020404" pitchFamily="49" charset="0"/>
-                <a:cs typeface="Courier New" panose="02070309020205020404" pitchFamily="49" charset="0"/>
-              </a:rPr>
-              <a:t>xyz</a:t>
-            </a:r>
-            <a:r>
-              <a:rPr lang="sv-SE" sz="1200" u="sng" dirty="0">
-                <a:latin typeface="Courier New" panose="02070309020205020404" pitchFamily="49" charset="0"/>
-                <a:cs typeface="Courier New" panose="02070309020205020404" pitchFamily="49" charset="0"/>
-              </a:rPr>
-              <a:t>, (sprite[index].</a:t>
-            </a:r>
-            <a:r>
-              <a:rPr lang="sv-SE" sz="1200" u="sng" dirty="0" err="1">
-                <a:latin typeface="Courier New" panose="02070309020205020404" pitchFamily="49" charset="0"/>
-                <a:cs typeface="Courier New" panose="02070309020205020404" pitchFamily="49" charset="0"/>
-              </a:rPr>
-              <a:t>position.xyz</a:t>
-            </a:r>
-            <a:r>
-              <a:rPr lang="sv-SE" sz="1200" u="sng" dirty="0">
-                <a:latin typeface="Courier New" panose="02070309020205020404" pitchFamily="49" charset="0"/>
-                <a:cs typeface="Courier New" panose="02070309020205020404" pitchFamily="49" charset="0"/>
-              </a:rPr>
-              <a:t> - </a:t>
-            </a:r>
-            <a:r>
-              <a:rPr lang="sv-SE" sz="1200" u="sng" dirty="0" smtClean="0">
-                <a:latin typeface="Courier New" panose="02070309020205020404" pitchFamily="49" charset="0"/>
-                <a:cs typeface="Courier New" panose="02070309020205020404" pitchFamily="49" charset="0"/>
-              </a:rPr>
-              <a:t>		globals[0</a:t>
-            </a:r>
-            <a:r>
-              <a:rPr lang="sv-SE" sz="1200" u="sng" dirty="0">
-                <a:latin typeface="Courier New" panose="02070309020205020404" pitchFamily="49" charset="0"/>
-                <a:cs typeface="Courier New" panose="02070309020205020404" pitchFamily="49" charset="0"/>
-              </a:rPr>
-              <a:t>].</a:t>
-            </a:r>
-            <a:r>
-              <a:rPr lang="sv-SE" sz="1200" u="sng" dirty="0" err="1">
-                <a:latin typeface="Courier New" panose="02070309020205020404" pitchFamily="49" charset="0"/>
-                <a:cs typeface="Courier New" panose="02070309020205020404" pitchFamily="49" charset="0"/>
-              </a:rPr>
-              <a:t>bounding.vertices</a:t>
-            </a:r>
-            <a:r>
-              <a:rPr lang="sv-SE" sz="1200" u="sng" dirty="0">
-                <a:latin typeface="Courier New" panose="02070309020205020404" pitchFamily="49" charset="0"/>
-                <a:cs typeface="Courier New" panose="02070309020205020404" pitchFamily="49" charset="0"/>
-              </a:rPr>
-              <a:t>[0].</a:t>
-            </a:r>
-            <a:r>
-              <a:rPr lang="sv-SE" sz="1200" u="sng" dirty="0" err="1">
-                <a:latin typeface="Courier New" panose="02070309020205020404" pitchFamily="49" charset="0"/>
-                <a:cs typeface="Courier New" panose="02070309020205020404" pitchFamily="49" charset="0"/>
-              </a:rPr>
-              <a:t>xyz</a:t>
-            </a:r>
-            <a:r>
-              <a:rPr lang="sv-SE" sz="1200" u="sng" dirty="0">
-                <a:latin typeface="Courier New" panose="02070309020205020404" pitchFamily="49" charset="0"/>
-                <a:cs typeface="Courier New" panose="02070309020205020404" pitchFamily="49" charset="0"/>
-              </a:rPr>
-              <a:t>)) &gt; 0 ) </a:t>
-            </a:r>
-            <a:r>
-              <a:rPr lang="sv-SE" sz="1200" u="sng" dirty="0" smtClean="0">
-                <a:latin typeface="Courier New" panose="02070309020205020404" pitchFamily="49" charset="0"/>
-                <a:cs typeface="Courier New" panose="02070309020205020404" pitchFamily="49" charset="0"/>
-              </a:rPr>
-              <a:t>{</a:t>
-            </a:r>
-            <a:br>
-              <a:rPr lang="sv-SE" sz="1200" u="sng" dirty="0" smtClean="0">
-                <a:latin typeface="Courier New" panose="02070309020205020404" pitchFamily="49" charset="0"/>
-                <a:cs typeface="Courier New" panose="02070309020205020404" pitchFamily="49" charset="0"/>
-              </a:rPr>
-            </a:br>
-            <a:r>
-              <a:rPr lang="sv-SE" sz="1200" u="sng" dirty="0" smtClean="0">
-                <a:latin typeface="Courier New" panose="02070309020205020404" pitchFamily="49" charset="0"/>
-                <a:cs typeface="Courier New" panose="02070309020205020404" pitchFamily="49" charset="0"/>
-              </a:rPr>
-              <a:t>	</a:t>
-            </a:r>
-            <a:r>
-              <a:rPr lang="sv-SE" sz="1200" dirty="0" smtClean="0">
-                <a:latin typeface="Courier New" panose="02070309020205020404" pitchFamily="49" charset="0"/>
-                <a:cs typeface="Courier New" panose="02070309020205020404" pitchFamily="49" charset="0"/>
-              </a:rPr>
-              <a:t>sprite[index</a:t>
-            </a:r>
-            <a:r>
-              <a:rPr lang="sv-SE" sz="1200" dirty="0">
-                <a:latin typeface="Courier New" panose="02070309020205020404" pitchFamily="49" charset="0"/>
-                <a:cs typeface="Courier New" panose="02070309020205020404" pitchFamily="49" charset="0"/>
-              </a:rPr>
-              <a:t>].</a:t>
-            </a:r>
-            <a:r>
-              <a:rPr lang="sv-SE" sz="1200" dirty="0" err="1">
-                <a:latin typeface="Courier New" panose="02070309020205020404" pitchFamily="49" charset="0"/>
-                <a:cs typeface="Courier New" panose="02070309020205020404" pitchFamily="49" charset="0"/>
-              </a:rPr>
-              <a:t>position.y</a:t>
-            </a:r>
-            <a:r>
-              <a:rPr lang="sv-SE" sz="1200" dirty="0">
-                <a:latin typeface="Courier New" panose="02070309020205020404" pitchFamily="49" charset="0"/>
-                <a:cs typeface="Courier New" panose="02070309020205020404" pitchFamily="49" charset="0"/>
-              </a:rPr>
-              <a:t> += (globals[0].</a:t>
-            </a:r>
-            <a:r>
-              <a:rPr lang="sv-SE" sz="1200" dirty="0" err="1">
-                <a:latin typeface="Courier New" panose="02070309020205020404" pitchFamily="49" charset="0"/>
-                <a:cs typeface="Courier New" panose="02070309020205020404" pitchFamily="49" charset="0"/>
-              </a:rPr>
-              <a:t>bounding.vertices</a:t>
-            </a:r>
-            <a:r>
-              <a:rPr lang="sv-SE" sz="1200" dirty="0">
-                <a:latin typeface="Courier New" panose="02070309020205020404" pitchFamily="49" charset="0"/>
-                <a:cs typeface="Courier New" panose="02070309020205020404" pitchFamily="49" charset="0"/>
-              </a:rPr>
-              <a:t>[0].y - </a:t>
-            </a:r>
-            <a:r>
-              <a:rPr lang="sv-SE" sz="1200" dirty="0" smtClean="0">
-                <a:latin typeface="Courier New" panose="02070309020205020404" pitchFamily="49" charset="0"/>
-                <a:cs typeface="Courier New" panose="02070309020205020404" pitchFamily="49" charset="0"/>
-              </a:rPr>
-              <a:t>			  	sprite[index</a:t>
-            </a:r>
-            <a:r>
-              <a:rPr lang="sv-SE" sz="1200" dirty="0">
-                <a:latin typeface="Courier New" panose="02070309020205020404" pitchFamily="49" charset="0"/>
-                <a:cs typeface="Courier New" panose="02070309020205020404" pitchFamily="49" charset="0"/>
-              </a:rPr>
-              <a:t>].</a:t>
-            </a:r>
-            <a:r>
-              <a:rPr lang="sv-SE" sz="1200" dirty="0" err="1">
-                <a:latin typeface="Courier New" panose="02070309020205020404" pitchFamily="49" charset="0"/>
-                <a:cs typeface="Courier New" panose="02070309020205020404" pitchFamily="49" charset="0"/>
-              </a:rPr>
-              <a:t>position.y</a:t>
-            </a:r>
-            <a:r>
-              <a:rPr lang="sv-SE" sz="1200" dirty="0" smtClean="0">
-                <a:latin typeface="Courier New" panose="02070309020205020404" pitchFamily="49" charset="0"/>
-                <a:cs typeface="Courier New" panose="02070309020205020404" pitchFamily="49" charset="0"/>
-              </a:rPr>
-              <a:t>);</a:t>
-            </a:r>
-            <a:endParaRPr lang="sv-SE" sz="1200" dirty="0">
+            <a:endParaRPr lang="sv-SE" sz="1000" dirty="0">
               <a:latin typeface="Courier New" panose="02070309020205020404" pitchFamily="49" charset="0"/>
               <a:cs typeface="Courier New" panose="02070309020205020404" pitchFamily="49" charset="0"/>
             </a:endParaRPr>
@@ -11236,25 +11725,6 @@
       </p:sp>
       <p:sp>
         <p:nvSpPr>
-          <p:cNvPr id="3" name="Text Placeholder 2"/>
-          <p:cNvSpPr>
-            <a:spLocks noGrp="1"/>
-          </p:cNvSpPr>
-          <p:nvPr>
-            <p:ph type="body" idx="10"/>
-          </p:nvPr>
-        </p:nvSpPr>
-        <p:spPr/>
-        <p:txBody>
-          <a:bodyPr/>
-          <a:lstStyle/>
-          <a:p>
-            <a:endParaRPr lang="sv-SE"/>
-          </a:p>
-        </p:txBody>
-      </p:sp>
-      <p:sp>
-        <p:nvSpPr>
           <p:cNvPr id="4" name="Content Placeholder 3"/>
           <p:cNvSpPr>
             <a:spLocks noGrp="1"/>
@@ -11265,8 +11735,8 @@
         </p:nvSpPr>
         <p:spPr>
           <a:xfrm>
-            <a:off x="1460645" y="1450391"/>
-            <a:ext cx="7236000" cy="3276000"/>
+            <a:off x="1460645" y="950746"/>
+            <a:ext cx="7236000" cy="4074909"/>
           </a:xfrm>
         </p:spPr>
         <p:txBody>
@@ -11277,462 +11747,1230 @@
               <a:buNone/>
             </a:pPr>
             <a:r>
-              <a:rPr lang="sv-SE" sz="1200" dirty="0" smtClean="0">
+              <a:rPr lang="sv-SE" sz="1000" dirty="0" err="1">
+                <a:latin typeface="Courier New" panose="02070309020205020404" pitchFamily="49" charset="0"/>
+                <a:cs typeface="Courier New" panose="02070309020205020404" pitchFamily="49" charset="0"/>
+              </a:rPr>
+              <a:t>kernel</a:t>
+            </a:r>
+            <a:r>
+              <a:rPr lang="sv-SE" sz="1000" dirty="0">
+                <a:latin typeface="Courier New" panose="02070309020205020404" pitchFamily="49" charset="0"/>
+                <a:cs typeface="Courier New" panose="02070309020205020404" pitchFamily="49" charset="0"/>
+              </a:rPr>
+              <a:t> </a:t>
+            </a:r>
+            <a:r>
+              <a:rPr lang="sv-SE" sz="1000" dirty="0" err="1">
+                <a:latin typeface="Courier New" panose="02070309020205020404" pitchFamily="49" charset="0"/>
+                <a:cs typeface="Courier New" panose="02070309020205020404" pitchFamily="49" charset="0"/>
+              </a:rPr>
+              <a:t>void</a:t>
+            </a:r>
+            <a:r>
+              <a:rPr lang="sv-SE" sz="1000" dirty="0">
+                <a:latin typeface="Courier New" panose="02070309020205020404" pitchFamily="49" charset="0"/>
+                <a:cs typeface="Courier New" panose="02070309020205020404" pitchFamily="49" charset="0"/>
+              </a:rPr>
+              <a:t> </a:t>
+            </a:r>
+            <a:r>
+              <a:rPr lang="sv-SE" sz="1000" dirty="0" err="1">
+                <a:latin typeface="Courier New" panose="02070309020205020404" pitchFamily="49" charset="0"/>
+                <a:cs typeface="Courier New" panose="02070309020205020404" pitchFamily="49" charset="0"/>
+              </a:rPr>
+              <a:t>PhysicsSprite</a:t>
+            </a:r>
+            <a:r>
+              <a:rPr lang="sv-SE" sz="1000" dirty="0">
+                <a:latin typeface="Courier New" panose="02070309020205020404" pitchFamily="49" charset="0"/>
+                <a:cs typeface="Courier New" panose="02070309020205020404" pitchFamily="49" charset="0"/>
+              </a:rPr>
+              <a:t>(global Sprite* </a:t>
+            </a:r>
+            <a:r>
+              <a:rPr lang="sv-SE" sz="1000" dirty="0" err="1">
+                <a:latin typeface="Courier New" panose="02070309020205020404" pitchFamily="49" charset="0"/>
+                <a:cs typeface="Courier New" panose="02070309020205020404" pitchFamily="49" charset="0"/>
+              </a:rPr>
+              <a:t>sprite,global</a:t>
+            </a:r>
+            <a:r>
+              <a:rPr lang="sv-SE" sz="1000" dirty="0">
+                <a:latin typeface="Courier New" panose="02070309020205020404" pitchFamily="49" charset="0"/>
+                <a:cs typeface="Courier New" panose="02070309020205020404" pitchFamily="49" charset="0"/>
+              </a:rPr>
+              <a:t> </a:t>
+            </a:r>
+            <a:r>
+              <a:rPr lang="sv-SE" sz="1000" dirty="0" err="1">
+                <a:latin typeface="Courier New" panose="02070309020205020404" pitchFamily="49" charset="0"/>
+                <a:cs typeface="Courier New" panose="02070309020205020404" pitchFamily="49" charset="0"/>
+              </a:rPr>
+              <a:t>const</a:t>
+            </a:r>
+            <a:r>
+              <a:rPr lang="sv-SE" sz="1000" dirty="0">
+                <a:latin typeface="Courier New" panose="02070309020205020404" pitchFamily="49" charset="0"/>
+                <a:cs typeface="Courier New" panose="02070309020205020404" pitchFamily="49" charset="0"/>
+              </a:rPr>
+              <a:t> Property* </a:t>
+            </a:r>
+            <a:r>
+              <a:rPr lang="sv-SE" sz="1000" dirty="0" err="1">
+                <a:latin typeface="Courier New" panose="02070309020205020404" pitchFamily="49" charset="0"/>
+                <a:cs typeface="Courier New" panose="02070309020205020404" pitchFamily="49" charset="0"/>
+              </a:rPr>
+              <a:t>property</a:t>
+            </a:r>
+            <a:r>
+              <a:rPr lang="sv-SE" sz="1000" dirty="0">
+                <a:latin typeface="Courier New" panose="02070309020205020404" pitchFamily="49" charset="0"/>
+                <a:cs typeface="Courier New" panose="02070309020205020404" pitchFamily="49" charset="0"/>
+              </a:rPr>
+              <a:t>, </a:t>
+            </a:r>
+            <a:r>
+              <a:rPr lang="sv-SE" sz="1000" dirty="0" smtClean="0">
+                <a:latin typeface="Courier New" panose="02070309020205020404" pitchFamily="49" charset="0"/>
+                <a:cs typeface="Courier New" panose="02070309020205020404" pitchFamily="49" charset="0"/>
+              </a:rPr>
+              <a:t/>
+            </a:r>
+            <a:br>
+              <a:rPr lang="sv-SE" sz="1000" dirty="0" smtClean="0">
+                <a:latin typeface="Courier New" panose="02070309020205020404" pitchFamily="49" charset="0"/>
+                <a:cs typeface="Courier New" panose="02070309020205020404" pitchFamily="49" charset="0"/>
+              </a:rPr>
+            </a:br>
+            <a:r>
+              <a:rPr lang="sv-SE" sz="1000" dirty="0" smtClean="0">
+                <a:latin typeface="Courier New" panose="02070309020205020404" pitchFamily="49" charset="0"/>
+                <a:cs typeface="Courier New" panose="02070309020205020404" pitchFamily="49" charset="0"/>
+              </a:rPr>
+              <a:t>    </a:t>
+            </a:r>
+            <a:r>
+              <a:rPr lang="sv-SE" sz="1000" dirty="0" err="1" smtClean="0">
+                <a:latin typeface="Courier New" panose="02070309020205020404" pitchFamily="49" charset="0"/>
+                <a:cs typeface="Courier New" panose="02070309020205020404" pitchFamily="49" charset="0"/>
+              </a:rPr>
+              <a:t>constant</a:t>
+            </a:r>
+            <a:r>
+              <a:rPr lang="sv-SE" sz="1000" dirty="0" smtClean="0">
+                <a:latin typeface="Courier New" panose="02070309020205020404" pitchFamily="49" charset="0"/>
+                <a:cs typeface="Courier New" panose="02070309020205020404" pitchFamily="49" charset="0"/>
+              </a:rPr>
+              <a:t> </a:t>
+            </a:r>
+            <a:r>
+              <a:rPr lang="sv-SE" sz="1000" dirty="0" err="1">
+                <a:latin typeface="Courier New" panose="02070309020205020404" pitchFamily="49" charset="0"/>
+                <a:cs typeface="Courier New" panose="02070309020205020404" pitchFamily="49" charset="0"/>
+              </a:rPr>
+              <a:t>const</a:t>
+            </a:r>
+            <a:r>
+              <a:rPr lang="sv-SE" sz="1000" dirty="0">
+                <a:latin typeface="Courier New" panose="02070309020205020404" pitchFamily="49" charset="0"/>
+                <a:cs typeface="Courier New" panose="02070309020205020404" pitchFamily="49" charset="0"/>
+              </a:rPr>
+              <a:t> Globals* globals , </a:t>
+            </a:r>
+            <a:r>
+              <a:rPr lang="sv-SE" sz="1000" dirty="0" err="1">
+                <a:latin typeface="Courier New" panose="02070309020205020404" pitchFamily="49" charset="0"/>
+                <a:cs typeface="Courier New" panose="02070309020205020404" pitchFamily="49" charset="0"/>
+              </a:rPr>
+              <a:t>int</a:t>
+            </a:r>
+            <a:r>
+              <a:rPr lang="sv-SE" sz="1000" dirty="0">
+                <a:latin typeface="Courier New" panose="02070309020205020404" pitchFamily="49" charset="0"/>
+                <a:cs typeface="Courier New" panose="02070309020205020404" pitchFamily="49" charset="0"/>
+              </a:rPr>
+              <a:t> </a:t>
+            </a:r>
+            <a:r>
+              <a:rPr lang="sv-SE" sz="1000" dirty="0" err="1">
+                <a:latin typeface="Courier New" panose="02070309020205020404" pitchFamily="49" charset="0"/>
+                <a:cs typeface="Courier New" panose="02070309020205020404" pitchFamily="49" charset="0"/>
+              </a:rPr>
+              <a:t>numElements</a:t>
+            </a:r>
+            <a:r>
+              <a:rPr lang="sv-SE" sz="1000" dirty="0">
+                <a:latin typeface="Courier New" panose="02070309020205020404" pitchFamily="49" charset="0"/>
+                <a:cs typeface="Courier New" panose="02070309020205020404" pitchFamily="49" charset="0"/>
+              </a:rPr>
+              <a:t>) </a:t>
+            </a:r>
+            <a:r>
+              <a:rPr lang="sv-SE" sz="1000" dirty="0" smtClean="0">
+                <a:latin typeface="Courier New" panose="02070309020205020404" pitchFamily="49" charset="0"/>
+                <a:cs typeface="Courier New" panose="02070309020205020404" pitchFamily="49" charset="0"/>
+              </a:rPr>
+              <a:t>{</a:t>
+            </a:r>
+            <a:br>
+              <a:rPr lang="sv-SE" sz="1000" dirty="0" smtClean="0">
+                <a:latin typeface="Courier New" panose="02070309020205020404" pitchFamily="49" charset="0"/>
+                <a:cs typeface="Courier New" panose="02070309020205020404" pitchFamily="49" charset="0"/>
+              </a:rPr>
+            </a:br>
+            <a:r>
+              <a:rPr lang="sv-SE" sz="1000" dirty="0" smtClean="0">
+                <a:latin typeface="Courier New" panose="02070309020205020404" pitchFamily="49" charset="0"/>
+                <a:cs typeface="Courier New" panose="02070309020205020404" pitchFamily="49" charset="0"/>
+              </a:rPr>
+              <a:t>	</a:t>
+            </a:r>
+            <a:r>
+              <a:rPr lang="sv-SE" sz="1000" dirty="0" err="1" smtClean="0">
+                <a:latin typeface="Courier New" panose="02070309020205020404" pitchFamily="49" charset="0"/>
+                <a:cs typeface="Courier New" panose="02070309020205020404" pitchFamily="49" charset="0"/>
+              </a:rPr>
+              <a:t>int</a:t>
+            </a:r>
+            <a:r>
+              <a:rPr lang="sv-SE" sz="1000" dirty="0" smtClean="0">
+                <a:latin typeface="Courier New" panose="02070309020205020404" pitchFamily="49" charset="0"/>
+                <a:cs typeface="Courier New" panose="02070309020205020404" pitchFamily="49" charset="0"/>
+              </a:rPr>
+              <a:t> </a:t>
+            </a:r>
+            <a:r>
+              <a:rPr lang="sv-SE" sz="1000" dirty="0">
+                <a:latin typeface="Courier New" panose="02070309020205020404" pitchFamily="49" charset="0"/>
+                <a:cs typeface="Courier New" panose="02070309020205020404" pitchFamily="49" charset="0"/>
+              </a:rPr>
+              <a:t>index = </a:t>
+            </a:r>
+            <a:r>
+              <a:rPr lang="sv-SE" sz="1000" dirty="0" err="1">
+                <a:latin typeface="Courier New" panose="02070309020205020404" pitchFamily="49" charset="0"/>
+                <a:cs typeface="Courier New" panose="02070309020205020404" pitchFamily="49" charset="0"/>
+              </a:rPr>
+              <a:t>get_global_id</a:t>
+            </a:r>
+            <a:r>
+              <a:rPr lang="sv-SE" sz="1000" dirty="0">
+                <a:latin typeface="Courier New" panose="02070309020205020404" pitchFamily="49" charset="0"/>
+                <a:cs typeface="Courier New" panose="02070309020205020404" pitchFamily="49" charset="0"/>
+              </a:rPr>
+              <a:t>(0</a:t>
+            </a:r>
+            <a:r>
+              <a:rPr lang="sv-SE" sz="1000" dirty="0" smtClean="0">
+                <a:latin typeface="Courier New" panose="02070309020205020404" pitchFamily="49" charset="0"/>
+                <a:cs typeface="Courier New" panose="02070309020205020404" pitchFamily="49" charset="0"/>
+              </a:rPr>
+              <a:t>);</a:t>
+            </a:r>
+            <a:r>
+              <a:rPr lang="sv-SE" sz="1000" dirty="0">
+                <a:latin typeface="Courier New" panose="02070309020205020404" pitchFamily="49" charset="0"/>
+                <a:cs typeface="Courier New" panose="02070309020205020404" pitchFamily="49" charset="0"/>
+              </a:rPr>
+              <a:t> /</a:t>
+            </a:r>
+            <a:r>
+              <a:rPr lang="en-US" sz="1000" dirty="0">
+                <a:latin typeface="Courier New" panose="02070309020205020404" pitchFamily="49" charset="0"/>
+                <a:cs typeface="Courier New" panose="02070309020205020404" pitchFamily="49" charset="0"/>
+              </a:rPr>
+              <a:t>/ get index into global data </a:t>
+            </a:r>
+            <a:r>
+              <a:rPr lang="en-US" sz="1000" dirty="0" smtClean="0">
+                <a:latin typeface="Courier New" panose="02070309020205020404" pitchFamily="49" charset="0"/>
+                <a:cs typeface="Courier New" panose="02070309020205020404" pitchFamily="49" charset="0"/>
+              </a:rPr>
+              <a:t>array</a:t>
+            </a:r>
+            <a:br>
+              <a:rPr lang="en-US" sz="1000" dirty="0" smtClean="0">
+                <a:latin typeface="Courier New" panose="02070309020205020404" pitchFamily="49" charset="0"/>
+                <a:cs typeface="Courier New" panose="02070309020205020404" pitchFamily="49" charset="0"/>
+              </a:rPr>
+            </a:br>
+            <a:r>
+              <a:rPr lang="en-US" sz="1000" dirty="0" smtClean="0">
+                <a:latin typeface="Courier New" panose="02070309020205020404" pitchFamily="49" charset="0"/>
+                <a:cs typeface="Courier New" panose="02070309020205020404" pitchFamily="49" charset="0"/>
+              </a:rPr>
+              <a:t>	</a:t>
+            </a:r>
+            <a:r>
+              <a:rPr lang="sv-SE" sz="1000" dirty="0" err="1">
+                <a:latin typeface="Courier New" panose="02070309020205020404" pitchFamily="49" charset="0"/>
+                <a:cs typeface="Courier New" panose="02070309020205020404" pitchFamily="49" charset="0"/>
+              </a:rPr>
+              <a:t>if</a:t>
+            </a:r>
+            <a:r>
+              <a:rPr lang="sv-SE" sz="1000" dirty="0">
+                <a:latin typeface="Courier New" panose="02070309020205020404" pitchFamily="49" charset="0"/>
+                <a:cs typeface="Courier New" panose="02070309020205020404" pitchFamily="49" charset="0"/>
+              </a:rPr>
+              <a:t> (index &gt;= </a:t>
+            </a:r>
+            <a:r>
+              <a:rPr lang="sv-SE" sz="1000" dirty="0" err="1">
+                <a:latin typeface="Courier New" panose="02070309020205020404" pitchFamily="49" charset="0"/>
+                <a:cs typeface="Courier New" panose="02070309020205020404" pitchFamily="49" charset="0"/>
+              </a:rPr>
+              <a:t>numElements</a:t>
+            </a:r>
+            <a:r>
+              <a:rPr lang="sv-SE" sz="1000" dirty="0">
+                <a:latin typeface="Courier New" panose="02070309020205020404" pitchFamily="49" charset="0"/>
+                <a:cs typeface="Courier New" panose="02070309020205020404" pitchFamily="49" charset="0"/>
+              </a:rPr>
+              <a:t>)  </a:t>
+            </a:r>
+            <a:r>
+              <a:rPr lang="sv-SE" sz="1000" dirty="0" smtClean="0">
+                <a:latin typeface="Courier New" panose="02070309020205020404" pitchFamily="49" charset="0"/>
+                <a:cs typeface="Courier New" panose="02070309020205020404" pitchFamily="49" charset="0"/>
+              </a:rPr>
+              <a:t>{  </a:t>
+            </a:r>
+            <a:r>
+              <a:rPr lang="en-US" sz="1000" dirty="0" smtClean="0">
+                <a:latin typeface="Courier New" panose="02070309020205020404" pitchFamily="49" charset="0"/>
+                <a:cs typeface="Courier New" panose="02070309020205020404" pitchFamily="49" charset="0"/>
+              </a:rPr>
+              <a:t>// </a:t>
+            </a:r>
+            <a:r>
+              <a:rPr lang="en-US" sz="1000" dirty="0">
+                <a:latin typeface="Courier New" panose="02070309020205020404" pitchFamily="49" charset="0"/>
+                <a:cs typeface="Courier New" panose="02070309020205020404" pitchFamily="49" charset="0"/>
+              </a:rPr>
+              <a:t>bound check, equivalent to the limit on a 'for' </a:t>
+            </a:r>
+            <a:r>
+              <a:rPr lang="en-US" sz="1000" dirty="0" smtClean="0">
+                <a:latin typeface="Courier New" panose="02070309020205020404" pitchFamily="49" charset="0"/>
+                <a:cs typeface="Courier New" panose="02070309020205020404" pitchFamily="49" charset="0"/>
+              </a:rPr>
+              <a:t>loop</a:t>
+            </a:r>
+            <a:br>
+              <a:rPr lang="en-US" sz="1000" dirty="0" smtClean="0">
+                <a:latin typeface="Courier New" panose="02070309020205020404" pitchFamily="49" charset="0"/>
+                <a:cs typeface="Courier New" panose="02070309020205020404" pitchFamily="49" charset="0"/>
+              </a:rPr>
+            </a:br>
+            <a:r>
+              <a:rPr lang="en-US" sz="1000" dirty="0" smtClean="0">
+                <a:latin typeface="Courier New" panose="02070309020205020404" pitchFamily="49" charset="0"/>
+                <a:cs typeface="Courier New" panose="02070309020205020404" pitchFamily="49" charset="0"/>
+              </a:rPr>
+              <a:t>		</a:t>
+            </a:r>
+            <a:r>
+              <a:rPr lang="sv-SE" sz="1000" dirty="0" err="1" smtClean="0">
+                <a:latin typeface="Courier New" panose="02070309020205020404" pitchFamily="49" charset="0"/>
+                <a:cs typeface="Courier New" panose="02070309020205020404" pitchFamily="49" charset="0"/>
+              </a:rPr>
+              <a:t>return</a:t>
+            </a:r>
+            <a:r>
+              <a:rPr lang="sv-SE" sz="1000" dirty="0" smtClean="0">
+                <a:latin typeface="Courier New" panose="02070309020205020404" pitchFamily="49" charset="0"/>
+                <a:cs typeface="Courier New" panose="02070309020205020404" pitchFamily="49" charset="0"/>
+              </a:rPr>
+              <a:t>;</a:t>
+            </a:r>
+            <a:br>
+              <a:rPr lang="sv-SE" sz="1000" dirty="0" smtClean="0">
+                <a:latin typeface="Courier New" panose="02070309020205020404" pitchFamily="49" charset="0"/>
+                <a:cs typeface="Courier New" panose="02070309020205020404" pitchFamily="49" charset="0"/>
+              </a:rPr>
+            </a:br>
+            <a:r>
+              <a:rPr lang="sv-SE" sz="1000" dirty="0" smtClean="0">
+                <a:latin typeface="Courier New" panose="02070309020205020404" pitchFamily="49" charset="0"/>
+                <a:cs typeface="Courier New" panose="02070309020205020404" pitchFamily="49" charset="0"/>
+              </a:rPr>
+              <a:t>        	}</a:t>
+            </a:r>
+            <a:br>
+              <a:rPr lang="sv-SE" sz="1000" dirty="0" smtClean="0">
+                <a:latin typeface="Courier New" panose="02070309020205020404" pitchFamily="49" charset="0"/>
+                <a:cs typeface="Courier New" panose="02070309020205020404" pitchFamily="49" charset="0"/>
+              </a:rPr>
+            </a:br>
+            <a:r>
+              <a:rPr lang="sv-SE" sz="1000" dirty="0" smtClean="0">
                 <a:latin typeface="Courier New" panose="02070309020205020404" pitchFamily="49" charset="0"/>
                 <a:cs typeface="Courier New" panose="02070309020205020404" pitchFamily="49" charset="0"/>
               </a:rPr>
               <a:t>	sprite[index</a:t>
             </a:r>
             <a:r>
-              <a:rPr lang="sv-SE" sz="1200" dirty="0">
+              <a:rPr lang="sv-SE" sz="1000" dirty="0">
                 <a:latin typeface="Courier New" panose="02070309020205020404" pitchFamily="49" charset="0"/>
                 <a:cs typeface="Courier New" panose="02070309020205020404" pitchFamily="49" charset="0"/>
               </a:rPr>
               <a:t>].</a:t>
             </a:r>
             <a:r>
-              <a:rPr lang="sv-SE" sz="1200" dirty="0" err="1">
+              <a:rPr lang="sv-SE" sz="1000" dirty="0" err="1">
+                <a:latin typeface="Courier New" panose="02070309020205020404" pitchFamily="49" charset="0"/>
+                <a:cs typeface="Courier New" panose="02070309020205020404" pitchFamily="49" charset="0"/>
+              </a:rPr>
+              <a:t>velocity</a:t>
+            </a:r>
+            <a:r>
+              <a:rPr lang="sv-SE" sz="1000" dirty="0">
+                <a:latin typeface="Courier New" panose="02070309020205020404" pitchFamily="49" charset="0"/>
+                <a:cs typeface="Courier New" panose="02070309020205020404" pitchFamily="49" charset="0"/>
+              </a:rPr>
+              <a:t> += globals[0].</a:t>
+            </a:r>
+            <a:r>
+              <a:rPr lang="sv-SE" sz="1000" dirty="0" err="1">
+                <a:latin typeface="Courier New" panose="02070309020205020404" pitchFamily="49" charset="0"/>
+                <a:cs typeface="Courier New" panose="02070309020205020404" pitchFamily="49" charset="0"/>
+              </a:rPr>
+              <a:t>gravity</a:t>
+            </a:r>
+            <a:r>
+              <a:rPr lang="sv-SE" sz="1000" dirty="0">
+                <a:latin typeface="Courier New" panose="02070309020205020404" pitchFamily="49" charset="0"/>
+                <a:cs typeface="Courier New" panose="02070309020205020404" pitchFamily="49" charset="0"/>
+              </a:rPr>
+              <a:t> * globals[0].</a:t>
+            </a:r>
+            <a:r>
+              <a:rPr lang="sv-SE" sz="1000" dirty="0" err="1">
+                <a:latin typeface="Courier New" panose="02070309020205020404" pitchFamily="49" charset="0"/>
+                <a:cs typeface="Courier New" panose="02070309020205020404" pitchFamily="49" charset="0"/>
+              </a:rPr>
+              <a:t>deltaTime.x</a:t>
+            </a:r>
+            <a:r>
+              <a:rPr lang="sv-SE" sz="1000" dirty="0" smtClean="0">
+                <a:latin typeface="Courier New" panose="02070309020205020404" pitchFamily="49" charset="0"/>
+                <a:cs typeface="Courier New" panose="02070309020205020404" pitchFamily="49" charset="0"/>
+              </a:rPr>
+              <a:t>;</a:t>
+            </a:r>
+            <a:br>
+              <a:rPr lang="sv-SE" sz="1000" dirty="0" smtClean="0">
+                <a:latin typeface="Courier New" panose="02070309020205020404" pitchFamily="49" charset="0"/>
+                <a:cs typeface="Courier New" panose="02070309020205020404" pitchFamily="49" charset="0"/>
+              </a:rPr>
+            </a:br>
+            <a:r>
+              <a:rPr lang="sv-SE" sz="1000" dirty="0" smtClean="0">
+                <a:latin typeface="Courier New" panose="02070309020205020404" pitchFamily="49" charset="0"/>
+                <a:cs typeface="Courier New" panose="02070309020205020404" pitchFamily="49" charset="0"/>
+              </a:rPr>
+              <a:t>	sprite[index</a:t>
+            </a:r>
+            <a:r>
+              <a:rPr lang="sv-SE" sz="1000" dirty="0">
+                <a:latin typeface="Courier New" panose="02070309020205020404" pitchFamily="49" charset="0"/>
+                <a:cs typeface="Courier New" panose="02070309020205020404" pitchFamily="49" charset="0"/>
+              </a:rPr>
+              <a:t>].position += sprite[index].</a:t>
+            </a:r>
+            <a:r>
+              <a:rPr lang="sv-SE" sz="1000" dirty="0" err="1">
+                <a:latin typeface="Courier New" panose="02070309020205020404" pitchFamily="49" charset="0"/>
+                <a:cs typeface="Courier New" panose="02070309020205020404" pitchFamily="49" charset="0"/>
+              </a:rPr>
+              <a:t>velocity</a:t>
+            </a:r>
+            <a:r>
+              <a:rPr lang="sv-SE" sz="1000" dirty="0">
+                <a:latin typeface="Courier New" panose="02070309020205020404" pitchFamily="49" charset="0"/>
+                <a:cs typeface="Courier New" panose="02070309020205020404" pitchFamily="49" charset="0"/>
+              </a:rPr>
+              <a:t> * globals[0].</a:t>
+            </a:r>
+            <a:r>
+              <a:rPr lang="sv-SE" sz="1000" dirty="0" err="1">
+                <a:latin typeface="Courier New" panose="02070309020205020404" pitchFamily="49" charset="0"/>
+                <a:cs typeface="Courier New" panose="02070309020205020404" pitchFamily="49" charset="0"/>
+              </a:rPr>
+              <a:t>deltaTime.x</a:t>
+            </a:r>
+            <a:r>
+              <a:rPr lang="sv-SE" sz="1000" dirty="0" smtClean="0">
+                <a:latin typeface="Courier New" panose="02070309020205020404" pitchFamily="49" charset="0"/>
+                <a:cs typeface="Courier New" panose="02070309020205020404" pitchFamily="49" charset="0"/>
+              </a:rPr>
+              <a:t>;</a:t>
+            </a:r>
+            <a:br>
+              <a:rPr lang="sv-SE" sz="1000" dirty="0" smtClean="0">
+                <a:latin typeface="Courier New" panose="02070309020205020404" pitchFamily="49" charset="0"/>
+                <a:cs typeface="Courier New" panose="02070309020205020404" pitchFamily="49" charset="0"/>
+              </a:rPr>
+            </a:br>
+            <a:r>
+              <a:rPr lang="sv-SE" sz="1000" dirty="0" smtClean="0">
+                <a:latin typeface="Courier New" panose="02070309020205020404" pitchFamily="49" charset="0"/>
+                <a:cs typeface="Courier New" panose="02070309020205020404" pitchFamily="49" charset="0"/>
+              </a:rPr>
+              <a:t>	//</a:t>
+            </a:r>
+            <a:r>
+              <a:rPr lang="sv-SE" sz="1000" dirty="0" err="1">
+                <a:latin typeface="Courier New" panose="02070309020205020404" pitchFamily="49" charset="0"/>
+                <a:cs typeface="Courier New" panose="02070309020205020404" pitchFamily="49" charset="0"/>
+              </a:rPr>
+              <a:t>Bottom</a:t>
+            </a:r>
+            <a:r>
+              <a:rPr lang="sv-SE" sz="1000" dirty="0">
+                <a:latin typeface="Courier New" panose="02070309020205020404" pitchFamily="49" charset="0"/>
+                <a:cs typeface="Courier New" panose="02070309020205020404" pitchFamily="49" charset="0"/>
+              </a:rPr>
+              <a:t> </a:t>
+            </a:r>
+            <a:r>
+              <a:rPr lang="sv-SE" sz="1000" dirty="0" smtClean="0">
+                <a:latin typeface="Courier New" panose="02070309020205020404" pitchFamily="49" charset="0"/>
+                <a:cs typeface="Courier New" panose="02070309020205020404" pitchFamily="49" charset="0"/>
+              </a:rPr>
+              <a:t>plane</a:t>
+            </a:r>
+            <a:br>
+              <a:rPr lang="sv-SE" sz="1000" dirty="0" smtClean="0">
+                <a:latin typeface="Courier New" panose="02070309020205020404" pitchFamily="49" charset="0"/>
+                <a:cs typeface="Courier New" panose="02070309020205020404" pitchFamily="49" charset="0"/>
+              </a:rPr>
+            </a:br>
+            <a:r>
+              <a:rPr lang="sv-SE" sz="1000" dirty="0" smtClean="0">
+                <a:latin typeface="Courier New" panose="02070309020205020404" pitchFamily="49" charset="0"/>
+                <a:cs typeface="Courier New" panose="02070309020205020404" pitchFamily="49" charset="0"/>
+              </a:rPr>
+              <a:t>	</a:t>
+            </a:r>
+            <a:r>
+              <a:rPr lang="sv-SE" sz="1000" dirty="0" err="1" smtClean="0">
+                <a:latin typeface="Courier New" panose="02070309020205020404" pitchFamily="49" charset="0"/>
+                <a:cs typeface="Courier New" panose="02070309020205020404" pitchFamily="49" charset="0"/>
+              </a:rPr>
+              <a:t>if</a:t>
+            </a:r>
+            <a:r>
+              <a:rPr lang="sv-SE" sz="1000" dirty="0" smtClean="0">
+                <a:latin typeface="Courier New" panose="02070309020205020404" pitchFamily="49" charset="0"/>
+                <a:cs typeface="Courier New" panose="02070309020205020404" pitchFamily="49" charset="0"/>
+              </a:rPr>
+              <a:t> </a:t>
+            </a:r>
+            <a:r>
+              <a:rPr lang="sv-SE" sz="1000" dirty="0">
+                <a:latin typeface="Courier New" panose="02070309020205020404" pitchFamily="49" charset="0"/>
+                <a:cs typeface="Courier New" panose="02070309020205020404" pitchFamily="49" charset="0"/>
+              </a:rPr>
+              <a:t>(</a:t>
+            </a:r>
+            <a:r>
+              <a:rPr lang="sv-SE" sz="1000" dirty="0" err="1">
+                <a:latin typeface="Courier New" panose="02070309020205020404" pitchFamily="49" charset="0"/>
+                <a:cs typeface="Courier New" panose="02070309020205020404" pitchFamily="49" charset="0"/>
+              </a:rPr>
+              <a:t>dot</a:t>
+            </a:r>
+            <a:r>
+              <a:rPr lang="sv-SE" sz="1000" dirty="0">
+                <a:latin typeface="Courier New" panose="02070309020205020404" pitchFamily="49" charset="0"/>
+                <a:cs typeface="Courier New" panose="02070309020205020404" pitchFamily="49" charset="0"/>
+              </a:rPr>
+              <a:t>(globals[0].</a:t>
+            </a:r>
+            <a:r>
+              <a:rPr lang="sv-SE" sz="1000" dirty="0" err="1">
+                <a:latin typeface="Courier New" panose="02070309020205020404" pitchFamily="49" charset="0"/>
+                <a:cs typeface="Courier New" panose="02070309020205020404" pitchFamily="49" charset="0"/>
+              </a:rPr>
+              <a:t>bounding.crossVectors</a:t>
+            </a:r>
+            <a:r>
+              <a:rPr lang="sv-SE" sz="1000" dirty="0">
+                <a:latin typeface="Courier New" panose="02070309020205020404" pitchFamily="49" charset="0"/>
+                <a:cs typeface="Courier New" panose="02070309020205020404" pitchFamily="49" charset="0"/>
+              </a:rPr>
+              <a:t>[0].</a:t>
+            </a:r>
+            <a:r>
+              <a:rPr lang="sv-SE" sz="1000" dirty="0" err="1">
+                <a:latin typeface="Courier New" panose="02070309020205020404" pitchFamily="49" charset="0"/>
+                <a:cs typeface="Courier New" panose="02070309020205020404" pitchFamily="49" charset="0"/>
+              </a:rPr>
+              <a:t>xyz</a:t>
+            </a:r>
+            <a:r>
+              <a:rPr lang="sv-SE" sz="1000" dirty="0">
+                <a:latin typeface="Courier New" panose="02070309020205020404" pitchFamily="49" charset="0"/>
+                <a:cs typeface="Courier New" panose="02070309020205020404" pitchFamily="49" charset="0"/>
+              </a:rPr>
+              <a:t>, (sprite[index].</a:t>
+            </a:r>
+            <a:r>
+              <a:rPr lang="sv-SE" sz="1000" dirty="0" err="1">
+                <a:latin typeface="Courier New" panose="02070309020205020404" pitchFamily="49" charset="0"/>
+                <a:cs typeface="Courier New" panose="02070309020205020404" pitchFamily="49" charset="0"/>
+              </a:rPr>
+              <a:t>position.xyz</a:t>
+            </a:r>
+            <a:r>
+              <a:rPr lang="sv-SE" sz="1000" dirty="0">
+                <a:latin typeface="Courier New" panose="02070309020205020404" pitchFamily="49" charset="0"/>
+                <a:cs typeface="Courier New" panose="02070309020205020404" pitchFamily="49" charset="0"/>
+              </a:rPr>
+              <a:t> - </a:t>
+            </a:r>
+            <a:r>
+              <a:rPr lang="sv-SE" sz="1000" dirty="0" smtClean="0">
+                <a:latin typeface="Courier New" panose="02070309020205020404" pitchFamily="49" charset="0"/>
+                <a:cs typeface="Courier New" panose="02070309020205020404" pitchFamily="49" charset="0"/>
+              </a:rPr>
+              <a:t>		    globals[0</a:t>
+            </a:r>
+            <a:r>
+              <a:rPr lang="sv-SE" sz="1000" dirty="0">
+                <a:latin typeface="Courier New" panose="02070309020205020404" pitchFamily="49" charset="0"/>
+                <a:cs typeface="Courier New" panose="02070309020205020404" pitchFamily="49" charset="0"/>
+              </a:rPr>
+              <a:t>].</a:t>
+            </a:r>
+            <a:r>
+              <a:rPr lang="sv-SE" sz="1000" dirty="0" err="1">
+                <a:latin typeface="Courier New" panose="02070309020205020404" pitchFamily="49" charset="0"/>
+                <a:cs typeface="Courier New" panose="02070309020205020404" pitchFamily="49" charset="0"/>
+              </a:rPr>
+              <a:t>bounding.vertices</a:t>
+            </a:r>
+            <a:r>
+              <a:rPr lang="sv-SE" sz="1000" dirty="0">
+                <a:latin typeface="Courier New" panose="02070309020205020404" pitchFamily="49" charset="0"/>
+                <a:cs typeface="Courier New" panose="02070309020205020404" pitchFamily="49" charset="0"/>
+              </a:rPr>
+              <a:t>[0].</a:t>
+            </a:r>
+            <a:r>
+              <a:rPr lang="sv-SE" sz="1000" dirty="0" err="1">
+                <a:latin typeface="Courier New" panose="02070309020205020404" pitchFamily="49" charset="0"/>
+                <a:cs typeface="Courier New" panose="02070309020205020404" pitchFamily="49" charset="0"/>
+              </a:rPr>
+              <a:t>xyz</a:t>
+            </a:r>
+            <a:r>
+              <a:rPr lang="sv-SE" sz="1000" dirty="0">
+                <a:latin typeface="Courier New" panose="02070309020205020404" pitchFamily="49" charset="0"/>
+                <a:cs typeface="Courier New" panose="02070309020205020404" pitchFamily="49" charset="0"/>
+              </a:rPr>
+              <a:t>)) &gt; 0 ) </a:t>
+            </a:r>
+            <a:r>
+              <a:rPr lang="sv-SE" sz="1000" dirty="0" smtClean="0">
+                <a:latin typeface="Courier New" panose="02070309020205020404" pitchFamily="49" charset="0"/>
+                <a:cs typeface="Courier New" panose="02070309020205020404" pitchFamily="49" charset="0"/>
+              </a:rPr>
+              <a:t>{</a:t>
+            </a:r>
+            <a:br>
+              <a:rPr lang="sv-SE" sz="1000" dirty="0" smtClean="0">
+                <a:latin typeface="Courier New" panose="02070309020205020404" pitchFamily="49" charset="0"/>
+                <a:cs typeface="Courier New" panose="02070309020205020404" pitchFamily="49" charset="0"/>
+              </a:rPr>
+            </a:br>
+            <a:r>
+              <a:rPr lang="sv-SE" sz="1000" dirty="0" smtClean="0">
+                <a:latin typeface="Courier New" panose="02070309020205020404" pitchFamily="49" charset="0"/>
+                <a:cs typeface="Courier New" panose="02070309020205020404" pitchFamily="49" charset="0"/>
+              </a:rPr>
+              <a:t>		sprite[index</a:t>
+            </a:r>
+            <a:r>
+              <a:rPr lang="sv-SE" sz="1000" dirty="0">
+                <a:latin typeface="Courier New" panose="02070309020205020404" pitchFamily="49" charset="0"/>
+                <a:cs typeface="Courier New" panose="02070309020205020404" pitchFamily="49" charset="0"/>
+              </a:rPr>
+              <a:t>].</a:t>
+            </a:r>
+            <a:r>
+              <a:rPr lang="sv-SE" sz="1000" dirty="0" err="1">
+                <a:latin typeface="Courier New" panose="02070309020205020404" pitchFamily="49" charset="0"/>
+                <a:cs typeface="Courier New" panose="02070309020205020404" pitchFamily="49" charset="0"/>
+              </a:rPr>
+              <a:t>position.y</a:t>
+            </a:r>
+            <a:r>
+              <a:rPr lang="sv-SE" sz="1000" dirty="0">
+                <a:latin typeface="Courier New" panose="02070309020205020404" pitchFamily="49" charset="0"/>
+                <a:cs typeface="Courier New" panose="02070309020205020404" pitchFamily="49" charset="0"/>
+              </a:rPr>
+              <a:t> += (globals[0].</a:t>
+            </a:r>
+            <a:r>
+              <a:rPr lang="sv-SE" sz="1000" dirty="0" err="1">
+                <a:latin typeface="Courier New" panose="02070309020205020404" pitchFamily="49" charset="0"/>
+                <a:cs typeface="Courier New" panose="02070309020205020404" pitchFamily="49" charset="0"/>
+              </a:rPr>
+              <a:t>bounding.vertices</a:t>
+            </a:r>
+            <a:r>
+              <a:rPr lang="sv-SE" sz="1000" dirty="0">
+                <a:latin typeface="Courier New" panose="02070309020205020404" pitchFamily="49" charset="0"/>
+                <a:cs typeface="Courier New" panose="02070309020205020404" pitchFamily="49" charset="0"/>
+              </a:rPr>
+              <a:t>[0].y </a:t>
+            </a:r>
+            <a:r>
+              <a:rPr lang="sv-SE" sz="1000" dirty="0" smtClean="0">
+                <a:latin typeface="Courier New" panose="02070309020205020404" pitchFamily="49" charset="0"/>
+                <a:cs typeface="Courier New" panose="02070309020205020404" pitchFamily="49" charset="0"/>
+              </a:rPr>
+              <a:t>–</a:t>
+            </a:r>
+            <a:br>
+              <a:rPr lang="sv-SE" sz="1000" dirty="0" smtClean="0">
+                <a:latin typeface="Courier New" panose="02070309020205020404" pitchFamily="49" charset="0"/>
+                <a:cs typeface="Courier New" panose="02070309020205020404" pitchFamily="49" charset="0"/>
+              </a:rPr>
+            </a:br>
+            <a:r>
+              <a:rPr lang="sv-SE" sz="1000" dirty="0" smtClean="0">
+                <a:latin typeface="Courier New" panose="02070309020205020404" pitchFamily="49" charset="0"/>
+                <a:cs typeface="Courier New" panose="02070309020205020404" pitchFamily="49" charset="0"/>
+              </a:rPr>
+              <a:t>	             sprite[index</a:t>
+            </a:r>
+            <a:r>
+              <a:rPr lang="sv-SE" sz="1000" dirty="0">
+                <a:latin typeface="Courier New" panose="02070309020205020404" pitchFamily="49" charset="0"/>
+                <a:cs typeface="Courier New" panose="02070309020205020404" pitchFamily="49" charset="0"/>
+              </a:rPr>
+              <a:t>].</a:t>
+            </a:r>
+            <a:r>
+              <a:rPr lang="sv-SE" sz="1000" dirty="0" err="1">
+                <a:latin typeface="Courier New" panose="02070309020205020404" pitchFamily="49" charset="0"/>
+                <a:cs typeface="Courier New" panose="02070309020205020404" pitchFamily="49" charset="0"/>
+              </a:rPr>
+              <a:t>position.y</a:t>
+            </a:r>
+            <a:r>
+              <a:rPr lang="sv-SE" sz="1000" dirty="0" smtClean="0">
+                <a:latin typeface="Courier New" panose="02070309020205020404" pitchFamily="49" charset="0"/>
+                <a:cs typeface="Courier New" panose="02070309020205020404" pitchFamily="49" charset="0"/>
+              </a:rPr>
+              <a:t>);</a:t>
+            </a:r>
+            <a:br>
+              <a:rPr lang="sv-SE" sz="1000" dirty="0" smtClean="0">
+                <a:latin typeface="Courier New" panose="02070309020205020404" pitchFamily="49" charset="0"/>
+                <a:cs typeface="Courier New" panose="02070309020205020404" pitchFamily="49" charset="0"/>
+              </a:rPr>
+            </a:br>
+            <a:r>
+              <a:rPr lang="sv-SE" sz="1000" dirty="0" smtClean="0">
+                <a:latin typeface="Courier New" panose="02070309020205020404" pitchFamily="49" charset="0"/>
+                <a:cs typeface="Courier New" panose="02070309020205020404" pitchFamily="49" charset="0"/>
+              </a:rPr>
+              <a:t>		sprite[index</a:t>
+            </a:r>
+            <a:r>
+              <a:rPr lang="sv-SE" sz="1000" dirty="0">
+                <a:latin typeface="Courier New" panose="02070309020205020404" pitchFamily="49" charset="0"/>
+                <a:cs typeface="Courier New" panose="02070309020205020404" pitchFamily="49" charset="0"/>
+              </a:rPr>
+              <a:t>].</a:t>
+            </a:r>
+            <a:r>
+              <a:rPr lang="sv-SE" sz="1000" dirty="0" err="1">
                 <a:latin typeface="Courier New" panose="02070309020205020404" pitchFamily="49" charset="0"/>
                 <a:cs typeface="Courier New" panose="02070309020205020404" pitchFamily="49" charset="0"/>
               </a:rPr>
               <a:t>velocity.y</a:t>
             </a:r>
             <a:r>
-              <a:rPr lang="sv-SE" sz="1200" dirty="0">
+              <a:rPr lang="sv-SE" sz="1000" dirty="0">
                 <a:latin typeface="Courier New" panose="02070309020205020404" pitchFamily="49" charset="0"/>
                 <a:cs typeface="Courier New" panose="02070309020205020404" pitchFamily="49" charset="0"/>
               </a:rPr>
               <a:t> = -sprite[index].</a:t>
             </a:r>
             <a:r>
-              <a:rPr lang="sv-SE" sz="1200" dirty="0" err="1">
+              <a:rPr lang="sv-SE" sz="1000" dirty="0" err="1">
                 <a:latin typeface="Courier New" panose="02070309020205020404" pitchFamily="49" charset="0"/>
                 <a:cs typeface="Courier New" panose="02070309020205020404" pitchFamily="49" charset="0"/>
               </a:rPr>
               <a:t>velocity.y</a:t>
             </a:r>
             <a:r>
-              <a:rPr lang="sv-SE" sz="1200" dirty="0">
-                <a:latin typeface="Courier New" panose="02070309020205020404" pitchFamily="49" charset="0"/>
-                <a:cs typeface="Courier New" panose="02070309020205020404" pitchFamily="49" charset="0"/>
-              </a:rPr>
-              <a:t> * </a:t>
-            </a:r>
-            <a:r>
-              <a:rPr lang="sv-SE" sz="1200" dirty="0" smtClean="0">
+              <a:rPr lang="sv-SE" sz="1000" dirty="0">
+                <a:latin typeface="Courier New" panose="02070309020205020404" pitchFamily="49" charset="0"/>
+                <a:cs typeface="Courier New" panose="02070309020205020404" pitchFamily="49" charset="0"/>
+              </a:rPr>
+              <a:t> </a:t>
+            </a:r>
+            <a:r>
+              <a:rPr lang="sv-SE" sz="1000" dirty="0" smtClean="0">
+                <a:latin typeface="Courier New" panose="02070309020205020404" pitchFamily="49" charset="0"/>
+                <a:cs typeface="Courier New" panose="02070309020205020404" pitchFamily="49" charset="0"/>
+              </a:rPr>
+              <a:t>*</a:t>
+            </a:r>
+            <a:br>
+              <a:rPr lang="sv-SE" sz="1000" dirty="0" smtClean="0">
+                <a:latin typeface="Courier New" panose="02070309020205020404" pitchFamily="49" charset="0"/>
+                <a:cs typeface="Courier New" panose="02070309020205020404" pitchFamily="49" charset="0"/>
+              </a:rPr>
+            </a:br>
+            <a:r>
+              <a:rPr lang="sv-SE" sz="1000" dirty="0" smtClean="0">
+                <a:latin typeface="Courier New" panose="02070309020205020404" pitchFamily="49" charset="0"/>
+                <a:cs typeface="Courier New" panose="02070309020205020404" pitchFamily="49" charset="0"/>
+              </a:rPr>
+              <a:t>		    </a:t>
+            </a:r>
+            <a:r>
+              <a:rPr lang="sv-SE" sz="1000" dirty="0" err="1" smtClean="0">
+                <a:latin typeface="Courier New" panose="02070309020205020404" pitchFamily="49" charset="0"/>
+                <a:cs typeface="Courier New" panose="02070309020205020404" pitchFamily="49" charset="0"/>
+              </a:rPr>
+              <a:t>property</a:t>
+            </a:r>
+            <a:r>
+              <a:rPr lang="sv-SE" sz="1000" dirty="0" smtClean="0">
+                <a:latin typeface="Courier New" panose="02070309020205020404" pitchFamily="49" charset="0"/>
+                <a:cs typeface="Courier New" panose="02070309020205020404" pitchFamily="49" charset="0"/>
+              </a:rPr>
+              <a:t>[index</a:t>
+            </a:r>
+            <a:r>
+              <a:rPr lang="sv-SE" sz="1000" dirty="0">
+                <a:latin typeface="Courier New" panose="02070309020205020404" pitchFamily="49" charset="0"/>
+                <a:cs typeface="Courier New" panose="02070309020205020404" pitchFamily="49" charset="0"/>
+              </a:rPr>
+              <a:t>].</a:t>
+            </a:r>
+            <a:r>
+              <a:rPr lang="sv-SE" sz="1000" dirty="0" err="1">
+                <a:latin typeface="Courier New" panose="02070309020205020404" pitchFamily="49" charset="0"/>
+                <a:cs typeface="Courier New" panose="02070309020205020404" pitchFamily="49" charset="0"/>
+              </a:rPr>
+              <a:t>properties.y</a:t>
+            </a:r>
+            <a:r>
+              <a:rPr lang="sv-SE" sz="1000" dirty="0" smtClean="0">
+                <a:latin typeface="Courier New" panose="02070309020205020404" pitchFamily="49" charset="0"/>
+                <a:cs typeface="Courier New" panose="02070309020205020404" pitchFamily="49" charset="0"/>
+              </a:rPr>
+              <a:t>;</a:t>
+            </a:r>
+            <a:br>
+              <a:rPr lang="sv-SE" sz="1000" dirty="0" smtClean="0">
+                <a:latin typeface="Courier New" panose="02070309020205020404" pitchFamily="49" charset="0"/>
+                <a:cs typeface="Courier New" panose="02070309020205020404" pitchFamily="49" charset="0"/>
+              </a:rPr>
+            </a:br>
+            <a:r>
+              <a:rPr lang="sv-SE" sz="1000" dirty="0" smtClean="0">
+                <a:latin typeface="Courier New" panose="02070309020205020404" pitchFamily="49" charset="0"/>
+                <a:cs typeface="Courier New" panose="02070309020205020404" pitchFamily="49" charset="0"/>
+              </a:rPr>
+              <a:t>	}</a:t>
+            </a:r>
+            <a:br>
+              <a:rPr lang="sv-SE" sz="1000" dirty="0" smtClean="0">
+                <a:latin typeface="Courier New" panose="02070309020205020404" pitchFamily="49" charset="0"/>
+                <a:cs typeface="Courier New" panose="02070309020205020404" pitchFamily="49" charset="0"/>
+              </a:rPr>
+            </a:br>
+            <a:r>
+              <a:rPr lang="sv-SE" sz="1000" dirty="0" smtClean="0">
+                <a:latin typeface="Courier New" panose="02070309020205020404" pitchFamily="49" charset="0"/>
+                <a:cs typeface="Courier New" panose="02070309020205020404" pitchFamily="49" charset="0"/>
+              </a:rPr>
+              <a:t>	//</a:t>
+            </a:r>
+            <a:r>
+              <a:rPr lang="sv-SE" sz="1000" dirty="0">
+                <a:latin typeface="Courier New" panose="02070309020205020404" pitchFamily="49" charset="0"/>
+                <a:cs typeface="Courier New" panose="02070309020205020404" pitchFamily="49" charset="0"/>
+              </a:rPr>
+              <a:t>Right </a:t>
+            </a:r>
+            <a:r>
+              <a:rPr lang="sv-SE" sz="1000" dirty="0" smtClean="0">
+                <a:latin typeface="Courier New" panose="02070309020205020404" pitchFamily="49" charset="0"/>
+                <a:cs typeface="Courier New" panose="02070309020205020404" pitchFamily="49" charset="0"/>
+              </a:rPr>
+              <a:t>plane</a:t>
+            </a:r>
+            <a:br>
+              <a:rPr lang="sv-SE" sz="1000" dirty="0" smtClean="0">
+                <a:latin typeface="Courier New" panose="02070309020205020404" pitchFamily="49" charset="0"/>
+                <a:cs typeface="Courier New" panose="02070309020205020404" pitchFamily="49" charset="0"/>
+              </a:rPr>
+            </a:br>
+            <a:r>
+              <a:rPr lang="sv-SE" sz="1000" dirty="0" smtClean="0">
                 <a:latin typeface="Courier New" panose="02070309020205020404" pitchFamily="49" charset="0"/>
                 <a:cs typeface="Courier New" panose="02070309020205020404" pitchFamily="49" charset="0"/>
               </a:rPr>
               <a:t>	</a:t>
             </a:r>
             <a:r>
-              <a:rPr lang="sv-SE" sz="1200" dirty="0" err="1" smtClean="0">
+              <a:rPr lang="sv-SE" sz="1000" dirty="0" err="1" smtClean="0">
+                <a:latin typeface="Courier New" panose="02070309020205020404" pitchFamily="49" charset="0"/>
+                <a:cs typeface="Courier New" panose="02070309020205020404" pitchFamily="49" charset="0"/>
+              </a:rPr>
+              <a:t>if</a:t>
+            </a:r>
+            <a:r>
+              <a:rPr lang="sv-SE" sz="1000" dirty="0" smtClean="0">
+                <a:latin typeface="Courier New" panose="02070309020205020404" pitchFamily="49" charset="0"/>
+                <a:cs typeface="Courier New" panose="02070309020205020404" pitchFamily="49" charset="0"/>
+              </a:rPr>
+              <a:t> </a:t>
+            </a:r>
+            <a:r>
+              <a:rPr lang="sv-SE" sz="1000" dirty="0">
+                <a:latin typeface="Courier New" panose="02070309020205020404" pitchFamily="49" charset="0"/>
+                <a:cs typeface="Courier New" panose="02070309020205020404" pitchFamily="49" charset="0"/>
+              </a:rPr>
+              <a:t>(</a:t>
+            </a:r>
+            <a:r>
+              <a:rPr lang="sv-SE" sz="1000" dirty="0" err="1">
+                <a:latin typeface="Courier New" panose="02070309020205020404" pitchFamily="49" charset="0"/>
+                <a:cs typeface="Courier New" panose="02070309020205020404" pitchFamily="49" charset="0"/>
+              </a:rPr>
+              <a:t>dot</a:t>
+            </a:r>
+            <a:r>
+              <a:rPr lang="sv-SE" sz="1000" dirty="0">
+                <a:latin typeface="Courier New" panose="02070309020205020404" pitchFamily="49" charset="0"/>
+                <a:cs typeface="Courier New" panose="02070309020205020404" pitchFamily="49" charset="0"/>
+              </a:rPr>
+              <a:t>(globals[0].</a:t>
+            </a:r>
+            <a:r>
+              <a:rPr lang="sv-SE" sz="1000" dirty="0" err="1">
+                <a:latin typeface="Courier New" panose="02070309020205020404" pitchFamily="49" charset="0"/>
+                <a:cs typeface="Courier New" panose="02070309020205020404" pitchFamily="49" charset="0"/>
+              </a:rPr>
+              <a:t>bounding.crossVectors</a:t>
+            </a:r>
+            <a:r>
+              <a:rPr lang="sv-SE" sz="1000" dirty="0">
+                <a:latin typeface="Courier New" panose="02070309020205020404" pitchFamily="49" charset="0"/>
+                <a:cs typeface="Courier New" panose="02070309020205020404" pitchFamily="49" charset="0"/>
+              </a:rPr>
+              <a:t>[4].</a:t>
+            </a:r>
+            <a:r>
+              <a:rPr lang="sv-SE" sz="1000" dirty="0" err="1">
+                <a:latin typeface="Courier New" panose="02070309020205020404" pitchFamily="49" charset="0"/>
+                <a:cs typeface="Courier New" panose="02070309020205020404" pitchFamily="49" charset="0"/>
+              </a:rPr>
+              <a:t>xyz</a:t>
+            </a:r>
+            <a:r>
+              <a:rPr lang="sv-SE" sz="1000" dirty="0">
+                <a:latin typeface="Courier New" panose="02070309020205020404" pitchFamily="49" charset="0"/>
+                <a:cs typeface="Courier New" panose="02070309020205020404" pitchFamily="49" charset="0"/>
+              </a:rPr>
+              <a:t>, (sprite[index].</a:t>
+            </a:r>
+            <a:r>
+              <a:rPr lang="sv-SE" sz="1000" dirty="0" err="1">
+                <a:latin typeface="Courier New" panose="02070309020205020404" pitchFamily="49" charset="0"/>
+                <a:cs typeface="Courier New" panose="02070309020205020404" pitchFamily="49" charset="0"/>
+              </a:rPr>
+              <a:t>position.xyz</a:t>
+            </a:r>
+            <a:r>
+              <a:rPr lang="sv-SE" sz="1000" dirty="0">
+                <a:latin typeface="Courier New" panose="02070309020205020404" pitchFamily="49" charset="0"/>
+                <a:cs typeface="Courier New" panose="02070309020205020404" pitchFamily="49" charset="0"/>
+              </a:rPr>
+              <a:t> </a:t>
+            </a:r>
+            <a:r>
+              <a:rPr lang="sv-SE" sz="1000" dirty="0" smtClean="0">
+                <a:latin typeface="Courier New" panose="02070309020205020404" pitchFamily="49" charset="0"/>
+                <a:cs typeface="Courier New" panose="02070309020205020404" pitchFamily="49" charset="0"/>
+              </a:rPr>
+              <a:t>–</a:t>
+            </a:r>
+            <a:br>
+              <a:rPr lang="sv-SE" sz="1000" dirty="0" smtClean="0">
+                <a:latin typeface="Courier New" panose="02070309020205020404" pitchFamily="49" charset="0"/>
+                <a:cs typeface="Courier New" panose="02070309020205020404" pitchFamily="49" charset="0"/>
+              </a:rPr>
+            </a:br>
+            <a:r>
+              <a:rPr lang="sv-SE" sz="1000" dirty="0" smtClean="0">
+                <a:latin typeface="Courier New" panose="02070309020205020404" pitchFamily="49" charset="0"/>
+                <a:cs typeface="Courier New" panose="02070309020205020404" pitchFamily="49" charset="0"/>
+              </a:rPr>
+              <a:t>	    globals[0</a:t>
+            </a:r>
+            <a:r>
+              <a:rPr lang="sv-SE" sz="1000" dirty="0">
+                <a:latin typeface="Courier New" panose="02070309020205020404" pitchFamily="49" charset="0"/>
+                <a:cs typeface="Courier New" panose="02070309020205020404" pitchFamily="49" charset="0"/>
+              </a:rPr>
+              <a:t>].</a:t>
+            </a:r>
+            <a:r>
+              <a:rPr lang="sv-SE" sz="1000" dirty="0" err="1">
+                <a:latin typeface="Courier New" panose="02070309020205020404" pitchFamily="49" charset="0"/>
+                <a:cs typeface="Courier New" panose="02070309020205020404" pitchFamily="49" charset="0"/>
+              </a:rPr>
+              <a:t>bounding.vertices</a:t>
+            </a:r>
+            <a:r>
+              <a:rPr lang="sv-SE" sz="1000" dirty="0">
+                <a:latin typeface="Courier New" panose="02070309020205020404" pitchFamily="49" charset="0"/>
+                <a:cs typeface="Courier New" panose="02070309020205020404" pitchFamily="49" charset="0"/>
+              </a:rPr>
+              <a:t>[3].</a:t>
+            </a:r>
+            <a:r>
+              <a:rPr lang="sv-SE" sz="1000" dirty="0" err="1">
+                <a:latin typeface="Courier New" panose="02070309020205020404" pitchFamily="49" charset="0"/>
+                <a:cs typeface="Courier New" panose="02070309020205020404" pitchFamily="49" charset="0"/>
+              </a:rPr>
+              <a:t>xyz</a:t>
+            </a:r>
+            <a:r>
+              <a:rPr lang="sv-SE" sz="1000" dirty="0">
+                <a:latin typeface="Courier New" panose="02070309020205020404" pitchFamily="49" charset="0"/>
+                <a:cs typeface="Courier New" panose="02070309020205020404" pitchFamily="49" charset="0"/>
+              </a:rPr>
+              <a:t>)) &gt; 0 ) </a:t>
+            </a:r>
+            <a:r>
+              <a:rPr lang="sv-SE" sz="1000" dirty="0" smtClean="0">
+                <a:latin typeface="Courier New" panose="02070309020205020404" pitchFamily="49" charset="0"/>
+                <a:cs typeface="Courier New" panose="02070309020205020404" pitchFamily="49" charset="0"/>
+              </a:rPr>
+              <a:t>{</a:t>
+            </a:r>
+            <a:br>
+              <a:rPr lang="sv-SE" sz="1000" dirty="0" smtClean="0">
+                <a:latin typeface="Courier New" panose="02070309020205020404" pitchFamily="49" charset="0"/>
+                <a:cs typeface="Courier New" panose="02070309020205020404" pitchFamily="49" charset="0"/>
+              </a:rPr>
+            </a:br>
+            <a:r>
+              <a:rPr lang="sv-SE" sz="1000" dirty="0" smtClean="0">
+                <a:latin typeface="Courier New" panose="02070309020205020404" pitchFamily="49" charset="0"/>
+                <a:cs typeface="Courier New" panose="02070309020205020404" pitchFamily="49" charset="0"/>
+              </a:rPr>
+              <a:t>		sprite[index</a:t>
+            </a:r>
+            <a:r>
+              <a:rPr lang="sv-SE" sz="1000" dirty="0">
+                <a:latin typeface="Courier New" panose="02070309020205020404" pitchFamily="49" charset="0"/>
+                <a:cs typeface="Courier New" panose="02070309020205020404" pitchFamily="49" charset="0"/>
+              </a:rPr>
+              <a:t>].</a:t>
+            </a:r>
+            <a:r>
+              <a:rPr lang="sv-SE" sz="1000" dirty="0" err="1">
+                <a:latin typeface="Courier New" panose="02070309020205020404" pitchFamily="49" charset="0"/>
+                <a:cs typeface="Courier New" panose="02070309020205020404" pitchFamily="49" charset="0"/>
+              </a:rPr>
+              <a:t>position.x</a:t>
+            </a:r>
+            <a:r>
+              <a:rPr lang="sv-SE" sz="1000" dirty="0">
+                <a:latin typeface="Courier New" panose="02070309020205020404" pitchFamily="49" charset="0"/>
+                <a:cs typeface="Courier New" panose="02070309020205020404" pitchFamily="49" charset="0"/>
+              </a:rPr>
+              <a:t> += (globals[0].</a:t>
+            </a:r>
+            <a:r>
+              <a:rPr lang="sv-SE" sz="1000" dirty="0" err="1">
+                <a:latin typeface="Courier New" panose="02070309020205020404" pitchFamily="49" charset="0"/>
+                <a:cs typeface="Courier New" panose="02070309020205020404" pitchFamily="49" charset="0"/>
+              </a:rPr>
+              <a:t>bounding.vertices</a:t>
+            </a:r>
+            <a:r>
+              <a:rPr lang="sv-SE" sz="1000" dirty="0">
+                <a:latin typeface="Courier New" panose="02070309020205020404" pitchFamily="49" charset="0"/>
+                <a:cs typeface="Courier New" panose="02070309020205020404" pitchFamily="49" charset="0"/>
+              </a:rPr>
+              <a:t>[3].x </a:t>
+            </a:r>
+            <a:r>
+              <a:rPr lang="sv-SE" sz="1000" dirty="0" smtClean="0">
+                <a:latin typeface="Courier New" panose="02070309020205020404" pitchFamily="49" charset="0"/>
+                <a:cs typeface="Courier New" panose="02070309020205020404" pitchFamily="49" charset="0"/>
+              </a:rPr>
+              <a:t>–</a:t>
+            </a:r>
+            <a:br>
+              <a:rPr lang="sv-SE" sz="1000" dirty="0" smtClean="0">
+                <a:latin typeface="Courier New" panose="02070309020205020404" pitchFamily="49" charset="0"/>
+                <a:cs typeface="Courier New" panose="02070309020205020404" pitchFamily="49" charset="0"/>
+              </a:rPr>
+            </a:br>
+            <a:r>
+              <a:rPr lang="sv-SE" sz="1000" dirty="0" smtClean="0">
+                <a:latin typeface="Courier New" panose="02070309020205020404" pitchFamily="49" charset="0"/>
+                <a:cs typeface="Courier New" panose="02070309020205020404" pitchFamily="49" charset="0"/>
+              </a:rPr>
+              <a:t>		    sprite[index</a:t>
+            </a:r>
+            <a:r>
+              <a:rPr lang="sv-SE" sz="1000" dirty="0">
+                <a:latin typeface="Courier New" panose="02070309020205020404" pitchFamily="49" charset="0"/>
+                <a:cs typeface="Courier New" panose="02070309020205020404" pitchFamily="49" charset="0"/>
+              </a:rPr>
+              <a:t>].</a:t>
+            </a:r>
+            <a:r>
+              <a:rPr lang="sv-SE" sz="1000" dirty="0" err="1">
+                <a:latin typeface="Courier New" panose="02070309020205020404" pitchFamily="49" charset="0"/>
+                <a:cs typeface="Courier New" panose="02070309020205020404" pitchFamily="49" charset="0"/>
+              </a:rPr>
+              <a:t>position.x</a:t>
+            </a:r>
+            <a:r>
+              <a:rPr lang="sv-SE" sz="1000" dirty="0" smtClean="0">
+                <a:latin typeface="Courier New" panose="02070309020205020404" pitchFamily="49" charset="0"/>
+                <a:cs typeface="Courier New" panose="02070309020205020404" pitchFamily="49" charset="0"/>
+              </a:rPr>
+              <a:t>);</a:t>
+            </a:r>
+            <a:br>
+              <a:rPr lang="sv-SE" sz="1000" dirty="0" smtClean="0">
+                <a:latin typeface="Courier New" panose="02070309020205020404" pitchFamily="49" charset="0"/>
+                <a:cs typeface="Courier New" panose="02070309020205020404" pitchFamily="49" charset="0"/>
+              </a:rPr>
+            </a:br>
+            <a:r>
+              <a:rPr lang="sv-SE" sz="1000" dirty="0" smtClean="0">
+                <a:latin typeface="Courier New" panose="02070309020205020404" pitchFamily="49" charset="0"/>
+                <a:cs typeface="Courier New" panose="02070309020205020404" pitchFamily="49" charset="0"/>
+              </a:rPr>
+              <a:t>		sprite[index</a:t>
+            </a:r>
+            <a:r>
+              <a:rPr lang="sv-SE" sz="1000" dirty="0">
+                <a:latin typeface="Courier New" panose="02070309020205020404" pitchFamily="49" charset="0"/>
+                <a:cs typeface="Courier New" panose="02070309020205020404" pitchFamily="49" charset="0"/>
+              </a:rPr>
+              <a:t>].</a:t>
+            </a:r>
+            <a:r>
+              <a:rPr lang="sv-SE" sz="1000" dirty="0" err="1">
+                <a:latin typeface="Courier New" panose="02070309020205020404" pitchFamily="49" charset="0"/>
+                <a:cs typeface="Courier New" panose="02070309020205020404" pitchFamily="49" charset="0"/>
+              </a:rPr>
+              <a:t>velocity.x</a:t>
+            </a:r>
+            <a:r>
+              <a:rPr lang="sv-SE" sz="1000" dirty="0">
+                <a:latin typeface="Courier New" panose="02070309020205020404" pitchFamily="49" charset="0"/>
+                <a:cs typeface="Courier New" panose="02070309020205020404" pitchFamily="49" charset="0"/>
+              </a:rPr>
+              <a:t> = -sprite[index].</a:t>
+            </a:r>
+            <a:r>
+              <a:rPr lang="sv-SE" sz="1000" dirty="0" err="1">
+                <a:latin typeface="Courier New" panose="02070309020205020404" pitchFamily="49" charset="0"/>
+                <a:cs typeface="Courier New" panose="02070309020205020404" pitchFamily="49" charset="0"/>
+              </a:rPr>
+              <a:t>velocity.x</a:t>
+            </a:r>
+            <a:r>
+              <a:rPr lang="sv-SE" sz="1000" dirty="0">
+                <a:latin typeface="Courier New" panose="02070309020205020404" pitchFamily="49" charset="0"/>
+                <a:cs typeface="Courier New" panose="02070309020205020404" pitchFamily="49" charset="0"/>
+              </a:rPr>
+              <a:t> </a:t>
+            </a:r>
+            <a:r>
+              <a:rPr lang="sv-SE" sz="1000" dirty="0" smtClean="0">
+                <a:latin typeface="Courier New" panose="02070309020205020404" pitchFamily="49" charset="0"/>
+                <a:cs typeface="Courier New" panose="02070309020205020404" pitchFamily="49" charset="0"/>
+              </a:rPr>
+              <a:t>*</a:t>
+            </a:r>
+            <a:br>
+              <a:rPr lang="sv-SE" sz="1000" dirty="0" smtClean="0">
+                <a:latin typeface="Courier New" panose="02070309020205020404" pitchFamily="49" charset="0"/>
+                <a:cs typeface="Courier New" panose="02070309020205020404" pitchFamily="49" charset="0"/>
+              </a:rPr>
+            </a:br>
+            <a:r>
+              <a:rPr lang="sv-SE" sz="1000" dirty="0" smtClean="0">
+                <a:latin typeface="Courier New" panose="02070309020205020404" pitchFamily="49" charset="0"/>
+                <a:cs typeface="Courier New" panose="02070309020205020404" pitchFamily="49" charset="0"/>
+              </a:rPr>
+              <a:t>		    </a:t>
+            </a:r>
+            <a:r>
+              <a:rPr lang="sv-SE" sz="1000" dirty="0" err="1" smtClean="0">
                 <a:latin typeface="Courier New" panose="02070309020205020404" pitchFamily="49" charset="0"/>
                 <a:cs typeface="Courier New" panose="02070309020205020404" pitchFamily="49" charset="0"/>
               </a:rPr>
               <a:t>property</a:t>
             </a:r>
             <a:r>
-              <a:rPr lang="sv-SE" sz="1200" dirty="0" smtClean="0">
+              <a:rPr lang="sv-SE" sz="1000" dirty="0" smtClean="0">
                 <a:latin typeface="Courier New" panose="02070309020205020404" pitchFamily="49" charset="0"/>
                 <a:cs typeface="Courier New" panose="02070309020205020404" pitchFamily="49" charset="0"/>
               </a:rPr>
               <a:t>[index</a:t>
             </a:r>
             <a:r>
-              <a:rPr lang="sv-SE" sz="1200" dirty="0">
+              <a:rPr lang="sv-SE" sz="1000" dirty="0">
                 <a:latin typeface="Courier New" panose="02070309020205020404" pitchFamily="49" charset="0"/>
                 <a:cs typeface="Courier New" panose="02070309020205020404" pitchFamily="49" charset="0"/>
               </a:rPr>
               <a:t>].</a:t>
             </a:r>
             <a:r>
-              <a:rPr lang="sv-SE" sz="1200" dirty="0" err="1">
+              <a:rPr lang="sv-SE" sz="1000" dirty="0" err="1">
                 <a:latin typeface="Courier New" panose="02070309020205020404" pitchFamily="49" charset="0"/>
                 <a:cs typeface="Courier New" panose="02070309020205020404" pitchFamily="49" charset="0"/>
               </a:rPr>
               <a:t>properties.y</a:t>
             </a:r>
             <a:r>
-              <a:rPr lang="sv-SE" sz="1200" dirty="0">
+              <a:rPr lang="sv-SE" sz="1000" dirty="0" smtClean="0">
                 <a:latin typeface="Courier New" panose="02070309020205020404" pitchFamily="49" charset="0"/>
                 <a:cs typeface="Courier New" panose="02070309020205020404" pitchFamily="49" charset="0"/>
               </a:rPr>
               <a:t>;</a:t>
             </a:r>
-          </a:p>
-          <a:p>
-            <a:pPr marL="0" indent="0">
-              <a:buNone/>
-            </a:pPr>
-            <a:r>
-              <a:rPr lang="sv-SE" sz="1200" dirty="0" smtClean="0">
+            <a:br>
+              <a:rPr lang="sv-SE" sz="1000" dirty="0" smtClean="0">
+                <a:latin typeface="Courier New" panose="02070309020205020404" pitchFamily="49" charset="0"/>
+                <a:cs typeface="Courier New" panose="02070309020205020404" pitchFamily="49" charset="0"/>
+              </a:rPr>
+            </a:br>
+            <a:r>
+              <a:rPr lang="sv-SE" sz="1000" dirty="0" smtClean="0">
                 <a:latin typeface="Courier New" panose="02070309020205020404" pitchFamily="49" charset="0"/>
                 <a:cs typeface="Courier New" panose="02070309020205020404" pitchFamily="49" charset="0"/>
               </a:rPr>
               <a:t>	}</a:t>
             </a:r>
-            <a:endParaRPr lang="sv-SE" sz="1200" dirty="0">
-              <a:latin typeface="Courier New" panose="02070309020205020404" pitchFamily="49" charset="0"/>
-              <a:cs typeface="Courier New" panose="02070309020205020404" pitchFamily="49" charset="0"/>
-            </a:endParaRPr>
-          </a:p>
-          <a:p>
-            <a:pPr marL="0" indent="0">
-              <a:buNone/>
-            </a:pPr>
-            <a:r>
-              <a:rPr lang="sv-SE" sz="1200" dirty="0" smtClean="0">
-                <a:latin typeface="Courier New" panose="02070309020205020404" pitchFamily="49" charset="0"/>
-                <a:cs typeface="Courier New" panose="02070309020205020404" pitchFamily="49" charset="0"/>
-              </a:rPr>
-              <a:t>	//</a:t>
-            </a:r>
-            <a:r>
-              <a:rPr lang="sv-SE" sz="1200" dirty="0">
-                <a:latin typeface="Courier New" panose="02070309020205020404" pitchFamily="49" charset="0"/>
-                <a:cs typeface="Courier New" panose="02070309020205020404" pitchFamily="49" charset="0"/>
-              </a:rPr>
-              <a:t>Right </a:t>
-            </a:r>
-            <a:r>
-              <a:rPr lang="sv-SE" sz="1200" dirty="0" smtClean="0">
-                <a:latin typeface="Courier New" panose="02070309020205020404" pitchFamily="49" charset="0"/>
-                <a:cs typeface="Courier New" panose="02070309020205020404" pitchFamily="49" charset="0"/>
-              </a:rPr>
-              <a:t>plane</a:t>
-            </a:r>
-            <a:br>
-              <a:rPr lang="sv-SE" sz="1200" dirty="0" smtClean="0">
-                <a:latin typeface="Courier New" panose="02070309020205020404" pitchFamily="49" charset="0"/>
-                <a:cs typeface="Courier New" panose="02070309020205020404" pitchFamily="49" charset="0"/>
-              </a:rPr>
-            </a:br>
-            <a:r>
-              <a:rPr lang="sv-SE" sz="1200" dirty="0" smtClean="0">
-                <a:latin typeface="Courier New" panose="02070309020205020404" pitchFamily="49" charset="0"/>
-                <a:cs typeface="Courier New" panose="02070309020205020404" pitchFamily="49" charset="0"/>
-              </a:rPr>
-              <a:t>	</a:t>
-            </a:r>
-            <a:r>
-              <a:rPr lang="sv-SE" sz="1200" dirty="0" err="1" smtClean="0">
-                <a:latin typeface="Courier New" panose="02070309020205020404" pitchFamily="49" charset="0"/>
-                <a:cs typeface="Courier New" panose="02070309020205020404" pitchFamily="49" charset="0"/>
-              </a:rPr>
-              <a:t>if</a:t>
-            </a:r>
-            <a:r>
-              <a:rPr lang="sv-SE" sz="1200" dirty="0" smtClean="0">
-                <a:latin typeface="Courier New" panose="02070309020205020404" pitchFamily="49" charset="0"/>
-                <a:cs typeface="Courier New" panose="02070309020205020404" pitchFamily="49" charset="0"/>
-              </a:rPr>
-              <a:t> </a:t>
-            </a:r>
-            <a:r>
-              <a:rPr lang="sv-SE" sz="1200" dirty="0">
-                <a:latin typeface="Courier New" panose="02070309020205020404" pitchFamily="49" charset="0"/>
-                <a:cs typeface="Courier New" panose="02070309020205020404" pitchFamily="49" charset="0"/>
-              </a:rPr>
-              <a:t>(</a:t>
-            </a:r>
-            <a:r>
-              <a:rPr lang="sv-SE" sz="1200" dirty="0" err="1">
-                <a:latin typeface="Courier New" panose="02070309020205020404" pitchFamily="49" charset="0"/>
-                <a:cs typeface="Courier New" panose="02070309020205020404" pitchFamily="49" charset="0"/>
-              </a:rPr>
-              <a:t>dot</a:t>
-            </a:r>
-            <a:r>
-              <a:rPr lang="sv-SE" sz="1200" dirty="0">
-                <a:latin typeface="Courier New" panose="02070309020205020404" pitchFamily="49" charset="0"/>
-                <a:cs typeface="Courier New" panose="02070309020205020404" pitchFamily="49" charset="0"/>
-              </a:rPr>
-              <a:t>(globals[0].</a:t>
-            </a:r>
-            <a:r>
-              <a:rPr lang="sv-SE" sz="1200" dirty="0" err="1">
-                <a:latin typeface="Courier New" panose="02070309020205020404" pitchFamily="49" charset="0"/>
-                <a:cs typeface="Courier New" panose="02070309020205020404" pitchFamily="49" charset="0"/>
-              </a:rPr>
-              <a:t>bounding.crossVectors</a:t>
-            </a:r>
-            <a:r>
-              <a:rPr lang="sv-SE" sz="1200" dirty="0">
-                <a:latin typeface="Courier New" panose="02070309020205020404" pitchFamily="49" charset="0"/>
-                <a:cs typeface="Courier New" panose="02070309020205020404" pitchFamily="49" charset="0"/>
-              </a:rPr>
-              <a:t>[4].</a:t>
-            </a:r>
-            <a:r>
-              <a:rPr lang="sv-SE" sz="1200" u="sng" dirty="0" err="1">
-                <a:latin typeface="Courier New" panose="02070309020205020404" pitchFamily="49" charset="0"/>
-                <a:cs typeface="Courier New" panose="02070309020205020404" pitchFamily="49" charset="0"/>
-              </a:rPr>
-              <a:t>xyz</a:t>
-            </a:r>
-            <a:r>
-              <a:rPr lang="sv-SE" sz="1200" u="sng" dirty="0">
-                <a:latin typeface="Courier New" panose="02070309020205020404" pitchFamily="49" charset="0"/>
-                <a:cs typeface="Courier New" panose="02070309020205020404" pitchFamily="49" charset="0"/>
-              </a:rPr>
-              <a:t>, </a:t>
-            </a:r>
-            <a:r>
-              <a:rPr lang="sv-SE" sz="1200" u="sng" dirty="0" smtClean="0">
-                <a:latin typeface="Courier New" panose="02070309020205020404" pitchFamily="49" charset="0"/>
-                <a:cs typeface="Courier New" panose="02070309020205020404" pitchFamily="49" charset="0"/>
-              </a:rPr>
-              <a:t>	(</a:t>
-            </a:r>
-            <a:r>
-              <a:rPr lang="sv-SE" sz="1200" u="sng" dirty="0">
-                <a:latin typeface="Courier New" panose="02070309020205020404" pitchFamily="49" charset="0"/>
-                <a:cs typeface="Courier New" panose="02070309020205020404" pitchFamily="49" charset="0"/>
-              </a:rPr>
-              <a:t>sprite[index].</a:t>
-            </a:r>
-            <a:r>
-              <a:rPr lang="sv-SE" sz="1200" u="sng" dirty="0" err="1">
-                <a:latin typeface="Courier New" panose="02070309020205020404" pitchFamily="49" charset="0"/>
-                <a:cs typeface="Courier New" panose="02070309020205020404" pitchFamily="49" charset="0"/>
-              </a:rPr>
-              <a:t>position.xyz</a:t>
-            </a:r>
-            <a:r>
-              <a:rPr lang="sv-SE" sz="1200" u="sng" dirty="0">
-                <a:latin typeface="Courier New" panose="02070309020205020404" pitchFamily="49" charset="0"/>
-                <a:cs typeface="Courier New" panose="02070309020205020404" pitchFamily="49" charset="0"/>
-              </a:rPr>
-              <a:t> - globals[0].</a:t>
-            </a:r>
-            <a:r>
-              <a:rPr lang="sv-SE" sz="1200" u="sng" dirty="0" err="1">
-                <a:latin typeface="Courier New" panose="02070309020205020404" pitchFamily="49" charset="0"/>
-                <a:cs typeface="Courier New" panose="02070309020205020404" pitchFamily="49" charset="0"/>
-              </a:rPr>
-              <a:t>bounding.vertices</a:t>
-            </a:r>
-            <a:r>
-              <a:rPr lang="sv-SE" sz="1200" u="sng" dirty="0">
-                <a:latin typeface="Courier New" panose="02070309020205020404" pitchFamily="49" charset="0"/>
-                <a:cs typeface="Courier New" panose="02070309020205020404" pitchFamily="49" charset="0"/>
-              </a:rPr>
-              <a:t>[3].</a:t>
-            </a:r>
-            <a:r>
-              <a:rPr lang="sv-SE" sz="1200" u="sng" dirty="0" err="1">
-                <a:latin typeface="Courier New" panose="02070309020205020404" pitchFamily="49" charset="0"/>
-                <a:cs typeface="Courier New" panose="02070309020205020404" pitchFamily="49" charset="0"/>
-              </a:rPr>
-              <a:t>xyz</a:t>
-            </a:r>
-            <a:r>
-              <a:rPr lang="sv-SE" sz="1200" u="sng" dirty="0">
-                <a:latin typeface="Courier New" panose="02070309020205020404" pitchFamily="49" charset="0"/>
-                <a:cs typeface="Courier New" panose="02070309020205020404" pitchFamily="49" charset="0"/>
-              </a:rPr>
-              <a:t>)) &gt; 0 </a:t>
-            </a:r>
-            <a:r>
-              <a:rPr lang="sv-SE" sz="1200" u="sng" dirty="0" smtClean="0">
-                <a:latin typeface="Courier New" panose="02070309020205020404" pitchFamily="49" charset="0"/>
-                <a:cs typeface="Courier New" panose="02070309020205020404" pitchFamily="49" charset="0"/>
-              </a:rPr>
-              <a:t>	) {</a:t>
-            </a:r>
-            <a:br>
-              <a:rPr lang="sv-SE" sz="1200" u="sng" dirty="0" smtClean="0">
-                <a:latin typeface="Courier New" panose="02070309020205020404" pitchFamily="49" charset="0"/>
-                <a:cs typeface="Courier New" panose="02070309020205020404" pitchFamily="49" charset="0"/>
-              </a:rPr>
-            </a:br>
-            <a:r>
-              <a:rPr lang="sv-SE" sz="1200" u="sng" dirty="0" smtClean="0">
-                <a:latin typeface="Courier New" panose="02070309020205020404" pitchFamily="49" charset="0"/>
-                <a:cs typeface="Courier New" panose="02070309020205020404" pitchFamily="49" charset="0"/>
-              </a:rPr>
-              <a:t>	</a:t>
-            </a:r>
-            <a:r>
-              <a:rPr lang="sv-SE" sz="1200" dirty="0" smtClean="0">
-                <a:latin typeface="Courier New" panose="02070309020205020404" pitchFamily="49" charset="0"/>
-                <a:cs typeface="Courier New" panose="02070309020205020404" pitchFamily="49" charset="0"/>
-              </a:rPr>
-              <a:t>sprite[index</a:t>
-            </a:r>
-            <a:r>
-              <a:rPr lang="sv-SE" sz="1200" dirty="0">
-                <a:latin typeface="Courier New" panose="02070309020205020404" pitchFamily="49" charset="0"/>
-                <a:cs typeface="Courier New" panose="02070309020205020404" pitchFamily="49" charset="0"/>
-              </a:rPr>
-              <a:t>].</a:t>
-            </a:r>
-            <a:r>
-              <a:rPr lang="sv-SE" sz="1200" dirty="0" err="1">
-                <a:latin typeface="Courier New" panose="02070309020205020404" pitchFamily="49" charset="0"/>
-                <a:cs typeface="Courier New" panose="02070309020205020404" pitchFamily="49" charset="0"/>
-              </a:rPr>
-              <a:t>position.x</a:t>
-            </a:r>
-            <a:r>
-              <a:rPr lang="sv-SE" sz="1200" dirty="0">
-                <a:latin typeface="Courier New" panose="02070309020205020404" pitchFamily="49" charset="0"/>
-                <a:cs typeface="Courier New" panose="02070309020205020404" pitchFamily="49" charset="0"/>
-              </a:rPr>
-              <a:t> += (globals[0].</a:t>
-            </a:r>
-            <a:r>
-              <a:rPr lang="sv-SE" sz="1200" dirty="0" err="1">
-                <a:latin typeface="Courier New" panose="02070309020205020404" pitchFamily="49" charset="0"/>
-                <a:cs typeface="Courier New" panose="02070309020205020404" pitchFamily="49" charset="0"/>
-              </a:rPr>
-              <a:t>bounding.vertices</a:t>
-            </a:r>
-            <a:r>
-              <a:rPr lang="sv-SE" sz="1200" dirty="0">
-                <a:latin typeface="Courier New" panose="02070309020205020404" pitchFamily="49" charset="0"/>
-                <a:cs typeface="Courier New" panose="02070309020205020404" pitchFamily="49" charset="0"/>
-              </a:rPr>
-              <a:t>[3].x - </a:t>
-            </a:r>
-            <a:r>
-              <a:rPr lang="sv-SE" sz="1200" dirty="0" smtClean="0">
-                <a:latin typeface="Courier New" panose="02070309020205020404" pitchFamily="49" charset="0"/>
-                <a:cs typeface="Courier New" panose="02070309020205020404" pitchFamily="49" charset="0"/>
-              </a:rPr>
-              <a:t>	sprite[index</a:t>
-            </a:r>
-            <a:r>
-              <a:rPr lang="sv-SE" sz="1200" dirty="0">
-                <a:latin typeface="Courier New" panose="02070309020205020404" pitchFamily="49" charset="0"/>
-                <a:cs typeface="Courier New" panose="02070309020205020404" pitchFamily="49" charset="0"/>
-              </a:rPr>
-              <a:t>].</a:t>
-            </a:r>
-            <a:r>
-              <a:rPr lang="sv-SE" sz="1200" dirty="0" err="1">
-                <a:latin typeface="Courier New" panose="02070309020205020404" pitchFamily="49" charset="0"/>
-                <a:cs typeface="Courier New" panose="02070309020205020404" pitchFamily="49" charset="0"/>
-              </a:rPr>
-              <a:t>position.x</a:t>
-            </a:r>
-            <a:r>
-              <a:rPr lang="sv-SE" sz="1200" dirty="0" smtClean="0">
-                <a:latin typeface="Courier New" panose="02070309020205020404" pitchFamily="49" charset="0"/>
-                <a:cs typeface="Courier New" panose="02070309020205020404" pitchFamily="49" charset="0"/>
-              </a:rPr>
-              <a:t>);</a:t>
-            </a:r>
-          </a:p>
-          <a:p>
-            <a:pPr marL="0" indent="0">
-              <a:buNone/>
-            </a:pPr>
-            <a:r>
-              <a:rPr lang="sv-SE" sz="1200" dirty="0">
-                <a:latin typeface="Courier New" panose="02070309020205020404" pitchFamily="49" charset="0"/>
-                <a:cs typeface="Courier New" panose="02070309020205020404" pitchFamily="49" charset="0"/>
-              </a:rPr>
-              <a:t>	</a:t>
-            </a:r>
-            <a:r>
-              <a:rPr lang="sv-SE" sz="1200" dirty="0" smtClean="0">
-                <a:latin typeface="Courier New" panose="02070309020205020404" pitchFamily="49" charset="0"/>
-                <a:cs typeface="Courier New" panose="02070309020205020404" pitchFamily="49" charset="0"/>
-              </a:rPr>
-              <a:t>sprite[index</a:t>
-            </a:r>
-            <a:r>
-              <a:rPr lang="sv-SE" sz="1200" dirty="0">
-                <a:latin typeface="Courier New" panose="02070309020205020404" pitchFamily="49" charset="0"/>
-                <a:cs typeface="Courier New" panose="02070309020205020404" pitchFamily="49" charset="0"/>
-              </a:rPr>
-              <a:t>].</a:t>
-            </a:r>
-            <a:r>
-              <a:rPr lang="sv-SE" sz="1200" dirty="0" err="1">
-                <a:latin typeface="Courier New" panose="02070309020205020404" pitchFamily="49" charset="0"/>
-                <a:cs typeface="Courier New" panose="02070309020205020404" pitchFamily="49" charset="0"/>
-              </a:rPr>
-              <a:t>velocity.x</a:t>
-            </a:r>
-            <a:r>
-              <a:rPr lang="sv-SE" sz="1200" dirty="0">
-                <a:latin typeface="Courier New" panose="02070309020205020404" pitchFamily="49" charset="0"/>
-                <a:cs typeface="Courier New" panose="02070309020205020404" pitchFamily="49" charset="0"/>
-              </a:rPr>
-              <a:t> = -sprite[index].</a:t>
-            </a:r>
-            <a:r>
-              <a:rPr lang="sv-SE" sz="1200" dirty="0" err="1">
-                <a:latin typeface="Courier New" panose="02070309020205020404" pitchFamily="49" charset="0"/>
-                <a:cs typeface="Courier New" panose="02070309020205020404" pitchFamily="49" charset="0"/>
-              </a:rPr>
-              <a:t>velocity.x</a:t>
-            </a:r>
-            <a:r>
-              <a:rPr lang="sv-SE" sz="1200" dirty="0">
-                <a:latin typeface="Courier New" panose="02070309020205020404" pitchFamily="49" charset="0"/>
-                <a:cs typeface="Courier New" panose="02070309020205020404" pitchFamily="49" charset="0"/>
-              </a:rPr>
-              <a:t> </a:t>
-            </a:r>
-            <a:r>
-              <a:rPr lang="sv-SE" sz="1200" dirty="0" smtClean="0">
-                <a:latin typeface="Courier New" panose="02070309020205020404" pitchFamily="49" charset="0"/>
-                <a:cs typeface="Courier New" panose="02070309020205020404" pitchFamily="49" charset="0"/>
-              </a:rPr>
-              <a:t>*	</a:t>
-            </a:r>
-            <a:r>
-              <a:rPr lang="sv-SE" sz="1200" dirty="0" err="1" smtClean="0">
-                <a:latin typeface="Courier New" panose="02070309020205020404" pitchFamily="49" charset="0"/>
-                <a:cs typeface="Courier New" panose="02070309020205020404" pitchFamily="49" charset="0"/>
-              </a:rPr>
-              <a:t>property</a:t>
-            </a:r>
-            <a:r>
-              <a:rPr lang="sv-SE" sz="1200" dirty="0" smtClean="0">
-                <a:latin typeface="Courier New" panose="02070309020205020404" pitchFamily="49" charset="0"/>
-                <a:cs typeface="Courier New" panose="02070309020205020404" pitchFamily="49" charset="0"/>
-              </a:rPr>
-              <a:t>[index</a:t>
-            </a:r>
-            <a:r>
-              <a:rPr lang="sv-SE" sz="1200" dirty="0">
-                <a:latin typeface="Courier New" panose="02070309020205020404" pitchFamily="49" charset="0"/>
-                <a:cs typeface="Courier New" panose="02070309020205020404" pitchFamily="49" charset="0"/>
-              </a:rPr>
-              <a:t>].</a:t>
-            </a:r>
-            <a:r>
-              <a:rPr lang="sv-SE" sz="1200" dirty="0" err="1">
-                <a:latin typeface="Courier New" panose="02070309020205020404" pitchFamily="49" charset="0"/>
-                <a:cs typeface="Courier New" panose="02070309020205020404" pitchFamily="49" charset="0"/>
-              </a:rPr>
-              <a:t>properties.y</a:t>
-            </a:r>
-            <a:r>
-              <a:rPr lang="sv-SE" sz="1200" dirty="0">
-                <a:latin typeface="Courier New" panose="02070309020205020404" pitchFamily="49" charset="0"/>
-                <a:cs typeface="Courier New" panose="02070309020205020404" pitchFamily="49" charset="0"/>
-              </a:rPr>
-              <a:t>;</a:t>
-            </a:r>
-          </a:p>
-          <a:p>
-            <a:pPr marL="0" indent="0">
-              <a:buNone/>
-            </a:pPr>
-            <a:r>
-              <a:rPr lang="sv-SE" sz="1200" smtClean="0">
-                <a:latin typeface="Courier New" panose="02070309020205020404" pitchFamily="49" charset="0"/>
-                <a:cs typeface="Courier New" panose="02070309020205020404" pitchFamily="49" charset="0"/>
-              </a:rPr>
-              <a:t>	}</a:t>
-            </a:r>
-            <a:endParaRPr lang="sv-SE" sz="1200" dirty="0">
+            <a:endParaRPr lang="sv-SE" sz="1000" dirty="0">
               <a:latin typeface="Courier New" panose="02070309020205020404" pitchFamily="49" charset="0"/>
               <a:cs typeface="Courier New" panose="02070309020205020404" pitchFamily="49" charset="0"/>
             </a:endParaRPr>
@@ -11821,25 +13059,6 @@
       </p:sp>
       <p:sp>
         <p:nvSpPr>
-          <p:cNvPr id="3" name="Text Placeholder 2"/>
-          <p:cNvSpPr>
-            <a:spLocks noGrp="1"/>
-          </p:cNvSpPr>
-          <p:nvPr>
-            <p:ph type="body" idx="10"/>
-          </p:nvPr>
-        </p:nvSpPr>
-        <p:spPr/>
-        <p:txBody>
-          <a:bodyPr/>
-          <a:lstStyle/>
-          <a:p>
-            <a:endParaRPr lang="sv-SE"/>
-          </a:p>
-        </p:txBody>
-      </p:sp>
-      <p:sp>
-        <p:nvSpPr>
           <p:cNvPr id="4" name="Content Placeholder 3"/>
           <p:cNvSpPr>
             <a:spLocks noGrp="1"/>
@@ -11848,275 +13067,1194 @@
             <p:ph idx="1"/>
           </p:nvPr>
         </p:nvSpPr>
-        <p:spPr/>
+        <p:spPr>
+          <a:xfrm>
+            <a:off x="1439863" y="950745"/>
+            <a:ext cx="7236000" cy="3975673"/>
+          </a:xfrm>
+        </p:spPr>
         <p:txBody>
           <a:bodyPr/>
           <a:lstStyle/>
           <a:p>
-            <a:r>
-              <a:rPr lang="sv-SE" sz="1200" dirty="0">
-                <a:latin typeface="Courier New" panose="02070309020205020404" pitchFamily="49" charset="0"/>
-                <a:cs typeface="Courier New" panose="02070309020205020404" pitchFamily="49" charset="0"/>
-              </a:rPr>
-              <a:t>//</a:t>
-            </a:r>
-            <a:r>
-              <a:rPr lang="sv-SE" sz="1200" dirty="0" err="1">
+            <a:pPr marL="0" indent="0">
+              <a:buNone/>
+            </a:pPr>
+            <a:r>
+              <a:rPr lang="sv-SE" sz="1000" dirty="0" smtClean="0">
+                <a:latin typeface="Courier New" panose="02070309020205020404" pitchFamily="49" charset="0"/>
+                <a:cs typeface="Courier New" panose="02070309020205020404" pitchFamily="49" charset="0"/>
+              </a:rPr>
+              <a:t>	//</a:t>
+            </a:r>
+            <a:r>
+              <a:rPr lang="sv-SE" sz="1000" dirty="0" err="1">
                 <a:latin typeface="Courier New" panose="02070309020205020404" pitchFamily="49" charset="0"/>
                 <a:cs typeface="Courier New" panose="02070309020205020404" pitchFamily="49" charset="0"/>
               </a:rPr>
               <a:t>Left</a:t>
             </a:r>
             <a:r>
-              <a:rPr lang="sv-SE" sz="1200" dirty="0">
-                <a:latin typeface="Courier New" panose="02070309020205020404" pitchFamily="49" charset="0"/>
-                <a:cs typeface="Courier New" panose="02070309020205020404" pitchFamily="49" charset="0"/>
-              </a:rPr>
-              <a:t> plane</a:t>
-            </a:r>
-          </a:p>
-          <a:p>
-            <a:r>
-              <a:rPr lang="sv-SE" sz="1200" dirty="0" err="1">
+              <a:rPr lang="sv-SE" sz="1000" dirty="0">
+                <a:latin typeface="Courier New" panose="02070309020205020404" pitchFamily="49" charset="0"/>
+                <a:cs typeface="Courier New" panose="02070309020205020404" pitchFamily="49" charset="0"/>
+              </a:rPr>
+              <a:t> </a:t>
+            </a:r>
+            <a:r>
+              <a:rPr lang="sv-SE" sz="1000" dirty="0" smtClean="0">
+                <a:latin typeface="Courier New" panose="02070309020205020404" pitchFamily="49" charset="0"/>
+                <a:cs typeface="Courier New" panose="02070309020205020404" pitchFamily="49" charset="0"/>
+              </a:rPr>
+              <a:t>plane</a:t>
+            </a:r>
+            <a:br>
+              <a:rPr lang="sv-SE" sz="1000" dirty="0" smtClean="0">
+                <a:latin typeface="Courier New" panose="02070309020205020404" pitchFamily="49" charset="0"/>
+                <a:cs typeface="Courier New" panose="02070309020205020404" pitchFamily="49" charset="0"/>
+              </a:rPr>
+            </a:br>
+            <a:r>
+              <a:rPr lang="sv-SE" sz="1000" dirty="0" smtClean="0">
+                <a:latin typeface="Courier New" panose="02070309020205020404" pitchFamily="49" charset="0"/>
+                <a:cs typeface="Courier New" panose="02070309020205020404" pitchFamily="49" charset="0"/>
+              </a:rPr>
+              <a:t>	</a:t>
+            </a:r>
+            <a:r>
+              <a:rPr lang="sv-SE" sz="1000" dirty="0" err="1" smtClean="0">
                 <a:latin typeface="Courier New" panose="02070309020205020404" pitchFamily="49" charset="0"/>
                 <a:cs typeface="Courier New" panose="02070309020205020404" pitchFamily="49" charset="0"/>
               </a:rPr>
               <a:t>if</a:t>
             </a:r>
             <a:r>
-              <a:rPr lang="sv-SE" sz="1200" dirty="0">
-                <a:latin typeface="Courier New" panose="02070309020205020404" pitchFamily="49" charset="0"/>
-                <a:cs typeface="Courier New" panose="02070309020205020404" pitchFamily="49" charset="0"/>
-              </a:rPr>
-              <a:t> (</a:t>
-            </a:r>
-            <a:r>
-              <a:rPr lang="sv-SE" sz="1200" dirty="0" err="1">
+              <a:rPr lang="sv-SE" sz="1000" dirty="0" smtClean="0">
+                <a:latin typeface="Courier New" panose="02070309020205020404" pitchFamily="49" charset="0"/>
+                <a:cs typeface="Courier New" panose="02070309020205020404" pitchFamily="49" charset="0"/>
+              </a:rPr>
+              <a:t> </a:t>
+            </a:r>
+            <a:r>
+              <a:rPr lang="sv-SE" sz="1000" dirty="0">
+                <a:latin typeface="Courier New" panose="02070309020205020404" pitchFamily="49" charset="0"/>
+                <a:cs typeface="Courier New" panose="02070309020205020404" pitchFamily="49" charset="0"/>
+              </a:rPr>
+              <a:t>(</a:t>
+            </a:r>
+            <a:r>
+              <a:rPr lang="sv-SE" sz="1000" dirty="0" err="1">
                 <a:latin typeface="Courier New" panose="02070309020205020404" pitchFamily="49" charset="0"/>
                 <a:cs typeface="Courier New" panose="02070309020205020404" pitchFamily="49" charset="0"/>
               </a:rPr>
               <a:t>dot</a:t>
             </a:r>
             <a:r>
-              <a:rPr lang="sv-SE" sz="1200" dirty="0">
+              <a:rPr lang="sv-SE" sz="1000" dirty="0">
                 <a:latin typeface="Courier New" panose="02070309020205020404" pitchFamily="49" charset="0"/>
                 <a:cs typeface="Courier New" panose="02070309020205020404" pitchFamily="49" charset="0"/>
               </a:rPr>
               <a:t>(globals[0].</a:t>
             </a:r>
             <a:r>
-              <a:rPr lang="sv-SE" sz="1200" dirty="0" err="1">
+              <a:rPr lang="sv-SE" sz="1000" dirty="0" err="1">
                 <a:latin typeface="Courier New" panose="02070309020205020404" pitchFamily="49" charset="0"/>
                 <a:cs typeface="Courier New" panose="02070309020205020404" pitchFamily="49" charset="0"/>
               </a:rPr>
               <a:t>bounding.crossVectors</a:t>
             </a:r>
             <a:r>
-              <a:rPr lang="sv-SE" sz="1200" dirty="0">
+              <a:rPr lang="sv-SE" sz="1000" dirty="0">
                 <a:latin typeface="Courier New" panose="02070309020205020404" pitchFamily="49" charset="0"/>
                 <a:cs typeface="Courier New" panose="02070309020205020404" pitchFamily="49" charset="0"/>
               </a:rPr>
               <a:t>[3].</a:t>
             </a:r>
             <a:r>
-              <a:rPr lang="sv-SE" sz="1200" u="sng" dirty="0" err="1">
+              <a:rPr lang="sv-SE" sz="1000" dirty="0" err="1">
                 <a:latin typeface="Courier New" panose="02070309020205020404" pitchFamily="49" charset="0"/>
                 <a:cs typeface="Courier New" panose="02070309020205020404" pitchFamily="49" charset="0"/>
               </a:rPr>
               <a:t>xyz</a:t>
             </a:r>
             <a:r>
-              <a:rPr lang="sv-SE" sz="1200" u="sng" dirty="0">
+              <a:rPr lang="sv-SE" sz="1000" dirty="0">
                 <a:latin typeface="Courier New" panose="02070309020205020404" pitchFamily="49" charset="0"/>
                 <a:cs typeface="Courier New" panose="02070309020205020404" pitchFamily="49" charset="0"/>
               </a:rPr>
               <a:t>, (sprite[index].</a:t>
             </a:r>
             <a:r>
-              <a:rPr lang="sv-SE" sz="1200" u="sng" dirty="0" err="1">
+              <a:rPr lang="sv-SE" sz="1000" dirty="0" err="1">
                 <a:latin typeface="Courier New" panose="02070309020205020404" pitchFamily="49" charset="0"/>
                 <a:cs typeface="Courier New" panose="02070309020205020404" pitchFamily="49" charset="0"/>
               </a:rPr>
               <a:t>position.xyz</a:t>
             </a:r>
             <a:r>
-              <a:rPr lang="sv-SE" sz="1200" u="sng" dirty="0">
-                <a:latin typeface="Courier New" panose="02070309020205020404" pitchFamily="49" charset="0"/>
-                <a:cs typeface="Courier New" panose="02070309020205020404" pitchFamily="49" charset="0"/>
-              </a:rPr>
-              <a:t> - globals[0].</a:t>
-            </a:r>
-            <a:r>
-              <a:rPr lang="sv-SE" sz="1200" u="sng" dirty="0" err="1">
+              <a:rPr lang="sv-SE" sz="1000" dirty="0">
+                <a:latin typeface="Courier New" panose="02070309020205020404" pitchFamily="49" charset="0"/>
+                <a:cs typeface="Courier New" panose="02070309020205020404" pitchFamily="49" charset="0"/>
+              </a:rPr>
+              <a:t> </a:t>
+            </a:r>
+            <a:r>
+              <a:rPr lang="sv-SE" sz="1000" dirty="0" smtClean="0">
+                <a:latin typeface="Courier New" panose="02070309020205020404" pitchFamily="49" charset="0"/>
+                <a:cs typeface="Courier New" panose="02070309020205020404" pitchFamily="49" charset="0"/>
+              </a:rPr>
+              <a:t>–</a:t>
+            </a:r>
+            <a:br>
+              <a:rPr lang="sv-SE" sz="1000" dirty="0" smtClean="0">
+                <a:latin typeface="Courier New" panose="02070309020205020404" pitchFamily="49" charset="0"/>
+                <a:cs typeface="Courier New" panose="02070309020205020404" pitchFamily="49" charset="0"/>
+              </a:rPr>
+            </a:br>
+            <a:r>
+              <a:rPr lang="sv-SE" sz="1000" dirty="0" smtClean="0">
+                <a:latin typeface="Courier New" panose="02070309020205020404" pitchFamily="49" charset="0"/>
+                <a:cs typeface="Courier New" panose="02070309020205020404" pitchFamily="49" charset="0"/>
+              </a:rPr>
+              <a:t>	    globals[0</a:t>
+            </a:r>
+            <a:r>
+              <a:rPr lang="sv-SE" sz="1000" dirty="0">
+                <a:latin typeface="Courier New" panose="02070309020205020404" pitchFamily="49" charset="0"/>
+                <a:cs typeface="Courier New" panose="02070309020205020404" pitchFamily="49" charset="0"/>
+              </a:rPr>
+              <a:t>].</a:t>
+            </a:r>
+            <a:r>
+              <a:rPr lang="sv-SE" sz="1000" dirty="0" err="1">
                 <a:latin typeface="Courier New" panose="02070309020205020404" pitchFamily="49" charset="0"/>
                 <a:cs typeface="Courier New" panose="02070309020205020404" pitchFamily="49" charset="0"/>
               </a:rPr>
               <a:t>bounding.vertices</a:t>
             </a:r>
             <a:r>
-              <a:rPr lang="sv-SE" sz="1200" u="sng" dirty="0">
+              <a:rPr lang="sv-SE" sz="1000" dirty="0">
                 <a:latin typeface="Courier New" panose="02070309020205020404" pitchFamily="49" charset="0"/>
                 <a:cs typeface="Courier New" panose="02070309020205020404" pitchFamily="49" charset="0"/>
               </a:rPr>
               <a:t>[0].</a:t>
             </a:r>
             <a:r>
-              <a:rPr lang="sv-SE" sz="1200" u="sng" dirty="0" err="1">
+              <a:rPr lang="sv-SE" sz="1000" dirty="0" err="1">
                 <a:latin typeface="Courier New" panose="02070309020205020404" pitchFamily="49" charset="0"/>
                 <a:cs typeface="Courier New" panose="02070309020205020404" pitchFamily="49" charset="0"/>
               </a:rPr>
               <a:t>xyz</a:t>
             </a:r>
             <a:r>
-              <a:rPr lang="sv-SE" sz="1200" u="sng" dirty="0">
-                <a:latin typeface="Courier New" panose="02070309020205020404" pitchFamily="49" charset="0"/>
-                <a:cs typeface="Courier New" panose="02070309020205020404" pitchFamily="49" charset="0"/>
-              </a:rPr>
-              <a:t>)) &gt; 0 ) {</a:t>
-            </a:r>
-          </a:p>
-          <a:p>
-            <a:r>
-              <a:rPr lang="sv-SE" sz="1200" dirty="0">
-                <a:latin typeface="Courier New" panose="02070309020205020404" pitchFamily="49" charset="0"/>
-                <a:cs typeface="Courier New" panose="02070309020205020404" pitchFamily="49" charset="0"/>
-              </a:rPr>
-              <a:t>sprite[index].</a:t>
-            </a:r>
-            <a:r>
-              <a:rPr lang="sv-SE" sz="1200" dirty="0" err="1">
+              <a:rPr lang="sv-SE" sz="1000" dirty="0">
+                <a:latin typeface="Courier New" panose="02070309020205020404" pitchFamily="49" charset="0"/>
+                <a:cs typeface="Courier New" panose="02070309020205020404" pitchFamily="49" charset="0"/>
+              </a:rPr>
+              <a:t>)) &gt; 0 ) </a:t>
+            </a:r>
+            <a:r>
+              <a:rPr lang="sv-SE" sz="1000" dirty="0" smtClean="0">
+                <a:latin typeface="Courier New" panose="02070309020205020404" pitchFamily="49" charset="0"/>
+                <a:cs typeface="Courier New" panose="02070309020205020404" pitchFamily="49" charset="0"/>
+              </a:rPr>
+              <a:t>{</a:t>
+            </a:r>
+            <a:br>
+              <a:rPr lang="sv-SE" sz="1000" dirty="0" smtClean="0">
+                <a:latin typeface="Courier New" panose="02070309020205020404" pitchFamily="49" charset="0"/>
+                <a:cs typeface="Courier New" panose="02070309020205020404" pitchFamily="49" charset="0"/>
+              </a:rPr>
+            </a:br>
+            <a:r>
+              <a:rPr lang="sv-SE" sz="1000" dirty="0" smtClean="0">
+                <a:latin typeface="Courier New" panose="02070309020205020404" pitchFamily="49" charset="0"/>
+                <a:cs typeface="Courier New" panose="02070309020205020404" pitchFamily="49" charset="0"/>
+              </a:rPr>
+              <a:t>		sprite[index</a:t>
+            </a:r>
+            <a:r>
+              <a:rPr lang="sv-SE" sz="1000" dirty="0">
+                <a:latin typeface="Courier New" panose="02070309020205020404" pitchFamily="49" charset="0"/>
+                <a:cs typeface="Courier New" panose="02070309020205020404" pitchFamily="49" charset="0"/>
+              </a:rPr>
+              <a:t>].</a:t>
+            </a:r>
+            <a:r>
+              <a:rPr lang="sv-SE" sz="1000" dirty="0" err="1">
                 <a:latin typeface="Courier New" panose="02070309020205020404" pitchFamily="49" charset="0"/>
                 <a:cs typeface="Courier New" panose="02070309020205020404" pitchFamily="49" charset="0"/>
               </a:rPr>
               <a:t>position.x</a:t>
             </a:r>
             <a:r>
-              <a:rPr lang="sv-SE" sz="1200" dirty="0">
+              <a:rPr lang="sv-SE" sz="1000" dirty="0">
                 <a:latin typeface="Courier New" panose="02070309020205020404" pitchFamily="49" charset="0"/>
                 <a:cs typeface="Courier New" panose="02070309020205020404" pitchFamily="49" charset="0"/>
               </a:rPr>
               <a:t> -= (sprite[index].</a:t>
             </a:r>
             <a:r>
-              <a:rPr lang="sv-SE" sz="1200" dirty="0" err="1">
+              <a:rPr lang="sv-SE" sz="1000" dirty="0" err="1">
                 <a:latin typeface="Courier New" panose="02070309020205020404" pitchFamily="49" charset="0"/>
                 <a:cs typeface="Courier New" panose="02070309020205020404" pitchFamily="49" charset="0"/>
               </a:rPr>
               <a:t>position.x</a:t>
             </a:r>
             <a:r>
-              <a:rPr lang="sv-SE" sz="1200" dirty="0">
-                <a:latin typeface="Courier New" panose="02070309020205020404" pitchFamily="49" charset="0"/>
-                <a:cs typeface="Courier New" panose="02070309020205020404" pitchFamily="49" charset="0"/>
-              </a:rPr>
-              <a:t> - globals[0].</a:t>
-            </a:r>
-            <a:r>
-              <a:rPr lang="sv-SE" sz="1200" dirty="0" err="1">
+              <a:rPr lang="sv-SE" sz="1000" dirty="0">
+                <a:latin typeface="Courier New" panose="02070309020205020404" pitchFamily="49" charset="0"/>
+                <a:cs typeface="Courier New" panose="02070309020205020404" pitchFamily="49" charset="0"/>
+              </a:rPr>
+              <a:t> </a:t>
+            </a:r>
+            <a:r>
+              <a:rPr lang="sv-SE" sz="1000" dirty="0" smtClean="0">
+                <a:latin typeface="Courier New" panose="02070309020205020404" pitchFamily="49" charset="0"/>
+                <a:cs typeface="Courier New" panose="02070309020205020404" pitchFamily="49" charset="0"/>
+              </a:rPr>
+              <a:t>–</a:t>
+            </a:r>
+            <a:br>
+              <a:rPr lang="sv-SE" sz="1000" dirty="0" smtClean="0">
+                <a:latin typeface="Courier New" panose="02070309020205020404" pitchFamily="49" charset="0"/>
+                <a:cs typeface="Courier New" panose="02070309020205020404" pitchFamily="49" charset="0"/>
+              </a:rPr>
+            </a:br>
+            <a:r>
+              <a:rPr lang="sv-SE" sz="1000" dirty="0">
+                <a:latin typeface="Courier New" panose="02070309020205020404" pitchFamily="49" charset="0"/>
+                <a:cs typeface="Courier New" panose="02070309020205020404" pitchFamily="49" charset="0"/>
+              </a:rPr>
+              <a:t>	</a:t>
+            </a:r>
+            <a:r>
+              <a:rPr lang="sv-SE" sz="1000" dirty="0" smtClean="0">
+                <a:latin typeface="Courier New" panose="02070309020205020404" pitchFamily="49" charset="0"/>
+                <a:cs typeface="Courier New" panose="02070309020205020404" pitchFamily="49" charset="0"/>
+              </a:rPr>
+              <a:t>	    globals[0</a:t>
+            </a:r>
+            <a:r>
+              <a:rPr lang="sv-SE" sz="1000" dirty="0">
+                <a:latin typeface="Courier New" panose="02070309020205020404" pitchFamily="49" charset="0"/>
+                <a:cs typeface="Courier New" panose="02070309020205020404" pitchFamily="49" charset="0"/>
+              </a:rPr>
+              <a:t>].</a:t>
+            </a:r>
+            <a:r>
+              <a:rPr lang="sv-SE" sz="1000" dirty="0" err="1">
                 <a:latin typeface="Courier New" panose="02070309020205020404" pitchFamily="49" charset="0"/>
                 <a:cs typeface="Courier New" panose="02070309020205020404" pitchFamily="49" charset="0"/>
               </a:rPr>
               <a:t>bounding.vertices</a:t>
             </a:r>
             <a:r>
-              <a:rPr lang="sv-SE" sz="1200" dirty="0">
-                <a:latin typeface="Courier New" panose="02070309020205020404" pitchFamily="49" charset="0"/>
-                <a:cs typeface="Courier New" panose="02070309020205020404" pitchFamily="49" charset="0"/>
-              </a:rPr>
-              <a:t>[0].x);</a:t>
-            </a:r>
-          </a:p>
-          <a:p>
-            <a:r>
-              <a:rPr lang="sv-SE" sz="1200" dirty="0">
-                <a:latin typeface="Courier New" panose="02070309020205020404" pitchFamily="49" charset="0"/>
-                <a:cs typeface="Courier New" panose="02070309020205020404" pitchFamily="49" charset="0"/>
-              </a:rPr>
-              <a:t>sprite[index].</a:t>
-            </a:r>
-            <a:r>
-              <a:rPr lang="sv-SE" sz="1200" dirty="0" err="1">
+              <a:rPr lang="sv-SE" sz="1000" dirty="0">
+                <a:latin typeface="Courier New" panose="02070309020205020404" pitchFamily="49" charset="0"/>
+                <a:cs typeface="Courier New" panose="02070309020205020404" pitchFamily="49" charset="0"/>
+              </a:rPr>
+              <a:t>[0].x</a:t>
+            </a:r>
+            <a:r>
+              <a:rPr lang="sv-SE" sz="1000" dirty="0" smtClean="0">
+                <a:latin typeface="Courier New" panose="02070309020205020404" pitchFamily="49" charset="0"/>
+                <a:cs typeface="Courier New" panose="02070309020205020404" pitchFamily="49" charset="0"/>
+              </a:rPr>
+              <a:t>);</a:t>
+            </a:r>
+            <a:br>
+              <a:rPr lang="sv-SE" sz="1000" dirty="0" smtClean="0">
+                <a:latin typeface="Courier New" panose="02070309020205020404" pitchFamily="49" charset="0"/>
+                <a:cs typeface="Courier New" panose="02070309020205020404" pitchFamily="49" charset="0"/>
+              </a:rPr>
+            </a:br>
+            <a:r>
+              <a:rPr lang="sv-SE" sz="1000" dirty="0" smtClean="0">
+                <a:latin typeface="Courier New" panose="02070309020205020404" pitchFamily="49" charset="0"/>
+                <a:cs typeface="Courier New" panose="02070309020205020404" pitchFamily="49" charset="0"/>
+              </a:rPr>
+              <a:t>		sprite[index</a:t>
+            </a:r>
+            <a:r>
+              <a:rPr lang="sv-SE" sz="1000" dirty="0">
+                <a:latin typeface="Courier New" panose="02070309020205020404" pitchFamily="49" charset="0"/>
+                <a:cs typeface="Courier New" panose="02070309020205020404" pitchFamily="49" charset="0"/>
+              </a:rPr>
+              <a:t>].</a:t>
+            </a:r>
+            <a:r>
+              <a:rPr lang="sv-SE" sz="1000" dirty="0" err="1">
                 <a:latin typeface="Courier New" panose="02070309020205020404" pitchFamily="49" charset="0"/>
                 <a:cs typeface="Courier New" panose="02070309020205020404" pitchFamily="49" charset="0"/>
               </a:rPr>
               <a:t>velocity.x</a:t>
             </a:r>
             <a:r>
-              <a:rPr lang="sv-SE" sz="1200" dirty="0">
+              <a:rPr lang="sv-SE" sz="1000" dirty="0">
                 <a:latin typeface="Courier New" panose="02070309020205020404" pitchFamily="49" charset="0"/>
                 <a:cs typeface="Courier New" panose="02070309020205020404" pitchFamily="49" charset="0"/>
               </a:rPr>
               <a:t> = -sprite[index].</a:t>
             </a:r>
             <a:r>
-              <a:rPr lang="sv-SE" sz="1200" dirty="0" err="1">
+              <a:rPr lang="sv-SE" sz="1000" dirty="0" err="1">
                 <a:latin typeface="Courier New" panose="02070309020205020404" pitchFamily="49" charset="0"/>
                 <a:cs typeface="Courier New" panose="02070309020205020404" pitchFamily="49" charset="0"/>
               </a:rPr>
               <a:t>velocity.x</a:t>
             </a:r>
             <a:r>
-              <a:rPr lang="sv-SE" sz="1200" dirty="0">
-                <a:latin typeface="Courier New" panose="02070309020205020404" pitchFamily="49" charset="0"/>
-                <a:cs typeface="Courier New" panose="02070309020205020404" pitchFamily="49" charset="0"/>
-              </a:rPr>
-              <a:t> * </a:t>
-            </a:r>
-            <a:r>
-              <a:rPr lang="sv-SE" sz="1200" dirty="0" err="1">
+              <a:rPr lang="sv-SE" sz="1000" dirty="0">
+                <a:latin typeface="Courier New" panose="02070309020205020404" pitchFamily="49" charset="0"/>
+                <a:cs typeface="Courier New" panose="02070309020205020404" pitchFamily="49" charset="0"/>
+              </a:rPr>
+              <a:t> </a:t>
+            </a:r>
+            <a:r>
+              <a:rPr lang="sv-SE" sz="1000" dirty="0" smtClean="0">
+                <a:latin typeface="Courier New" panose="02070309020205020404" pitchFamily="49" charset="0"/>
+                <a:cs typeface="Courier New" panose="02070309020205020404" pitchFamily="49" charset="0"/>
+              </a:rPr>
+              <a:t>*</a:t>
+            </a:r>
+            <a:br>
+              <a:rPr lang="sv-SE" sz="1000" dirty="0" smtClean="0">
+                <a:latin typeface="Courier New" panose="02070309020205020404" pitchFamily="49" charset="0"/>
+                <a:cs typeface="Courier New" panose="02070309020205020404" pitchFamily="49" charset="0"/>
+              </a:rPr>
+            </a:br>
+            <a:r>
+              <a:rPr lang="sv-SE" sz="1000" dirty="0" smtClean="0">
+                <a:latin typeface="Courier New" panose="02070309020205020404" pitchFamily="49" charset="0"/>
+                <a:cs typeface="Courier New" panose="02070309020205020404" pitchFamily="49" charset="0"/>
+              </a:rPr>
+              <a:t>		    </a:t>
+            </a:r>
+            <a:r>
+              <a:rPr lang="sv-SE" sz="1000" dirty="0" err="1" smtClean="0">
                 <a:latin typeface="Courier New" panose="02070309020205020404" pitchFamily="49" charset="0"/>
                 <a:cs typeface="Courier New" panose="02070309020205020404" pitchFamily="49" charset="0"/>
               </a:rPr>
               <a:t>property</a:t>
             </a:r>
             <a:r>
-              <a:rPr lang="sv-SE" sz="1200" dirty="0">
-                <a:latin typeface="Courier New" panose="02070309020205020404" pitchFamily="49" charset="0"/>
-                <a:cs typeface="Courier New" panose="02070309020205020404" pitchFamily="49" charset="0"/>
-              </a:rPr>
-              <a:t>[index].</a:t>
-            </a:r>
-            <a:r>
-              <a:rPr lang="sv-SE" sz="1200" dirty="0" err="1">
+              <a:rPr lang="sv-SE" sz="1000" dirty="0" smtClean="0">
+                <a:latin typeface="Courier New" panose="02070309020205020404" pitchFamily="49" charset="0"/>
+                <a:cs typeface="Courier New" panose="02070309020205020404" pitchFamily="49" charset="0"/>
+              </a:rPr>
+              <a:t>[index</a:t>
+            </a:r>
+            <a:r>
+              <a:rPr lang="sv-SE" sz="1000" dirty="0">
+                <a:latin typeface="Courier New" panose="02070309020205020404" pitchFamily="49" charset="0"/>
+                <a:cs typeface="Courier New" panose="02070309020205020404" pitchFamily="49" charset="0"/>
+              </a:rPr>
+              <a:t>].</a:t>
+            </a:r>
+            <a:r>
+              <a:rPr lang="sv-SE" sz="1000" dirty="0" err="1">
                 <a:latin typeface="Courier New" panose="02070309020205020404" pitchFamily="49" charset="0"/>
                 <a:cs typeface="Courier New" panose="02070309020205020404" pitchFamily="49" charset="0"/>
               </a:rPr>
               <a:t>properties.y</a:t>
             </a:r>
             <a:r>
-              <a:rPr lang="sv-SE" sz="1200" dirty="0">
+              <a:rPr lang="sv-SE" sz="1000" dirty="0" smtClean="0">
                 <a:latin typeface="Courier New" panose="02070309020205020404" pitchFamily="49" charset="0"/>
                 <a:cs typeface="Courier New" panose="02070309020205020404" pitchFamily="49" charset="0"/>
               </a:rPr>
               <a:t>;</a:t>
             </a:r>
-          </a:p>
-          <a:p>
-            <a:r>
-              <a:rPr lang="sv-SE" sz="1200" dirty="0">
-                <a:latin typeface="Courier New" panose="02070309020205020404" pitchFamily="49" charset="0"/>
-                <a:cs typeface="Courier New" panose="02070309020205020404" pitchFamily="49" charset="0"/>
-              </a:rPr>
-              <a:t>}</a:t>
-            </a:r>
-          </a:p>
-          <a:p>
-            <a:endParaRPr lang="sv-SE" sz="1200" dirty="0">
-              <a:latin typeface="Courier New" panose="02070309020205020404" pitchFamily="49" charset="0"/>
-              <a:cs typeface="Courier New" panose="02070309020205020404" pitchFamily="49" charset="0"/>
-            </a:endParaRPr>
-          </a:p>
-          <a:p>
-            <a:r>
-              <a:rPr lang="sv-SE" sz="1200" dirty="0">
-                <a:latin typeface="Courier New" panose="02070309020205020404" pitchFamily="49" charset="0"/>
-                <a:cs typeface="Courier New" panose="02070309020205020404" pitchFamily="49" charset="0"/>
-              </a:rPr>
-              <a:t>    }</a:t>
-            </a:r>
-          </a:p>
-          <a:p>
-            <a:endParaRPr lang="sv-SE" sz="1200" dirty="0">
+            <a:br>
+              <a:rPr lang="sv-SE" sz="1000" dirty="0" smtClean="0">
+                <a:latin typeface="Courier New" panose="02070309020205020404" pitchFamily="49" charset="0"/>
+                <a:cs typeface="Courier New" panose="02070309020205020404" pitchFamily="49" charset="0"/>
+              </a:rPr>
+            </a:br>
+            <a:r>
+              <a:rPr lang="sv-SE" sz="1000" dirty="0" smtClean="0">
+                <a:latin typeface="Courier New" panose="02070309020205020404" pitchFamily="49" charset="0"/>
+                <a:cs typeface="Courier New" panose="02070309020205020404" pitchFamily="49" charset="0"/>
+              </a:rPr>
+              <a:t>	}</a:t>
+            </a:r>
+            <a:br>
+              <a:rPr lang="sv-SE" sz="1000" dirty="0" smtClean="0">
+                <a:latin typeface="Courier New" panose="02070309020205020404" pitchFamily="49" charset="0"/>
+                <a:cs typeface="Courier New" panose="02070309020205020404" pitchFamily="49" charset="0"/>
+              </a:rPr>
+            </a:br>
+            <a:r>
+              <a:rPr lang="sv-SE" sz="1000" dirty="0" smtClean="0">
+                <a:latin typeface="Courier New" panose="02070309020205020404" pitchFamily="49" charset="0"/>
+                <a:cs typeface="Courier New" panose="02070309020205020404" pitchFamily="49" charset="0"/>
+              </a:rPr>
+              <a:t>	//</a:t>
+            </a:r>
+            <a:r>
+              <a:rPr lang="sv-SE" sz="1000" dirty="0">
+                <a:latin typeface="Courier New" panose="02070309020205020404" pitchFamily="49" charset="0"/>
+                <a:cs typeface="Courier New" panose="02070309020205020404" pitchFamily="49" charset="0"/>
+              </a:rPr>
+              <a:t>Front </a:t>
+            </a:r>
+            <a:r>
+              <a:rPr lang="sv-SE" sz="1000" dirty="0" smtClean="0">
+                <a:latin typeface="Courier New" panose="02070309020205020404" pitchFamily="49" charset="0"/>
+                <a:cs typeface="Courier New" panose="02070309020205020404" pitchFamily="49" charset="0"/>
+              </a:rPr>
+              <a:t>plane</a:t>
+            </a:r>
+            <a:br>
+              <a:rPr lang="sv-SE" sz="1000" dirty="0" smtClean="0">
+                <a:latin typeface="Courier New" panose="02070309020205020404" pitchFamily="49" charset="0"/>
+                <a:cs typeface="Courier New" panose="02070309020205020404" pitchFamily="49" charset="0"/>
+              </a:rPr>
+            </a:br>
+            <a:r>
+              <a:rPr lang="sv-SE" sz="1000" dirty="0" smtClean="0">
+                <a:latin typeface="Courier New" panose="02070309020205020404" pitchFamily="49" charset="0"/>
+                <a:cs typeface="Courier New" panose="02070309020205020404" pitchFamily="49" charset="0"/>
+              </a:rPr>
+              <a:t>	</a:t>
+            </a:r>
+            <a:r>
+              <a:rPr lang="sv-SE" sz="1000" dirty="0" err="1" smtClean="0">
+                <a:latin typeface="Courier New" panose="02070309020205020404" pitchFamily="49" charset="0"/>
+                <a:cs typeface="Courier New" panose="02070309020205020404" pitchFamily="49" charset="0"/>
+              </a:rPr>
+              <a:t>if</a:t>
+            </a:r>
+            <a:r>
+              <a:rPr lang="sv-SE" sz="1000" dirty="0" smtClean="0">
+                <a:latin typeface="Courier New" panose="02070309020205020404" pitchFamily="49" charset="0"/>
+                <a:cs typeface="Courier New" panose="02070309020205020404" pitchFamily="49" charset="0"/>
+              </a:rPr>
+              <a:t> </a:t>
+            </a:r>
+            <a:r>
+              <a:rPr lang="sv-SE" sz="1000" dirty="0">
+                <a:latin typeface="Courier New" panose="02070309020205020404" pitchFamily="49" charset="0"/>
+                <a:cs typeface="Courier New" panose="02070309020205020404" pitchFamily="49" charset="0"/>
+              </a:rPr>
+              <a:t>(</a:t>
+            </a:r>
+            <a:r>
+              <a:rPr lang="sv-SE" sz="1000" dirty="0" err="1">
+                <a:latin typeface="Courier New" panose="02070309020205020404" pitchFamily="49" charset="0"/>
+                <a:cs typeface="Courier New" panose="02070309020205020404" pitchFamily="49" charset="0"/>
+              </a:rPr>
+              <a:t>dot</a:t>
+            </a:r>
+            <a:r>
+              <a:rPr lang="sv-SE" sz="1000" dirty="0">
+                <a:latin typeface="Courier New" panose="02070309020205020404" pitchFamily="49" charset="0"/>
+                <a:cs typeface="Courier New" panose="02070309020205020404" pitchFamily="49" charset="0"/>
+              </a:rPr>
+              <a:t>(globals[0].</a:t>
+            </a:r>
+            <a:r>
+              <a:rPr lang="sv-SE" sz="1000" dirty="0" err="1">
+                <a:latin typeface="Courier New" panose="02070309020205020404" pitchFamily="49" charset="0"/>
+                <a:cs typeface="Courier New" panose="02070309020205020404" pitchFamily="49" charset="0"/>
+              </a:rPr>
+              <a:t>bounding.crossVectors</a:t>
+            </a:r>
+            <a:r>
+              <a:rPr lang="sv-SE" sz="1000" dirty="0">
+                <a:latin typeface="Courier New" panose="02070309020205020404" pitchFamily="49" charset="0"/>
+                <a:cs typeface="Courier New" panose="02070309020205020404" pitchFamily="49" charset="0"/>
+              </a:rPr>
+              <a:t>[1].</a:t>
+            </a:r>
+            <a:r>
+              <a:rPr lang="sv-SE" sz="1000" dirty="0" err="1">
+                <a:latin typeface="Courier New" panose="02070309020205020404" pitchFamily="49" charset="0"/>
+                <a:cs typeface="Courier New" panose="02070309020205020404" pitchFamily="49" charset="0"/>
+              </a:rPr>
+              <a:t>xyz</a:t>
+            </a:r>
+            <a:r>
+              <a:rPr lang="sv-SE" sz="1000" dirty="0">
+                <a:latin typeface="Courier New" panose="02070309020205020404" pitchFamily="49" charset="0"/>
+                <a:cs typeface="Courier New" panose="02070309020205020404" pitchFamily="49" charset="0"/>
+              </a:rPr>
+              <a:t>, (sprite[index].</a:t>
+            </a:r>
+            <a:r>
+              <a:rPr lang="sv-SE" sz="1000" dirty="0" err="1">
+                <a:latin typeface="Courier New" panose="02070309020205020404" pitchFamily="49" charset="0"/>
+                <a:cs typeface="Courier New" panose="02070309020205020404" pitchFamily="49" charset="0"/>
+              </a:rPr>
+              <a:t>position.xyz</a:t>
+            </a:r>
+            <a:r>
+              <a:rPr lang="sv-SE" sz="1000" dirty="0">
+                <a:latin typeface="Courier New" panose="02070309020205020404" pitchFamily="49" charset="0"/>
+                <a:cs typeface="Courier New" panose="02070309020205020404" pitchFamily="49" charset="0"/>
+              </a:rPr>
+              <a:t> </a:t>
+            </a:r>
+            <a:r>
+              <a:rPr lang="sv-SE" sz="1000" dirty="0" smtClean="0">
+                <a:latin typeface="Courier New" panose="02070309020205020404" pitchFamily="49" charset="0"/>
+                <a:cs typeface="Courier New" panose="02070309020205020404" pitchFamily="49" charset="0"/>
+              </a:rPr>
+              <a:t>–</a:t>
+            </a:r>
+            <a:br>
+              <a:rPr lang="sv-SE" sz="1000" dirty="0" smtClean="0">
+                <a:latin typeface="Courier New" panose="02070309020205020404" pitchFamily="49" charset="0"/>
+                <a:cs typeface="Courier New" panose="02070309020205020404" pitchFamily="49" charset="0"/>
+              </a:rPr>
+            </a:br>
+            <a:r>
+              <a:rPr lang="sv-SE" sz="1000" dirty="0" smtClean="0">
+                <a:latin typeface="Courier New" panose="02070309020205020404" pitchFamily="49" charset="0"/>
+                <a:cs typeface="Courier New" panose="02070309020205020404" pitchFamily="49" charset="0"/>
+              </a:rPr>
+              <a:t>	    globals[0</a:t>
+            </a:r>
+            <a:r>
+              <a:rPr lang="sv-SE" sz="1000" dirty="0">
+                <a:latin typeface="Courier New" panose="02070309020205020404" pitchFamily="49" charset="0"/>
+                <a:cs typeface="Courier New" panose="02070309020205020404" pitchFamily="49" charset="0"/>
+              </a:rPr>
+              <a:t>].</a:t>
+            </a:r>
+            <a:r>
+              <a:rPr lang="sv-SE" sz="1000" dirty="0" err="1">
+                <a:latin typeface="Courier New" panose="02070309020205020404" pitchFamily="49" charset="0"/>
+                <a:cs typeface="Courier New" panose="02070309020205020404" pitchFamily="49" charset="0"/>
+              </a:rPr>
+              <a:t>bounding.vertices</a:t>
+            </a:r>
+            <a:r>
+              <a:rPr lang="sv-SE" sz="1000" dirty="0">
+                <a:latin typeface="Courier New" panose="02070309020205020404" pitchFamily="49" charset="0"/>
+                <a:cs typeface="Courier New" panose="02070309020205020404" pitchFamily="49" charset="0"/>
+              </a:rPr>
+              <a:t>[0].</a:t>
+            </a:r>
+            <a:r>
+              <a:rPr lang="sv-SE" sz="1000" dirty="0" err="1">
+                <a:latin typeface="Courier New" panose="02070309020205020404" pitchFamily="49" charset="0"/>
+                <a:cs typeface="Courier New" panose="02070309020205020404" pitchFamily="49" charset="0"/>
+              </a:rPr>
+              <a:t>xyz</a:t>
+            </a:r>
+            <a:r>
+              <a:rPr lang="sv-SE" sz="1000" dirty="0">
+                <a:latin typeface="Courier New" panose="02070309020205020404" pitchFamily="49" charset="0"/>
+                <a:cs typeface="Courier New" panose="02070309020205020404" pitchFamily="49" charset="0"/>
+              </a:rPr>
+              <a:t>)) &gt; 0 ) </a:t>
+            </a:r>
+            <a:r>
+              <a:rPr lang="sv-SE" sz="1000" dirty="0" smtClean="0">
+                <a:latin typeface="Courier New" panose="02070309020205020404" pitchFamily="49" charset="0"/>
+                <a:cs typeface="Courier New" panose="02070309020205020404" pitchFamily="49" charset="0"/>
+              </a:rPr>
+              <a:t>{</a:t>
+            </a:r>
+            <a:br>
+              <a:rPr lang="sv-SE" sz="1000" dirty="0" smtClean="0">
+                <a:latin typeface="Courier New" panose="02070309020205020404" pitchFamily="49" charset="0"/>
+                <a:cs typeface="Courier New" panose="02070309020205020404" pitchFamily="49" charset="0"/>
+              </a:rPr>
+            </a:br>
+            <a:r>
+              <a:rPr lang="sv-SE" sz="1000" dirty="0" smtClean="0">
+                <a:latin typeface="Courier New" panose="02070309020205020404" pitchFamily="49" charset="0"/>
+                <a:cs typeface="Courier New" panose="02070309020205020404" pitchFamily="49" charset="0"/>
+              </a:rPr>
+              <a:t>		sprite[index</a:t>
+            </a:r>
+            <a:r>
+              <a:rPr lang="sv-SE" sz="1000" dirty="0">
+                <a:latin typeface="Courier New" panose="02070309020205020404" pitchFamily="49" charset="0"/>
+                <a:cs typeface="Courier New" panose="02070309020205020404" pitchFamily="49" charset="0"/>
+              </a:rPr>
+              <a:t>].</a:t>
+            </a:r>
+            <a:r>
+              <a:rPr lang="sv-SE" sz="1000" dirty="0" err="1">
+                <a:latin typeface="Courier New" panose="02070309020205020404" pitchFamily="49" charset="0"/>
+                <a:cs typeface="Courier New" panose="02070309020205020404" pitchFamily="49" charset="0"/>
+              </a:rPr>
+              <a:t>position.z</a:t>
+            </a:r>
+            <a:r>
+              <a:rPr lang="sv-SE" sz="1000" dirty="0">
+                <a:latin typeface="Courier New" panose="02070309020205020404" pitchFamily="49" charset="0"/>
+                <a:cs typeface="Courier New" panose="02070309020205020404" pitchFamily="49" charset="0"/>
+              </a:rPr>
+              <a:t> += (globals[0].</a:t>
+            </a:r>
+            <a:r>
+              <a:rPr lang="sv-SE" sz="1000" dirty="0" err="1">
+                <a:latin typeface="Courier New" panose="02070309020205020404" pitchFamily="49" charset="0"/>
+                <a:cs typeface="Courier New" panose="02070309020205020404" pitchFamily="49" charset="0"/>
+              </a:rPr>
+              <a:t>bounding.vertices</a:t>
+            </a:r>
+            <a:r>
+              <a:rPr lang="sv-SE" sz="1000" dirty="0">
+                <a:latin typeface="Courier New" panose="02070309020205020404" pitchFamily="49" charset="0"/>
+                <a:cs typeface="Courier New" panose="02070309020205020404" pitchFamily="49" charset="0"/>
+              </a:rPr>
+              <a:t>[0].z </a:t>
+            </a:r>
+            <a:r>
+              <a:rPr lang="sv-SE" sz="1000" dirty="0" smtClean="0">
+                <a:latin typeface="Courier New" panose="02070309020205020404" pitchFamily="49" charset="0"/>
+                <a:cs typeface="Courier New" panose="02070309020205020404" pitchFamily="49" charset="0"/>
+              </a:rPr>
+              <a:t>–</a:t>
+            </a:r>
+            <a:br>
+              <a:rPr lang="sv-SE" sz="1000" dirty="0" smtClean="0">
+                <a:latin typeface="Courier New" panose="02070309020205020404" pitchFamily="49" charset="0"/>
+                <a:cs typeface="Courier New" panose="02070309020205020404" pitchFamily="49" charset="0"/>
+              </a:rPr>
+            </a:br>
+            <a:r>
+              <a:rPr lang="sv-SE" sz="1000" dirty="0" smtClean="0">
+                <a:latin typeface="Courier New" panose="02070309020205020404" pitchFamily="49" charset="0"/>
+                <a:cs typeface="Courier New" panose="02070309020205020404" pitchFamily="49" charset="0"/>
+              </a:rPr>
+              <a:t>		    sprite[index</a:t>
+            </a:r>
+            <a:r>
+              <a:rPr lang="sv-SE" sz="1000" dirty="0">
+                <a:latin typeface="Courier New" panose="02070309020205020404" pitchFamily="49" charset="0"/>
+                <a:cs typeface="Courier New" panose="02070309020205020404" pitchFamily="49" charset="0"/>
+              </a:rPr>
+              <a:t>].</a:t>
+            </a:r>
+            <a:r>
+              <a:rPr lang="sv-SE" sz="1000" dirty="0" err="1">
+                <a:latin typeface="Courier New" panose="02070309020205020404" pitchFamily="49" charset="0"/>
+                <a:cs typeface="Courier New" panose="02070309020205020404" pitchFamily="49" charset="0"/>
+              </a:rPr>
+              <a:t>position.z</a:t>
+            </a:r>
+            <a:r>
+              <a:rPr lang="sv-SE" sz="1000" dirty="0" smtClean="0">
+                <a:latin typeface="Courier New" panose="02070309020205020404" pitchFamily="49" charset="0"/>
+                <a:cs typeface="Courier New" panose="02070309020205020404" pitchFamily="49" charset="0"/>
+              </a:rPr>
+              <a:t>);</a:t>
+            </a:r>
+            <a:br>
+              <a:rPr lang="sv-SE" sz="1000" dirty="0" smtClean="0">
+                <a:latin typeface="Courier New" panose="02070309020205020404" pitchFamily="49" charset="0"/>
+                <a:cs typeface="Courier New" panose="02070309020205020404" pitchFamily="49" charset="0"/>
+              </a:rPr>
+            </a:br>
+            <a:r>
+              <a:rPr lang="sv-SE" sz="1000" dirty="0" smtClean="0">
+                <a:latin typeface="Courier New" panose="02070309020205020404" pitchFamily="49" charset="0"/>
+                <a:cs typeface="Courier New" panose="02070309020205020404" pitchFamily="49" charset="0"/>
+              </a:rPr>
+              <a:t>		sprite[index</a:t>
+            </a:r>
+            <a:r>
+              <a:rPr lang="sv-SE" sz="1000" dirty="0">
+                <a:latin typeface="Courier New" panose="02070309020205020404" pitchFamily="49" charset="0"/>
+                <a:cs typeface="Courier New" panose="02070309020205020404" pitchFamily="49" charset="0"/>
+              </a:rPr>
+              <a:t>].</a:t>
+            </a:r>
+            <a:r>
+              <a:rPr lang="sv-SE" sz="1000" dirty="0" err="1">
+                <a:latin typeface="Courier New" panose="02070309020205020404" pitchFamily="49" charset="0"/>
+                <a:cs typeface="Courier New" panose="02070309020205020404" pitchFamily="49" charset="0"/>
+              </a:rPr>
+              <a:t>velocity.z</a:t>
+            </a:r>
+            <a:r>
+              <a:rPr lang="sv-SE" sz="1000" dirty="0">
+                <a:latin typeface="Courier New" panose="02070309020205020404" pitchFamily="49" charset="0"/>
+                <a:cs typeface="Courier New" panose="02070309020205020404" pitchFamily="49" charset="0"/>
+              </a:rPr>
+              <a:t> = -sprite[index].</a:t>
+            </a:r>
+            <a:r>
+              <a:rPr lang="sv-SE" sz="1000" dirty="0" err="1">
+                <a:latin typeface="Courier New" panose="02070309020205020404" pitchFamily="49" charset="0"/>
+                <a:cs typeface="Courier New" panose="02070309020205020404" pitchFamily="49" charset="0"/>
+              </a:rPr>
+              <a:t>velocity.z</a:t>
+            </a:r>
+            <a:r>
+              <a:rPr lang="sv-SE" sz="1000" dirty="0">
+                <a:latin typeface="Courier New" panose="02070309020205020404" pitchFamily="49" charset="0"/>
+                <a:cs typeface="Courier New" panose="02070309020205020404" pitchFamily="49" charset="0"/>
+              </a:rPr>
+              <a:t> </a:t>
+            </a:r>
+            <a:r>
+              <a:rPr lang="sv-SE" sz="1000" dirty="0" smtClean="0">
+                <a:latin typeface="Courier New" panose="02070309020205020404" pitchFamily="49" charset="0"/>
+                <a:cs typeface="Courier New" panose="02070309020205020404" pitchFamily="49" charset="0"/>
+              </a:rPr>
+              <a:t>*</a:t>
+            </a:r>
+            <a:br>
+              <a:rPr lang="sv-SE" sz="1000" dirty="0" smtClean="0">
+                <a:latin typeface="Courier New" panose="02070309020205020404" pitchFamily="49" charset="0"/>
+                <a:cs typeface="Courier New" panose="02070309020205020404" pitchFamily="49" charset="0"/>
+              </a:rPr>
+            </a:br>
+            <a:r>
+              <a:rPr lang="sv-SE" sz="1000" dirty="0" smtClean="0">
+                <a:latin typeface="Courier New" panose="02070309020205020404" pitchFamily="49" charset="0"/>
+                <a:cs typeface="Courier New" panose="02070309020205020404" pitchFamily="49" charset="0"/>
+              </a:rPr>
+              <a:t>		    </a:t>
+            </a:r>
+            <a:r>
+              <a:rPr lang="sv-SE" sz="1000" dirty="0" err="1" smtClean="0">
+                <a:latin typeface="Courier New" panose="02070309020205020404" pitchFamily="49" charset="0"/>
+                <a:cs typeface="Courier New" panose="02070309020205020404" pitchFamily="49" charset="0"/>
+              </a:rPr>
+              <a:t>property</a:t>
+            </a:r>
+            <a:r>
+              <a:rPr lang="sv-SE" sz="1000" dirty="0" smtClean="0">
+                <a:latin typeface="Courier New" panose="02070309020205020404" pitchFamily="49" charset="0"/>
+                <a:cs typeface="Courier New" panose="02070309020205020404" pitchFamily="49" charset="0"/>
+              </a:rPr>
+              <a:t>[index</a:t>
+            </a:r>
+            <a:r>
+              <a:rPr lang="sv-SE" sz="1000" dirty="0">
+                <a:latin typeface="Courier New" panose="02070309020205020404" pitchFamily="49" charset="0"/>
+                <a:cs typeface="Courier New" panose="02070309020205020404" pitchFamily="49" charset="0"/>
+              </a:rPr>
+              <a:t>].</a:t>
+            </a:r>
+            <a:r>
+              <a:rPr lang="sv-SE" sz="1000" dirty="0" err="1">
+                <a:latin typeface="Courier New" panose="02070309020205020404" pitchFamily="49" charset="0"/>
+                <a:cs typeface="Courier New" panose="02070309020205020404" pitchFamily="49" charset="0"/>
+              </a:rPr>
+              <a:t>properties.y</a:t>
+            </a:r>
+            <a:r>
+              <a:rPr lang="sv-SE" sz="1000" dirty="0" smtClean="0">
+                <a:latin typeface="Courier New" panose="02070309020205020404" pitchFamily="49" charset="0"/>
+                <a:cs typeface="Courier New" panose="02070309020205020404" pitchFamily="49" charset="0"/>
+              </a:rPr>
+              <a:t>;</a:t>
+            </a:r>
+            <a:br>
+              <a:rPr lang="sv-SE" sz="1000" dirty="0" smtClean="0">
+                <a:latin typeface="Courier New" panose="02070309020205020404" pitchFamily="49" charset="0"/>
+                <a:cs typeface="Courier New" panose="02070309020205020404" pitchFamily="49" charset="0"/>
+              </a:rPr>
+            </a:br>
+            <a:r>
+              <a:rPr lang="sv-SE" sz="1000" dirty="0" smtClean="0">
+                <a:latin typeface="Courier New" panose="02070309020205020404" pitchFamily="49" charset="0"/>
+                <a:cs typeface="Courier New" panose="02070309020205020404" pitchFamily="49" charset="0"/>
+              </a:rPr>
+              <a:t>	}</a:t>
+            </a:r>
+            <a:br>
+              <a:rPr lang="sv-SE" sz="1000" dirty="0" smtClean="0">
+                <a:latin typeface="Courier New" panose="02070309020205020404" pitchFamily="49" charset="0"/>
+                <a:cs typeface="Courier New" panose="02070309020205020404" pitchFamily="49" charset="0"/>
+              </a:rPr>
+            </a:br>
+            <a:r>
+              <a:rPr lang="sv-SE" sz="1000" dirty="0" smtClean="0">
+                <a:latin typeface="Courier New" panose="02070309020205020404" pitchFamily="49" charset="0"/>
+                <a:cs typeface="Courier New" panose="02070309020205020404" pitchFamily="49" charset="0"/>
+              </a:rPr>
+              <a:t>	//</a:t>
+            </a:r>
+            <a:r>
+              <a:rPr lang="sv-SE" sz="1000" dirty="0">
+                <a:latin typeface="Courier New" panose="02070309020205020404" pitchFamily="49" charset="0"/>
+                <a:cs typeface="Courier New" panose="02070309020205020404" pitchFamily="49" charset="0"/>
+              </a:rPr>
+              <a:t>Back </a:t>
+            </a:r>
+            <a:r>
+              <a:rPr lang="sv-SE" sz="1000" dirty="0" smtClean="0">
+                <a:latin typeface="Courier New" panose="02070309020205020404" pitchFamily="49" charset="0"/>
+                <a:cs typeface="Courier New" panose="02070309020205020404" pitchFamily="49" charset="0"/>
+              </a:rPr>
+              <a:t>plane</a:t>
+            </a:r>
+            <a:br>
+              <a:rPr lang="sv-SE" sz="1000" dirty="0" smtClean="0">
+                <a:latin typeface="Courier New" panose="02070309020205020404" pitchFamily="49" charset="0"/>
+                <a:cs typeface="Courier New" panose="02070309020205020404" pitchFamily="49" charset="0"/>
+              </a:rPr>
+            </a:br>
+            <a:r>
+              <a:rPr lang="sv-SE" sz="1000" dirty="0" smtClean="0">
+                <a:latin typeface="Courier New" panose="02070309020205020404" pitchFamily="49" charset="0"/>
+                <a:cs typeface="Courier New" panose="02070309020205020404" pitchFamily="49" charset="0"/>
+              </a:rPr>
+              <a:t>	</a:t>
+            </a:r>
+            <a:r>
+              <a:rPr lang="sv-SE" sz="1000" dirty="0" err="1" smtClean="0">
+                <a:latin typeface="Courier New" panose="02070309020205020404" pitchFamily="49" charset="0"/>
+                <a:cs typeface="Courier New" panose="02070309020205020404" pitchFamily="49" charset="0"/>
+              </a:rPr>
+              <a:t>if</a:t>
+            </a:r>
+            <a:r>
+              <a:rPr lang="sv-SE" sz="1000" dirty="0" smtClean="0">
+                <a:latin typeface="Courier New" panose="02070309020205020404" pitchFamily="49" charset="0"/>
+                <a:cs typeface="Courier New" panose="02070309020205020404" pitchFamily="49" charset="0"/>
+              </a:rPr>
+              <a:t> </a:t>
+            </a:r>
+            <a:r>
+              <a:rPr lang="sv-SE" sz="1000" dirty="0">
+                <a:latin typeface="Courier New" panose="02070309020205020404" pitchFamily="49" charset="0"/>
+                <a:cs typeface="Courier New" panose="02070309020205020404" pitchFamily="49" charset="0"/>
+              </a:rPr>
+              <a:t>(</a:t>
+            </a:r>
+            <a:r>
+              <a:rPr lang="sv-SE" sz="1000" dirty="0" err="1">
+                <a:latin typeface="Courier New" panose="02070309020205020404" pitchFamily="49" charset="0"/>
+                <a:cs typeface="Courier New" panose="02070309020205020404" pitchFamily="49" charset="0"/>
+              </a:rPr>
+              <a:t>dot</a:t>
+            </a:r>
+            <a:r>
+              <a:rPr lang="sv-SE" sz="1000" dirty="0">
+                <a:latin typeface="Courier New" panose="02070309020205020404" pitchFamily="49" charset="0"/>
+                <a:cs typeface="Courier New" panose="02070309020205020404" pitchFamily="49" charset="0"/>
+              </a:rPr>
+              <a:t>(globals[0].</a:t>
+            </a:r>
+            <a:r>
+              <a:rPr lang="sv-SE" sz="1000" dirty="0" err="1">
+                <a:latin typeface="Courier New" panose="02070309020205020404" pitchFamily="49" charset="0"/>
+                <a:cs typeface="Courier New" panose="02070309020205020404" pitchFamily="49" charset="0"/>
+              </a:rPr>
+              <a:t>bounding.crossVectors</a:t>
+            </a:r>
+            <a:r>
+              <a:rPr lang="sv-SE" sz="1000" dirty="0">
+                <a:latin typeface="Courier New" panose="02070309020205020404" pitchFamily="49" charset="0"/>
+                <a:cs typeface="Courier New" panose="02070309020205020404" pitchFamily="49" charset="0"/>
+              </a:rPr>
+              <a:t>[2].</a:t>
+            </a:r>
+            <a:r>
+              <a:rPr lang="sv-SE" sz="1000" dirty="0" err="1">
+                <a:latin typeface="Courier New" panose="02070309020205020404" pitchFamily="49" charset="0"/>
+                <a:cs typeface="Courier New" panose="02070309020205020404" pitchFamily="49" charset="0"/>
+              </a:rPr>
+              <a:t>xyz</a:t>
+            </a:r>
+            <a:r>
+              <a:rPr lang="sv-SE" sz="1000" dirty="0">
+                <a:latin typeface="Courier New" panose="02070309020205020404" pitchFamily="49" charset="0"/>
+                <a:cs typeface="Courier New" panose="02070309020205020404" pitchFamily="49" charset="0"/>
+              </a:rPr>
+              <a:t>, (sprite[index].</a:t>
+            </a:r>
+            <a:r>
+              <a:rPr lang="sv-SE" sz="1000" dirty="0" err="1">
+                <a:latin typeface="Courier New" panose="02070309020205020404" pitchFamily="49" charset="0"/>
+                <a:cs typeface="Courier New" panose="02070309020205020404" pitchFamily="49" charset="0"/>
+              </a:rPr>
+              <a:t>position.xyz</a:t>
+            </a:r>
+            <a:r>
+              <a:rPr lang="sv-SE" sz="1000" dirty="0">
+                <a:latin typeface="Courier New" panose="02070309020205020404" pitchFamily="49" charset="0"/>
+                <a:cs typeface="Courier New" panose="02070309020205020404" pitchFamily="49" charset="0"/>
+              </a:rPr>
+              <a:t> </a:t>
+            </a:r>
+            <a:r>
+              <a:rPr lang="sv-SE" sz="1000" dirty="0" smtClean="0">
+                <a:latin typeface="Courier New" panose="02070309020205020404" pitchFamily="49" charset="0"/>
+                <a:cs typeface="Courier New" panose="02070309020205020404" pitchFamily="49" charset="0"/>
+              </a:rPr>
+              <a:t>–</a:t>
+            </a:r>
+            <a:br>
+              <a:rPr lang="sv-SE" sz="1000" dirty="0" smtClean="0">
+                <a:latin typeface="Courier New" panose="02070309020205020404" pitchFamily="49" charset="0"/>
+                <a:cs typeface="Courier New" panose="02070309020205020404" pitchFamily="49" charset="0"/>
+              </a:rPr>
+            </a:br>
+            <a:r>
+              <a:rPr lang="sv-SE" sz="1000" dirty="0" smtClean="0">
+                <a:latin typeface="Courier New" panose="02070309020205020404" pitchFamily="49" charset="0"/>
+                <a:cs typeface="Courier New" panose="02070309020205020404" pitchFamily="49" charset="0"/>
+              </a:rPr>
+              <a:t>		    globals[0</a:t>
+            </a:r>
+            <a:r>
+              <a:rPr lang="sv-SE" sz="1000" dirty="0">
+                <a:latin typeface="Courier New" panose="02070309020205020404" pitchFamily="49" charset="0"/>
+                <a:cs typeface="Courier New" panose="02070309020205020404" pitchFamily="49" charset="0"/>
+              </a:rPr>
+              <a:t>].</a:t>
+            </a:r>
+            <a:r>
+              <a:rPr lang="sv-SE" sz="1000" dirty="0" err="1">
+                <a:latin typeface="Courier New" panose="02070309020205020404" pitchFamily="49" charset="0"/>
+                <a:cs typeface="Courier New" panose="02070309020205020404" pitchFamily="49" charset="0"/>
+              </a:rPr>
+              <a:t>bounding.vertices</a:t>
+            </a:r>
+            <a:r>
+              <a:rPr lang="sv-SE" sz="1000" dirty="0">
+                <a:latin typeface="Courier New" panose="02070309020205020404" pitchFamily="49" charset="0"/>
+                <a:cs typeface="Courier New" panose="02070309020205020404" pitchFamily="49" charset="0"/>
+              </a:rPr>
+              <a:t>[1].</a:t>
+            </a:r>
+            <a:r>
+              <a:rPr lang="sv-SE" sz="1000" dirty="0" err="1">
+                <a:latin typeface="Courier New" panose="02070309020205020404" pitchFamily="49" charset="0"/>
+                <a:cs typeface="Courier New" panose="02070309020205020404" pitchFamily="49" charset="0"/>
+              </a:rPr>
+              <a:t>xyz</a:t>
+            </a:r>
+            <a:r>
+              <a:rPr lang="sv-SE" sz="1000" dirty="0">
+                <a:latin typeface="Courier New" panose="02070309020205020404" pitchFamily="49" charset="0"/>
+                <a:cs typeface="Courier New" panose="02070309020205020404" pitchFamily="49" charset="0"/>
+              </a:rPr>
+              <a:t>)) &gt; 0 ) </a:t>
+            </a:r>
+            <a:r>
+              <a:rPr lang="sv-SE" sz="1000" dirty="0" smtClean="0">
+                <a:latin typeface="Courier New" panose="02070309020205020404" pitchFamily="49" charset="0"/>
+                <a:cs typeface="Courier New" panose="02070309020205020404" pitchFamily="49" charset="0"/>
+              </a:rPr>
+              <a:t>{</a:t>
+            </a:r>
+            <a:br>
+              <a:rPr lang="sv-SE" sz="1000" dirty="0" smtClean="0">
+                <a:latin typeface="Courier New" panose="02070309020205020404" pitchFamily="49" charset="0"/>
+                <a:cs typeface="Courier New" panose="02070309020205020404" pitchFamily="49" charset="0"/>
+              </a:rPr>
+            </a:br>
+            <a:r>
+              <a:rPr lang="sv-SE" sz="1000" dirty="0" smtClean="0">
+                <a:latin typeface="Courier New" panose="02070309020205020404" pitchFamily="49" charset="0"/>
+                <a:cs typeface="Courier New" panose="02070309020205020404" pitchFamily="49" charset="0"/>
+              </a:rPr>
+              <a:t>		sprite[index</a:t>
+            </a:r>
+            <a:r>
+              <a:rPr lang="sv-SE" sz="1000" dirty="0">
+                <a:latin typeface="Courier New" panose="02070309020205020404" pitchFamily="49" charset="0"/>
+                <a:cs typeface="Courier New" panose="02070309020205020404" pitchFamily="49" charset="0"/>
+              </a:rPr>
+              <a:t>].</a:t>
+            </a:r>
+            <a:r>
+              <a:rPr lang="sv-SE" sz="1000" dirty="0" err="1">
+                <a:latin typeface="Courier New" panose="02070309020205020404" pitchFamily="49" charset="0"/>
+                <a:cs typeface="Courier New" panose="02070309020205020404" pitchFamily="49" charset="0"/>
+              </a:rPr>
+              <a:t>position.z</a:t>
+            </a:r>
+            <a:r>
+              <a:rPr lang="sv-SE" sz="1000" dirty="0">
+                <a:latin typeface="Courier New" panose="02070309020205020404" pitchFamily="49" charset="0"/>
+                <a:cs typeface="Courier New" panose="02070309020205020404" pitchFamily="49" charset="0"/>
+              </a:rPr>
+              <a:t> -= (sprite[index].</a:t>
+            </a:r>
+            <a:r>
+              <a:rPr lang="sv-SE" sz="1000" dirty="0" err="1">
+                <a:latin typeface="Courier New" panose="02070309020205020404" pitchFamily="49" charset="0"/>
+                <a:cs typeface="Courier New" panose="02070309020205020404" pitchFamily="49" charset="0"/>
+              </a:rPr>
+              <a:t>position.z</a:t>
+            </a:r>
+            <a:r>
+              <a:rPr lang="sv-SE" sz="1000" dirty="0">
+                <a:latin typeface="Courier New" panose="02070309020205020404" pitchFamily="49" charset="0"/>
+                <a:cs typeface="Courier New" panose="02070309020205020404" pitchFamily="49" charset="0"/>
+              </a:rPr>
+              <a:t> </a:t>
+            </a:r>
+            <a:r>
+              <a:rPr lang="sv-SE" sz="1000" dirty="0" smtClean="0">
+                <a:latin typeface="Courier New" panose="02070309020205020404" pitchFamily="49" charset="0"/>
+                <a:cs typeface="Courier New" panose="02070309020205020404" pitchFamily="49" charset="0"/>
+              </a:rPr>
+              <a:t>–</a:t>
+            </a:r>
+            <a:br>
+              <a:rPr lang="sv-SE" sz="1000" dirty="0" smtClean="0">
+                <a:latin typeface="Courier New" panose="02070309020205020404" pitchFamily="49" charset="0"/>
+                <a:cs typeface="Courier New" panose="02070309020205020404" pitchFamily="49" charset="0"/>
+              </a:rPr>
+            </a:br>
+            <a:r>
+              <a:rPr lang="sv-SE" sz="1000" dirty="0" smtClean="0">
+                <a:latin typeface="Courier New" panose="02070309020205020404" pitchFamily="49" charset="0"/>
+                <a:cs typeface="Courier New" panose="02070309020205020404" pitchFamily="49" charset="0"/>
+              </a:rPr>
+              <a:t>		    globals[0</a:t>
+            </a:r>
+            <a:r>
+              <a:rPr lang="sv-SE" sz="1000" dirty="0">
+                <a:latin typeface="Courier New" panose="02070309020205020404" pitchFamily="49" charset="0"/>
+                <a:cs typeface="Courier New" panose="02070309020205020404" pitchFamily="49" charset="0"/>
+              </a:rPr>
+              <a:t>].</a:t>
+            </a:r>
+            <a:r>
+              <a:rPr lang="sv-SE" sz="1000" dirty="0" err="1">
+                <a:latin typeface="Courier New" panose="02070309020205020404" pitchFamily="49" charset="0"/>
+                <a:cs typeface="Courier New" panose="02070309020205020404" pitchFamily="49" charset="0"/>
+              </a:rPr>
+              <a:t>bounding.vertices</a:t>
+            </a:r>
+            <a:r>
+              <a:rPr lang="sv-SE" sz="1000" dirty="0">
+                <a:latin typeface="Courier New" panose="02070309020205020404" pitchFamily="49" charset="0"/>
+                <a:cs typeface="Courier New" panose="02070309020205020404" pitchFamily="49" charset="0"/>
+              </a:rPr>
+              <a:t>[1].z</a:t>
+            </a:r>
+            <a:r>
+              <a:rPr lang="sv-SE" sz="1000" dirty="0" smtClean="0">
+                <a:latin typeface="Courier New" panose="02070309020205020404" pitchFamily="49" charset="0"/>
+                <a:cs typeface="Courier New" panose="02070309020205020404" pitchFamily="49" charset="0"/>
+              </a:rPr>
+              <a:t>);</a:t>
+            </a:r>
+            <a:br>
+              <a:rPr lang="sv-SE" sz="1000" dirty="0" smtClean="0">
+                <a:latin typeface="Courier New" panose="02070309020205020404" pitchFamily="49" charset="0"/>
+                <a:cs typeface="Courier New" panose="02070309020205020404" pitchFamily="49" charset="0"/>
+              </a:rPr>
+            </a:br>
+            <a:r>
+              <a:rPr lang="sv-SE" sz="1000" dirty="0" smtClean="0">
+                <a:latin typeface="Courier New" panose="02070309020205020404" pitchFamily="49" charset="0"/>
+                <a:cs typeface="Courier New" panose="02070309020205020404" pitchFamily="49" charset="0"/>
+              </a:rPr>
+              <a:t>		sprite[index</a:t>
+            </a:r>
+            <a:r>
+              <a:rPr lang="sv-SE" sz="1000" dirty="0">
+                <a:latin typeface="Courier New" panose="02070309020205020404" pitchFamily="49" charset="0"/>
+                <a:cs typeface="Courier New" panose="02070309020205020404" pitchFamily="49" charset="0"/>
+              </a:rPr>
+              <a:t>].</a:t>
+            </a:r>
+            <a:r>
+              <a:rPr lang="sv-SE" sz="1000" dirty="0" err="1">
+                <a:latin typeface="Courier New" panose="02070309020205020404" pitchFamily="49" charset="0"/>
+                <a:cs typeface="Courier New" panose="02070309020205020404" pitchFamily="49" charset="0"/>
+              </a:rPr>
+              <a:t>velocity.z</a:t>
+            </a:r>
+            <a:r>
+              <a:rPr lang="sv-SE" sz="1000" dirty="0">
+                <a:latin typeface="Courier New" panose="02070309020205020404" pitchFamily="49" charset="0"/>
+                <a:cs typeface="Courier New" panose="02070309020205020404" pitchFamily="49" charset="0"/>
+              </a:rPr>
+              <a:t> = -sprite[index].</a:t>
+            </a:r>
+            <a:r>
+              <a:rPr lang="sv-SE" sz="1000" dirty="0" err="1">
+                <a:latin typeface="Courier New" panose="02070309020205020404" pitchFamily="49" charset="0"/>
+                <a:cs typeface="Courier New" panose="02070309020205020404" pitchFamily="49" charset="0"/>
+              </a:rPr>
+              <a:t>velocity.z</a:t>
+            </a:r>
+            <a:r>
+              <a:rPr lang="sv-SE" sz="1000" dirty="0">
+                <a:latin typeface="Courier New" panose="02070309020205020404" pitchFamily="49" charset="0"/>
+                <a:cs typeface="Courier New" panose="02070309020205020404" pitchFamily="49" charset="0"/>
+              </a:rPr>
+              <a:t> </a:t>
+            </a:r>
+            <a:r>
+              <a:rPr lang="sv-SE" sz="1000" dirty="0" smtClean="0">
+                <a:latin typeface="Courier New" panose="02070309020205020404" pitchFamily="49" charset="0"/>
+                <a:cs typeface="Courier New" panose="02070309020205020404" pitchFamily="49" charset="0"/>
+              </a:rPr>
+              <a:t>*</a:t>
+            </a:r>
+            <a:br>
+              <a:rPr lang="sv-SE" sz="1000" dirty="0" smtClean="0">
+                <a:latin typeface="Courier New" panose="02070309020205020404" pitchFamily="49" charset="0"/>
+                <a:cs typeface="Courier New" panose="02070309020205020404" pitchFamily="49" charset="0"/>
+              </a:rPr>
+            </a:br>
+            <a:r>
+              <a:rPr lang="sv-SE" sz="1000" dirty="0" smtClean="0">
+                <a:latin typeface="Courier New" panose="02070309020205020404" pitchFamily="49" charset="0"/>
+                <a:cs typeface="Courier New" panose="02070309020205020404" pitchFamily="49" charset="0"/>
+              </a:rPr>
+              <a:t>		    </a:t>
+            </a:r>
+            <a:r>
+              <a:rPr lang="sv-SE" sz="1000" dirty="0" err="1" smtClean="0">
+                <a:latin typeface="Courier New" panose="02070309020205020404" pitchFamily="49" charset="0"/>
+                <a:cs typeface="Courier New" panose="02070309020205020404" pitchFamily="49" charset="0"/>
+              </a:rPr>
+              <a:t>property</a:t>
+            </a:r>
+            <a:r>
+              <a:rPr lang="sv-SE" sz="1000" dirty="0" smtClean="0">
+                <a:latin typeface="Courier New" panose="02070309020205020404" pitchFamily="49" charset="0"/>
+                <a:cs typeface="Courier New" panose="02070309020205020404" pitchFamily="49" charset="0"/>
+              </a:rPr>
+              <a:t>[index</a:t>
+            </a:r>
+            <a:r>
+              <a:rPr lang="sv-SE" sz="1000" dirty="0">
+                <a:latin typeface="Courier New" panose="02070309020205020404" pitchFamily="49" charset="0"/>
+                <a:cs typeface="Courier New" panose="02070309020205020404" pitchFamily="49" charset="0"/>
+              </a:rPr>
+              <a:t>].</a:t>
+            </a:r>
+            <a:r>
+              <a:rPr lang="sv-SE" sz="1000" dirty="0" err="1">
+                <a:latin typeface="Courier New" panose="02070309020205020404" pitchFamily="49" charset="0"/>
+                <a:cs typeface="Courier New" panose="02070309020205020404" pitchFamily="49" charset="0"/>
+              </a:rPr>
+              <a:t>properties.y</a:t>
+            </a:r>
+            <a:r>
+              <a:rPr lang="sv-SE" sz="1000" dirty="0" smtClean="0">
+                <a:latin typeface="Courier New" panose="02070309020205020404" pitchFamily="49" charset="0"/>
+                <a:cs typeface="Courier New" panose="02070309020205020404" pitchFamily="49" charset="0"/>
+              </a:rPr>
+              <a:t>;</a:t>
+            </a:r>
+            <a:br>
+              <a:rPr lang="sv-SE" sz="1000" dirty="0" smtClean="0">
+                <a:latin typeface="Courier New" panose="02070309020205020404" pitchFamily="49" charset="0"/>
+                <a:cs typeface="Courier New" panose="02070309020205020404" pitchFamily="49" charset="0"/>
+              </a:rPr>
+            </a:br>
+            <a:r>
+              <a:rPr lang="sv-SE" sz="1000" dirty="0" smtClean="0">
+                <a:latin typeface="Courier New" panose="02070309020205020404" pitchFamily="49" charset="0"/>
+                <a:cs typeface="Courier New" panose="02070309020205020404" pitchFamily="49" charset="0"/>
+              </a:rPr>
+              <a:t>	}</a:t>
+            </a:r>
+            <a:endParaRPr lang="sv-SE" sz="1000" dirty="0">
               <a:latin typeface="Courier New" panose="02070309020205020404" pitchFamily="49" charset="0"/>
               <a:cs typeface="Courier New" panose="02070309020205020404" pitchFamily="49" charset="0"/>
             </a:endParaRPr>

</xml_diff>